<commit_message>
minor modifications to pptx
</commit_message>
<xml_diff>
--- a/final_project/Metis Kojak.pptx
+++ b/final_project/Metis Kojak.pptx
@@ -5152,7 +5152,17 @@
                 <a:latin typeface="Avenir Light"/>
                 <a:cs typeface="Avenir Light"/>
               </a:rPr>
-              <a:t> </a:t>
+              <a:t> the right to </a:t>
+            </a:r>
+            <a:r>
+              <a:rPr lang="it-IT" sz="1800" dirty="0" err="1" smtClean="0">
+                <a:solidFill>
+                  <a:srgbClr val="FFFFFF"/>
+                </a:solidFill>
+                <a:latin typeface="Avenir Light"/>
+                <a:cs typeface="Avenir Light"/>
+              </a:rPr>
+              <a:t>buy</a:t>
             </a:r>
             <a:r>
               <a:rPr lang="it-IT" sz="1800" dirty="0" smtClean="0">
@@ -5162,37 +5172,7 @@
                 <a:latin typeface="Avenir Light"/>
                 <a:cs typeface="Avenir Light"/>
               </a:rPr>
-              <a:t>the right to </a:t>
-            </a:r>
-            <a:r>
-              <a:rPr lang="it-IT" sz="1800" dirty="0" err="1" smtClean="0">
-                <a:solidFill>
-                  <a:srgbClr val="FFFFFF"/>
-                </a:solidFill>
-                <a:latin typeface="Avenir Light"/>
-                <a:cs typeface="Avenir Light"/>
-              </a:rPr>
-              <a:t>buy</a:t>
-            </a:r>
-            <a:r>
-              <a:rPr lang="it-IT" sz="1800" dirty="0" smtClean="0">
-                <a:solidFill>
-                  <a:srgbClr val="FFFFFF"/>
-                </a:solidFill>
-                <a:latin typeface="Avenir Light"/>
-                <a:cs typeface="Avenir Light"/>
-              </a:rPr>
-              <a:t> or sell the </a:t>
-            </a:r>
-            <a:r>
-              <a:rPr lang="it-IT" sz="1800" dirty="0" smtClean="0">
-                <a:solidFill>
-                  <a:srgbClr val="FFFFFF"/>
-                </a:solidFill>
-                <a:latin typeface="Avenir Light"/>
-                <a:cs typeface="Avenir Light"/>
-              </a:rPr>
-              <a:t>“</a:t>
+              <a:t> or sell the “</a:t>
             </a:r>
             <a:r>
               <a:rPr lang="it-IT" sz="1800" dirty="0" err="1" smtClean="0">
@@ -7945,25 +7925,8 @@
                 <a:latin typeface="Avenir Light"/>
                 <a:cs typeface="Avenir Light"/>
               </a:rPr>
-              <a:t> </a:t>
-            </a:r>
-            <a:r>
-              <a:rPr lang="it-IT" sz="1600" dirty="0" smtClean="0">
-                <a:solidFill>
-                  <a:srgbClr val="FFFFFF"/>
-                </a:solidFill>
-                <a:latin typeface="Avenir Light"/>
-                <a:cs typeface="Avenir Light"/>
-              </a:rPr>
-              <a:t>maximum (green line)</a:t>
-            </a:r>
-            <a:endParaRPr lang="it-IT" sz="1600" dirty="0" smtClean="0">
-              <a:solidFill>
-                <a:srgbClr val="FFFFFF"/>
-              </a:solidFill>
-              <a:latin typeface="Avenir Light"/>
-              <a:cs typeface="Avenir Light"/>
-            </a:endParaRPr>
+              <a:t> maximum (green line)</a:t>
+            </a:r>
           </a:p>
           <a:p>
             <a:pPr marL="342900" indent="-342900" algn="just">
@@ -8021,7 +7984,17 @@
                 <a:latin typeface="Avenir Light"/>
                 <a:cs typeface="Avenir Light"/>
               </a:rPr>
-              <a:t> </a:t>
+              <a:t> minimum (</a:t>
+            </a:r>
+            <a:r>
+              <a:rPr lang="it-IT" sz="1600" dirty="0" err="1" smtClean="0">
+                <a:solidFill>
+                  <a:srgbClr val="FFFFFF"/>
+                </a:solidFill>
+                <a:latin typeface="Avenir Light"/>
+                <a:cs typeface="Avenir Light"/>
+              </a:rPr>
+              <a:t>red</a:t>
             </a:r>
             <a:r>
               <a:rPr lang="it-IT" sz="1600" dirty="0" smtClean="0">
@@ -8031,35 +8004,8 @@
                 <a:latin typeface="Avenir Light"/>
                 <a:cs typeface="Avenir Light"/>
               </a:rPr>
-              <a:t>minimum (</a:t>
-            </a:r>
-            <a:r>
-              <a:rPr lang="it-IT" sz="1600" dirty="0" err="1" smtClean="0">
-                <a:solidFill>
-                  <a:srgbClr val="FFFFFF"/>
-                </a:solidFill>
-                <a:latin typeface="Avenir Light"/>
-                <a:cs typeface="Avenir Light"/>
-              </a:rPr>
-              <a:t>red</a:t>
-            </a:r>
-            <a:r>
-              <a:rPr lang="it-IT" sz="1600" dirty="0" smtClean="0">
-                <a:solidFill>
-                  <a:srgbClr val="FFFFFF"/>
-                </a:solidFill>
-                <a:latin typeface="Avenir Light"/>
-                <a:cs typeface="Avenir Light"/>
-              </a:rPr>
               <a:t> line)</a:t>
             </a:r>
-            <a:endParaRPr lang="it-IT" sz="1600" dirty="0" smtClean="0">
-              <a:solidFill>
-                <a:srgbClr val="FFFFFF"/>
-              </a:solidFill>
-              <a:latin typeface="Avenir Light"/>
-              <a:cs typeface="Avenir Light"/>
-            </a:endParaRPr>
           </a:p>
           <a:p>
             <a:pPr marL="342900" indent="-342900" algn="just">
@@ -8243,25 +8189,8 @@
                 <a:latin typeface="Avenir Light"/>
                 <a:cs typeface="Avenir Light"/>
               </a:rPr>
-              <a:t> line)</a:t>
-            </a:r>
-            <a:r>
-              <a:rPr lang="it-IT" sz="1600" dirty="0" smtClean="0">
-                <a:solidFill>
-                  <a:srgbClr val="FFFFFF"/>
-                </a:solidFill>
-                <a:latin typeface="Avenir Light"/>
-                <a:cs typeface="Avenir Light"/>
-              </a:rPr>
-              <a:t> </a:t>
-            </a:r>
-            <a:endParaRPr lang="it-IT" sz="1600" dirty="0" smtClean="0">
-              <a:solidFill>
-                <a:srgbClr val="FFFFFF"/>
-              </a:solidFill>
-              <a:latin typeface="Avenir Light"/>
-              <a:cs typeface="Avenir Light"/>
-            </a:endParaRPr>
+              <a:t> line) </a:t>
+            </a:r>
           </a:p>
           <a:p>
             <a:pPr marL="342900" indent="-342900" algn="just">
@@ -9630,13 +9559,6 @@
               </a:rPr>
               <a:t>&amp;P 500 = 768.54 (+13.6%)</a:t>
             </a:r>
-            <a:endParaRPr lang="it-IT" sz="1400" dirty="0">
-              <a:solidFill>
-                <a:srgbClr val="FFFFFF"/>
-              </a:solidFill>
-              <a:latin typeface="Avenir Light"/>
-              <a:cs typeface="Avenir Light"/>
-            </a:endParaRPr>
           </a:p>
         </p:txBody>
       </p:sp>
@@ -12783,27 +12705,7 @@
                 <a:latin typeface="Avenir Light"/>
                 <a:cs typeface="Avenir Light"/>
               </a:rPr>
-              <a:t> by</a:t>
-            </a:r>
-            <a:r>
-              <a:rPr lang="it-IT" sz="1600" dirty="0" smtClean="0">
-                <a:solidFill>
-                  <a:srgbClr val="FFFFFF"/>
-                </a:solidFill>
-                <a:latin typeface="Avenir Light"/>
-                <a:cs typeface="Avenir Light"/>
-              </a:rPr>
-              <a:t> </a:t>
-            </a:r>
-            <a:r>
-              <a:rPr lang="it-IT" sz="1600" dirty="0" smtClean="0">
-                <a:solidFill>
-                  <a:srgbClr val="FFFFFF"/>
-                </a:solidFill>
-                <a:latin typeface="Avenir Light"/>
-                <a:cs typeface="Avenir Light"/>
-              </a:rPr>
-              <a:t>the model can be </a:t>
+              <a:t> by the model can be </a:t>
             </a:r>
             <a:r>
               <a:rPr lang="it-IT" sz="1600" dirty="0" err="1" smtClean="0">
@@ -12961,7 +12863,17 @@
                 <a:latin typeface="Avenir Light"/>
                 <a:cs typeface="Avenir Light"/>
               </a:rPr>
-              <a:t> from a </a:t>
+              <a:t> from a subset of the model are a </a:t>
+            </a:r>
+            <a:r>
+              <a:rPr lang="it-IT" sz="1600" dirty="0" err="1" smtClean="0">
+                <a:solidFill>
+                  <a:srgbClr val="FFFFFF"/>
+                </a:solidFill>
+                <a:latin typeface="Avenir Light"/>
+                <a:cs typeface="Avenir Light"/>
+              </a:rPr>
+              <a:t>good</a:t>
             </a:r>
             <a:r>
               <a:rPr lang="it-IT" sz="1600" dirty="0" smtClean="0">
@@ -12971,7 +12883,17 @@
                 <a:latin typeface="Avenir Light"/>
                 <a:cs typeface="Avenir Light"/>
               </a:rPr>
-              <a:t>subset </a:t>
+              <a:t> </a:t>
+            </a:r>
+            <a:r>
+              <a:rPr lang="it-IT" sz="1600" dirty="0" err="1" smtClean="0">
+                <a:solidFill>
+                  <a:srgbClr val="FFFFFF"/>
+                </a:solidFill>
+                <a:latin typeface="Avenir Light"/>
+                <a:cs typeface="Avenir Light"/>
+              </a:rPr>
+              <a:t>proof</a:t>
             </a:r>
             <a:r>
               <a:rPr lang="it-IT" sz="1600" dirty="0" smtClean="0">
@@ -12981,7 +12903,17 @@
                 <a:latin typeface="Avenir Light"/>
                 <a:cs typeface="Avenir Light"/>
               </a:rPr>
-              <a:t>of </a:t>
+              <a:t> of the model </a:t>
+            </a:r>
+            <a:r>
+              <a:rPr lang="it-IT" sz="1600" dirty="0" err="1" smtClean="0">
+                <a:solidFill>
+                  <a:srgbClr val="FFFFFF"/>
+                </a:solidFill>
+                <a:latin typeface="Avenir Light"/>
+                <a:cs typeface="Avenir Light"/>
+              </a:rPr>
+              <a:t>potential</a:t>
             </a:r>
             <a:r>
               <a:rPr lang="it-IT" sz="1600" dirty="0" smtClean="0">
@@ -12991,91 +12923,14 @@
                 <a:latin typeface="Avenir Light"/>
                 <a:cs typeface="Avenir Light"/>
               </a:rPr>
-              <a:t>the model </a:t>
-            </a:r>
-            <a:r>
-              <a:rPr lang="it-IT" sz="1600" dirty="0" smtClean="0">
-                <a:solidFill>
-                  <a:srgbClr val="FFFFFF"/>
-                </a:solidFill>
-                <a:latin typeface="Avenir Light"/>
-                <a:cs typeface="Avenir Light"/>
-              </a:rPr>
-              <a:t>are a </a:t>
-            </a:r>
-            <a:r>
-              <a:rPr lang="it-IT" sz="1600" dirty="0" err="1" smtClean="0">
-                <a:solidFill>
-                  <a:srgbClr val="FFFFFF"/>
-                </a:solidFill>
-                <a:latin typeface="Avenir Light"/>
-                <a:cs typeface="Avenir Light"/>
-              </a:rPr>
-              <a:t>good</a:t>
-            </a:r>
-            <a:r>
-              <a:rPr lang="it-IT" sz="1600" dirty="0" smtClean="0">
-                <a:solidFill>
-                  <a:srgbClr val="FFFFFF"/>
-                </a:solidFill>
-                <a:latin typeface="Avenir Light"/>
-                <a:cs typeface="Avenir Light"/>
-              </a:rPr>
-              <a:t> </a:t>
-            </a:r>
-            <a:r>
-              <a:rPr lang="it-IT" sz="1600" dirty="0" err="1" smtClean="0">
-                <a:solidFill>
-                  <a:srgbClr val="FFFFFF"/>
-                </a:solidFill>
-                <a:latin typeface="Avenir Light"/>
-                <a:cs typeface="Avenir Light"/>
-              </a:rPr>
-              <a:t>proof</a:t>
-            </a:r>
-            <a:r>
-              <a:rPr lang="it-IT" sz="1600" dirty="0" smtClean="0">
-                <a:solidFill>
-                  <a:srgbClr val="FFFFFF"/>
-                </a:solidFill>
-                <a:latin typeface="Avenir Light"/>
-                <a:cs typeface="Avenir Light"/>
-              </a:rPr>
-              <a:t> of the model </a:t>
-            </a:r>
-            <a:r>
-              <a:rPr lang="it-IT" sz="1600" dirty="0" err="1" smtClean="0">
-                <a:solidFill>
-                  <a:srgbClr val="FFFFFF"/>
-                </a:solidFill>
-                <a:latin typeface="Avenir Light"/>
-                <a:cs typeface="Avenir Light"/>
-              </a:rPr>
-              <a:t>potential</a:t>
-            </a:r>
-            <a:r>
-              <a:rPr lang="it-IT" sz="1600" dirty="0" smtClean="0">
-                <a:solidFill>
-                  <a:srgbClr val="FFFFFF"/>
-                </a:solidFill>
-                <a:latin typeface="Avenir Light"/>
-                <a:cs typeface="Avenir Light"/>
-              </a:rPr>
               <a:t>:</a:t>
             </a:r>
-            <a:endParaRPr lang="it-IT" sz="1600" dirty="0" smtClean="0">
-              <a:solidFill>
-                <a:srgbClr val="FFFFFF"/>
-              </a:solidFill>
-              <a:latin typeface="Avenir Light"/>
-              <a:cs typeface="Avenir Light"/>
-            </a:endParaRPr>
           </a:p>
         </p:txBody>
       </p:sp>
       <p:pic>
         <p:nvPicPr>
-          <p:cNvPr id="7" name="Immagine 6" descr="track.jpg"/>
+          <p:cNvPr id="3" name="Immagine 2" descr="track.jpg"/>
           <p:cNvPicPr>
             <a:picLocks noChangeAspect="1"/>
           </p:cNvPicPr>
@@ -13095,7 +12950,7 @@
         </p:blipFill>
         <p:spPr>
           <a:xfrm>
-            <a:off x="2424599" y="2684875"/>
+            <a:off x="2451108" y="2724045"/>
             <a:ext cx="4389120" cy="3520440"/>
           </a:xfrm>
           <a:prstGeom prst="rect">

</xml_diff>

<commit_message>
footer removed from pptx
</commit_message>
<xml_diff>
--- a/final_project/Metis Kojak.pptx
+++ b/final_project/Metis Kojak.pptx
@@ -1573,8 +1573,8 @@
           <a:bodyPr/>
           <a:lstStyle/>
           <a:p>
-            <a:fld id="{04F99F54-0049-5244-953B-4E00BBA61D33}" type="datetime1">
-              <a:rPr lang="x-none" smtClean="0"/>
+            <a:fld id="{AC0EFDF0-2707-C24F-8122-0BFB0DD454E3}" type="datetime1">
+              <a:rPr lang="Zyyy" smtClean="0"/>
               <a:t>24/06/15</a:t>
             </a:fld>
             <a:endParaRPr lang="it-IT"/>
@@ -1747,8 +1747,8 @@
           <a:bodyPr/>
           <a:lstStyle/>
           <a:p>
-            <a:fld id="{3CEA4816-DFB6-D046-9272-34FBBB758DC3}" type="datetime1">
-              <a:rPr lang="x-none" smtClean="0"/>
+            <a:fld id="{7277EB71-0BEE-0346-ADE2-57B4F02A490D}" type="datetime1">
+              <a:rPr lang="Zyyy" smtClean="0"/>
               <a:t>24/06/15</a:t>
             </a:fld>
             <a:endParaRPr lang="it-IT"/>
@@ -1931,8 +1931,8 @@
           <a:bodyPr/>
           <a:lstStyle/>
           <a:p>
-            <a:fld id="{DE1E0CD3-E5A4-0C46-A90D-E68799C9DBAD}" type="datetime1">
-              <a:rPr lang="x-none" smtClean="0"/>
+            <a:fld id="{1F1F64A8-3AE4-294D-9F3A-3DA12F5239BF}" type="datetime1">
+              <a:rPr lang="Zyyy" smtClean="0"/>
               <a:t>24/06/15</a:t>
             </a:fld>
             <a:endParaRPr lang="it-IT"/>
@@ -2105,8 +2105,8 @@
           <a:bodyPr/>
           <a:lstStyle/>
           <a:p>
-            <a:fld id="{34E5F666-D8A4-E043-BBA8-F9DBB0149C54}" type="datetime1">
-              <a:rPr lang="x-none" smtClean="0"/>
+            <a:fld id="{4428F211-70CB-7444-8B2C-A7DC0870090A}" type="datetime1">
+              <a:rPr lang="Zyyy" smtClean="0"/>
               <a:t>24/06/15</a:t>
             </a:fld>
             <a:endParaRPr lang="it-IT"/>
@@ -2355,8 +2355,8 @@
           <a:bodyPr/>
           <a:lstStyle/>
           <a:p>
-            <a:fld id="{7D17FDC4-B4F0-274C-899A-A740C1289A53}" type="datetime1">
-              <a:rPr lang="x-none" smtClean="0"/>
+            <a:fld id="{AA35CC6F-7336-1744-92A2-BA2DA8CA3AC5}" type="datetime1">
+              <a:rPr lang="Zyyy" smtClean="0"/>
               <a:t>24/06/15</a:t>
             </a:fld>
             <a:endParaRPr lang="it-IT"/>
@@ -2647,8 +2647,8 @@
           <a:bodyPr/>
           <a:lstStyle/>
           <a:p>
-            <a:fld id="{29F3F420-0932-A044-9D0E-7A23FDE9816D}" type="datetime1">
-              <a:rPr lang="x-none" smtClean="0"/>
+            <a:fld id="{10C8C155-1EB9-4F4A-8FE2-DDB815A46E3F}" type="datetime1">
+              <a:rPr lang="Zyyy" smtClean="0"/>
               <a:t>24/06/15</a:t>
             </a:fld>
             <a:endParaRPr lang="it-IT"/>
@@ -3073,8 +3073,8 @@
           <a:bodyPr/>
           <a:lstStyle/>
           <a:p>
-            <a:fld id="{77EFCFE9-29F8-6649-A783-7939F40A056A}" type="datetime1">
-              <a:rPr lang="x-none" smtClean="0"/>
+            <a:fld id="{6163184F-9FCF-6945-873F-2ADAD73CBADA}" type="datetime1">
+              <a:rPr lang="Zyyy" smtClean="0"/>
               <a:t>24/06/15</a:t>
             </a:fld>
             <a:endParaRPr lang="it-IT"/>
@@ -3195,8 +3195,8 @@
           <a:bodyPr/>
           <a:lstStyle/>
           <a:p>
-            <a:fld id="{70AB03B6-CBA2-BE4A-A7F5-30652FBC9E06}" type="datetime1">
-              <a:rPr lang="x-none" smtClean="0"/>
+            <a:fld id="{860A489D-396A-394A-96E1-57773C0D4D69}" type="datetime1">
+              <a:rPr lang="Zyyy" smtClean="0"/>
               <a:t>24/06/15</a:t>
             </a:fld>
             <a:endParaRPr lang="it-IT"/>
@@ -3294,8 +3294,8 @@
           <a:bodyPr/>
           <a:lstStyle/>
           <a:p>
-            <a:fld id="{0A3F665A-A66A-F545-87F8-53051B5D74E9}" type="datetime1">
-              <a:rPr lang="x-none" smtClean="0"/>
+            <a:fld id="{D7FDD959-CAA7-A449-A7CF-46E0D0288AB4}" type="datetime1">
+              <a:rPr lang="Zyyy" smtClean="0"/>
               <a:t>24/06/15</a:t>
             </a:fld>
             <a:endParaRPr lang="it-IT"/>
@@ -3575,8 +3575,8 @@
           <a:bodyPr/>
           <a:lstStyle/>
           <a:p>
-            <a:fld id="{5ECEBAAF-DFE5-5849-BC9C-7A7DF235CC45}" type="datetime1">
-              <a:rPr lang="x-none" smtClean="0"/>
+            <a:fld id="{33DFB1A3-61B1-6440-9491-8AF256238CC2}" type="datetime1">
+              <a:rPr lang="Zyyy" smtClean="0"/>
               <a:t>24/06/15</a:t>
             </a:fld>
             <a:endParaRPr lang="it-IT"/>
@@ -3832,8 +3832,8 @@
           <a:bodyPr/>
           <a:lstStyle/>
           <a:p>
-            <a:fld id="{E848CE0A-858B-2640-91E5-DA1440EEBC05}" type="datetime1">
-              <a:rPr lang="x-none" smtClean="0"/>
+            <a:fld id="{C18FD622-E8F5-5246-A55C-2F2FFCC5F284}" type="datetime1">
+              <a:rPr lang="Zyyy" smtClean="0"/>
               <a:t>24/06/15</a:t>
             </a:fld>
             <a:endParaRPr lang="it-IT"/>
@@ -4054,8 +4054,8 @@
             </a:lvl1pPr>
           </a:lstStyle>
           <a:p>
-            <a:fld id="{8554DD78-0100-C74F-B6DC-B2111832CB69}" type="datetime1">
-              <a:rPr lang="x-none" smtClean="0"/>
+            <a:fld id="{B99AB9C1-6EC4-1D4D-A5FC-F85E89D87E79}" type="datetime1">
+              <a:rPr lang="Zyyy" smtClean="0"/>
               <a:t>24/06/15</a:t>
             </a:fld>
             <a:endParaRPr lang="it-IT"/>
@@ -4165,7 +4165,7 @@
     <p:sldLayoutId id="2147483658" r:id="rId10"/>
     <p:sldLayoutId id="2147483659" r:id="rId11"/>
   </p:sldLayoutIdLst>
-  <p:hf sldNum="0" hdr="0" dt="0"/>
+  <p:hf sldNum="0" hdr="0" ftr="0" dt="0"/>
   <p:txStyles>
     <p:titleStyle>
       <a:lvl1pPr algn="ctr" defTabSz="457200" rtl="0" eaLnBrk="1" latinLnBrk="0" hangingPunct="1">
@@ -4446,7 +4446,7 @@
         </p:nvSpPr>
         <p:spPr>
           <a:xfrm>
-            <a:off x="1765720" y="1616480"/>
+            <a:off x="1707994" y="1799298"/>
             <a:ext cx="5748644" cy="3290685"/>
           </a:xfrm>
           <a:prstGeom prst="rect">
@@ -4692,37 +4692,6 @@
               <a:latin typeface="Avenir Light"/>
               <a:ea typeface="AppleGothic"/>
               <a:cs typeface="Avenir Light"/>
-            </a:endParaRPr>
-          </a:p>
-        </p:txBody>
-      </p:sp>
-      <p:sp>
-        <p:nvSpPr>
-          <p:cNvPr id="2" name="Segnaposto piè di pagina 1"/>
-          <p:cNvSpPr>
-            <a:spLocks noGrp="1"/>
-          </p:cNvSpPr>
-          <p:nvPr>
-            <p:ph type="ftr" sz="quarter" idx="11"/>
-          </p:nvPr>
-        </p:nvSpPr>
-        <p:spPr/>
-        <p:txBody>
-          <a:bodyPr/>
-          <a:lstStyle/>
-          <a:p>
-            <a:r>
-              <a:rPr lang="it-IT" smtClean="0">
-                <a:solidFill>
-                  <a:srgbClr val="FFFFFF"/>
-                </a:solidFill>
-              </a:rPr>
-              <a:t>Marco Lunardi - Final Project</a:t>
-            </a:r>
-            <a:endParaRPr lang="it-IT" dirty="0">
-              <a:solidFill>
-                <a:srgbClr val="FFFFFF"/>
-              </a:solidFill>
             </a:endParaRPr>
           </a:p>
         </p:txBody>
@@ -4794,37 +4763,6 @@
           <a:chExt cx="0" cy="0"/>
         </a:xfrm>
       </p:grpSpPr>
-      <p:sp>
-        <p:nvSpPr>
-          <p:cNvPr id="2" name="Segnaposto piè di pagina 1"/>
-          <p:cNvSpPr>
-            <a:spLocks noGrp="1"/>
-          </p:cNvSpPr>
-          <p:nvPr>
-            <p:ph type="ftr" sz="quarter" idx="11"/>
-          </p:nvPr>
-        </p:nvSpPr>
-        <p:spPr/>
-        <p:txBody>
-          <a:bodyPr/>
-          <a:lstStyle/>
-          <a:p>
-            <a:r>
-              <a:rPr lang="it-IT" smtClean="0">
-                <a:solidFill>
-                  <a:srgbClr val="FFFFFF"/>
-                </a:solidFill>
-              </a:rPr>
-              <a:t>Marco Lunardi - Final Project</a:t>
-            </a:r>
-            <a:endParaRPr lang="it-IT" dirty="0">
-              <a:solidFill>
-                <a:srgbClr val="FFFFFF"/>
-              </a:solidFill>
-            </a:endParaRPr>
-          </a:p>
-        </p:txBody>
-      </p:sp>
       <p:pic>
         <p:nvPicPr>
           <p:cNvPr id="5" name="Immagine 4" descr="metislogo.png"/>
@@ -4865,7 +4803,7 @@
         </p:nvSpPr>
         <p:spPr>
           <a:xfrm>
-            <a:off x="620009" y="240548"/>
+            <a:off x="620009" y="490720"/>
             <a:ext cx="8100222" cy="5849892"/>
           </a:xfrm>
           <a:prstGeom prst="rect">
@@ -5810,7 +5748,7 @@
         </p:nvSpPr>
         <p:spPr>
           <a:xfrm>
-            <a:off x="5769642" y="3194463"/>
+            <a:off x="5769642" y="3444635"/>
             <a:ext cx="339242" cy="516503"/>
           </a:xfrm>
           <a:prstGeom prst="upArrow">
@@ -5848,7 +5786,7 @@
         </p:nvSpPr>
         <p:spPr>
           <a:xfrm>
-            <a:off x="3197935" y="3194463"/>
+            <a:off x="3197935" y="3444635"/>
             <a:ext cx="339242" cy="516503"/>
           </a:xfrm>
           <a:prstGeom prst="upArrow">
@@ -5915,37 +5853,6 @@
           <a:chExt cx="0" cy="0"/>
         </a:xfrm>
       </p:grpSpPr>
-      <p:sp>
-        <p:nvSpPr>
-          <p:cNvPr id="2" name="Segnaposto piè di pagina 1"/>
-          <p:cNvSpPr>
-            <a:spLocks noGrp="1"/>
-          </p:cNvSpPr>
-          <p:nvPr>
-            <p:ph type="ftr" sz="quarter" idx="11"/>
-          </p:nvPr>
-        </p:nvSpPr>
-        <p:spPr/>
-        <p:txBody>
-          <a:bodyPr/>
-          <a:lstStyle/>
-          <a:p>
-            <a:r>
-              <a:rPr lang="it-IT" smtClean="0">
-                <a:solidFill>
-                  <a:srgbClr val="FFFFFF"/>
-                </a:solidFill>
-              </a:rPr>
-              <a:t>Marco Lunardi - Final Project</a:t>
-            </a:r>
-            <a:endParaRPr lang="it-IT" dirty="0">
-              <a:solidFill>
-                <a:srgbClr val="FFFFFF"/>
-              </a:solidFill>
-            </a:endParaRPr>
-          </a:p>
-        </p:txBody>
-      </p:sp>
       <p:pic>
         <p:nvPicPr>
           <p:cNvPr id="5" name="Immagine 4" descr="metislogo.png"/>
@@ -5986,7 +5893,7 @@
         </p:nvSpPr>
         <p:spPr>
           <a:xfrm>
-            <a:off x="620009" y="240548"/>
+            <a:off x="620009" y="481098"/>
             <a:ext cx="8100222" cy="5849892"/>
           </a:xfrm>
           <a:prstGeom prst="rect">
@@ -6191,7 +6098,37 @@
                 <a:latin typeface="Avenir Light"/>
                 <a:cs typeface="Avenir Light"/>
               </a:rPr>
-              <a:t> best to </a:t>
+              <a:t> </a:t>
+            </a:r>
+            <a:r>
+              <a:rPr lang="it-IT" sz="2400" dirty="0" err="1" smtClean="0">
+                <a:solidFill>
+                  <a:srgbClr val="FFFFFF"/>
+                </a:solidFill>
+                <a:latin typeface="Avenir Light"/>
+                <a:cs typeface="Avenir Light"/>
+              </a:rPr>
+              <a:t>it</a:t>
+            </a:r>
+            <a:r>
+              <a:rPr lang="it-IT" sz="2400" dirty="0" smtClean="0">
+                <a:solidFill>
+                  <a:srgbClr val="FFFFFF"/>
+                </a:solidFill>
+                <a:latin typeface="Avenir Light"/>
+                <a:cs typeface="Avenir Light"/>
+              </a:rPr>
+              <a:t> </a:t>
+            </a:r>
+            <a:r>
+              <a:rPr lang="it-IT" sz="2400" dirty="0" smtClean="0">
+                <a:solidFill>
+                  <a:srgbClr val="FFFFFF"/>
+                </a:solidFill>
+                <a:latin typeface="Avenir Light"/>
+                <a:cs typeface="Avenir Light"/>
+              </a:rPr>
+              <a:t>best to </a:t>
             </a:r>
             <a:r>
               <a:rPr lang="it-IT" sz="2400" dirty="0" err="1" smtClean="0">
@@ -6407,7 +6344,7 @@
         </p:blipFill>
         <p:spPr>
           <a:xfrm>
-            <a:off x="2082800" y="2379185"/>
+            <a:off x="2082800" y="2619735"/>
             <a:ext cx="4965700" cy="3568700"/>
           </a:xfrm>
           <a:prstGeom prst="rect">
@@ -6423,7 +6360,7 @@
         </p:nvSpPr>
         <p:spPr>
           <a:xfrm>
-            <a:off x="4637546" y="4859054"/>
+            <a:off x="4637546" y="5099604"/>
             <a:ext cx="242316" cy="442606"/>
           </a:xfrm>
           <a:prstGeom prst="upArrow">
@@ -6464,7 +6401,7 @@
         </p:nvSpPr>
         <p:spPr>
           <a:xfrm rot="10800000">
-            <a:off x="3003042" y="2838457"/>
+            <a:off x="3003042" y="3079007"/>
             <a:ext cx="242316" cy="432984"/>
           </a:xfrm>
           <a:prstGeom prst="upArrow">
@@ -6534,37 +6471,6 @@
           <a:chExt cx="0" cy="0"/>
         </a:xfrm>
       </p:grpSpPr>
-      <p:sp>
-        <p:nvSpPr>
-          <p:cNvPr id="2" name="Segnaposto piè di pagina 1"/>
-          <p:cNvSpPr>
-            <a:spLocks noGrp="1"/>
-          </p:cNvSpPr>
-          <p:nvPr>
-            <p:ph type="ftr" sz="quarter" idx="11"/>
-          </p:nvPr>
-        </p:nvSpPr>
-        <p:spPr/>
-        <p:txBody>
-          <a:bodyPr/>
-          <a:lstStyle/>
-          <a:p>
-            <a:r>
-              <a:rPr lang="it-IT" smtClean="0">
-                <a:solidFill>
-                  <a:srgbClr val="FFFFFF"/>
-                </a:solidFill>
-              </a:rPr>
-              <a:t>Marco Lunardi - Final Project</a:t>
-            </a:r>
-            <a:endParaRPr lang="it-IT" dirty="0">
-              <a:solidFill>
-                <a:srgbClr val="FFFFFF"/>
-              </a:solidFill>
-            </a:endParaRPr>
-          </a:p>
-        </p:txBody>
-      </p:sp>
       <p:pic>
         <p:nvPicPr>
           <p:cNvPr id="5" name="Immagine 4" descr="metislogo.png"/>
@@ -6605,7 +6511,7 @@
         </p:nvSpPr>
         <p:spPr>
           <a:xfrm>
-            <a:off x="904418" y="346388"/>
+            <a:off x="904418" y="731268"/>
             <a:ext cx="7418150" cy="5561236"/>
           </a:xfrm>
           <a:prstGeom prst="rect">
@@ -6793,7 +6699,7 @@
             </a:endParaRPr>
           </a:p>
           <a:p>
-            <a:endParaRPr lang="it-IT" sz="2400" dirty="0" smtClean="0">
+            <a:endParaRPr lang="it-IT" sz="2400" dirty="0">
               <a:solidFill>
                 <a:srgbClr val="FFFFFF"/>
               </a:solidFill>
@@ -6802,7 +6708,7 @@
             </a:endParaRPr>
           </a:p>
           <a:p>
-            <a:endParaRPr lang="it-IT" sz="2000" dirty="0">
+            <a:endParaRPr lang="it-IT" sz="1000" dirty="0">
               <a:solidFill>
                 <a:srgbClr val="FFFFFF"/>
               </a:solidFill>
@@ -7398,37 +7304,6 @@
           <a:chExt cx="0" cy="0"/>
         </a:xfrm>
       </p:grpSpPr>
-      <p:sp>
-        <p:nvSpPr>
-          <p:cNvPr id="2" name="Segnaposto piè di pagina 1"/>
-          <p:cNvSpPr>
-            <a:spLocks noGrp="1"/>
-          </p:cNvSpPr>
-          <p:nvPr>
-            <p:ph type="ftr" sz="quarter" idx="11"/>
-          </p:nvPr>
-        </p:nvSpPr>
-        <p:spPr/>
-        <p:txBody>
-          <a:bodyPr/>
-          <a:lstStyle/>
-          <a:p>
-            <a:r>
-              <a:rPr lang="it-IT" smtClean="0">
-                <a:solidFill>
-                  <a:srgbClr val="FFFFFF"/>
-                </a:solidFill>
-              </a:rPr>
-              <a:t>Marco Lunardi - Final Project</a:t>
-            </a:r>
-            <a:endParaRPr lang="it-IT" dirty="0">
-              <a:solidFill>
-                <a:srgbClr val="FFFFFF"/>
-              </a:solidFill>
-            </a:endParaRPr>
-          </a:p>
-        </p:txBody>
-      </p:sp>
       <p:pic>
         <p:nvPicPr>
           <p:cNvPr id="5" name="Immagine 4" descr="metislogo.png"/>
@@ -7469,7 +7344,7 @@
         </p:nvSpPr>
         <p:spPr>
           <a:xfrm>
-            <a:off x="620009" y="221302"/>
+            <a:off x="620009" y="481096"/>
             <a:ext cx="8100222" cy="5936705"/>
           </a:xfrm>
           <a:prstGeom prst="rect">
@@ -7647,14 +7522,14 @@
               <a:t>The </a:t>
             </a:r>
             <a:r>
-              <a:rPr lang="it-IT" sz="2400" dirty="0" err="1" smtClean="0">
-                <a:solidFill>
-                  <a:srgbClr val="FFFFFF"/>
-                </a:solidFill>
-                <a:latin typeface="Avenir Light"/>
-                <a:cs typeface="Avenir Light"/>
-              </a:rPr>
-              <a:t>Models</a:t>
+              <a:rPr lang="it-IT" sz="2400" dirty="0" smtClean="0">
+                <a:solidFill>
+                  <a:srgbClr val="FFFFFF"/>
+                </a:solidFill>
+                <a:latin typeface="Avenir Light"/>
+                <a:cs typeface="Avenir Light"/>
+              </a:rPr>
+              <a:t>Model</a:t>
             </a:r>
             <a:endParaRPr lang="it-IT" sz="2400" dirty="0" smtClean="0">
               <a:solidFill>
@@ -8444,7 +8319,7 @@
         </p:blipFill>
         <p:spPr>
           <a:xfrm>
-            <a:off x="5259736" y="2687085"/>
+            <a:off x="5259736" y="2946879"/>
             <a:ext cx="3252100" cy="2141220"/>
           </a:xfrm>
           <a:prstGeom prst="rect">
@@ -8489,37 +8364,6 @@
           <a:chExt cx="0" cy="0"/>
         </a:xfrm>
       </p:grpSpPr>
-      <p:sp>
-        <p:nvSpPr>
-          <p:cNvPr id="2" name="Segnaposto piè di pagina 1"/>
-          <p:cNvSpPr>
-            <a:spLocks noGrp="1"/>
-          </p:cNvSpPr>
-          <p:nvPr>
-            <p:ph type="ftr" sz="quarter" idx="11"/>
-          </p:nvPr>
-        </p:nvSpPr>
-        <p:spPr/>
-        <p:txBody>
-          <a:bodyPr/>
-          <a:lstStyle/>
-          <a:p>
-            <a:r>
-              <a:rPr lang="it-IT" smtClean="0">
-                <a:solidFill>
-                  <a:srgbClr val="FFFFFF"/>
-                </a:solidFill>
-              </a:rPr>
-              <a:t>Marco Lunardi - Final Project</a:t>
-            </a:r>
-            <a:endParaRPr lang="it-IT" dirty="0">
-              <a:solidFill>
-                <a:srgbClr val="FFFFFF"/>
-              </a:solidFill>
-            </a:endParaRPr>
-          </a:p>
-        </p:txBody>
-      </p:sp>
       <p:pic>
         <p:nvPicPr>
           <p:cNvPr id="5" name="Immagine 4" descr="metislogo.png"/>
@@ -8560,7 +8404,7 @@
         </p:nvSpPr>
         <p:spPr>
           <a:xfrm>
-            <a:off x="1193036" y="327139"/>
+            <a:off x="1193036" y="673531"/>
             <a:ext cx="6735025" cy="2424717"/>
           </a:xfrm>
           <a:prstGeom prst="rect">
@@ -9354,7 +9198,7 @@
         </p:blipFill>
         <p:spPr>
           <a:xfrm>
-            <a:off x="4452071" y="3218869"/>
+            <a:off x="4452071" y="3565261"/>
             <a:ext cx="3475990" cy="2498090"/>
           </a:xfrm>
           <a:prstGeom prst="rect">
@@ -9370,7 +9214,7 @@
         </p:nvSpPr>
         <p:spPr>
           <a:xfrm>
-            <a:off x="1193036" y="3906485"/>
+            <a:off x="1193036" y="4252877"/>
             <a:ext cx="3155866" cy="1169551"/>
           </a:xfrm>
           <a:prstGeom prst="rect">
@@ -9528,7 +9372,7 @@
               <a:t>expir</a:t>
             </a:r>
             <a:r>
-              <a:rPr lang="it-IT" sz="1400">
+              <a:rPr lang="it-IT" sz="1400" dirty="0">
                 <a:solidFill>
                   <a:srgbClr val="FFFFFF"/>
                 </a:solidFill>
@@ -9538,7 +9382,7 @@
               <a:t>.</a:t>
             </a:r>
             <a:r>
-              <a:rPr lang="it-IT" sz="1400" smtClean="0">
+              <a:rPr lang="it-IT" sz="1400" dirty="0" smtClean="0">
                 <a:solidFill>
                   <a:srgbClr val="FFFFFF"/>
                 </a:solidFill>
@@ -9590,7 +9434,7 @@
         </p:nvSpPr>
         <p:spPr>
           <a:xfrm>
-            <a:off x="6215467" y="4945651"/>
+            <a:off x="6215467" y="5292043"/>
             <a:ext cx="242316" cy="336765"/>
           </a:xfrm>
           <a:prstGeom prst="upArrow">
@@ -9631,7 +9475,7 @@
         </p:nvSpPr>
         <p:spPr>
           <a:xfrm rot="2400000">
-            <a:off x="7502195" y="4193593"/>
+            <a:off x="7502195" y="4539985"/>
             <a:ext cx="242316" cy="336765"/>
           </a:xfrm>
           <a:prstGeom prst="upArrow">
@@ -9701,37 +9545,6 @@
           <a:chExt cx="0" cy="0"/>
         </a:xfrm>
       </p:grpSpPr>
-      <p:sp>
-        <p:nvSpPr>
-          <p:cNvPr id="2" name="Segnaposto piè di pagina 1"/>
-          <p:cNvSpPr>
-            <a:spLocks noGrp="1"/>
-          </p:cNvSpPr>
-          <p:nvPr>
-            <p:ph type="ftr" sz="quarter" idx="11"/>
-          </p:nvPr>
-        </p:nvSpPr>
-        <p:spPr/>
-        <p:txBody>
-          <a:bodyPr/>
-          <a:lstStyle/>
-          <a:p>
-            <a:r>
-              <a:rPr lang="it-IT" smtClean="0">
-                <a:solidFill>
-                  <a:srgbClr val="FFFFFF"/>
-                </a:solidFill>
-              </a:rPr>
-              <a:t>Marco Lunardi - Final Project</a:t>
-            </a:r>
-            <a:endParaRPr lang="it-IT" dirty="0">
-              <a:solidFill>
-                <a:srgbClr val="FFFFFF"/>
-              </a:solidFill>
-            </a:endParaRPr>
-          </a:p>
-        </p:txBody>
-      </p:sp>
       <p:pic>
         <p:nvPicPr>
           <p:cNvPr id="5" name="Immagine 4" descr="metislogo.png"/>
@@ -9772,7 +9585,7 @@
         </p:nvSpPr>
         <p:spPr>
           <a:xfrm>
-            <a:off x="2004207" y="3967128"/>
+            <a:off x="2004207" y="4121080"/>
             <a:ext cx="1603946" cy="606181"/>
           </a:xfrm>
           <a:prstGeom prst="rect">
@@ -10001,7 +9814,7 @@
         </p:nvSpPr>
         <p:spPr>
           <a:xfrm>
-            <a:off x="3336097" y="3604852"/>
+            <a:off x="3336097" y="3758804"/>
             <a:ext cx="1371600" cy="1371600"/>
           </a:xfrm>
           <a:prstGeom prst="mathMinus">
@@ -10039,7 +9852,7 @@
         </p:nvCxnSpPr>
         <p:spPr>
           <a:xfrm>
-            <a:off x="3588905" y="2993240"/>
+            <a:off x="3588905" y="3147192"/>
             <a:ext cx="1739351" cy="0"/>
           </a:xfrm>
           <a:prstGeom prst="line">
@@ -10069,7 +9882,7 @@
         </p:nvCxnSpPr>
         <p:spPr>
           <a:xfrm>
-            <a:off x="3608153" y="5541948"/>
+            <a:off x="3608153" y="5695900"/>
             <a:ext cx="1640472" cy="0"/>
           </a:xfrm>
           <a:prstGeom prst="line">
@@ -10099,7 +9912,7 @@
         </p:nvSpPr>
         <p:spPr>
           <a:xfrm>
-            <a:off x="4763993" y="3021272"/>
+            <a:off x="4763993" y="3175224"/>
             <a:ext cx="484632" cy="2520676"/>
           </a:xfrm>
           <a:prstGeom prst="upDownArrow">
@@ -10137,7 +9950,7 @@
         </p:nvSpPr>
         <p:spPr>
           <a:xfrm rot="16200000">
-            <a:off x="3486942" y="3313831"/>
+            <a:off x="3486942" y="3467783"/>
             <a:ext cx="1069749" cy="484632"/>
           </a:xfrm>
           <a:prstGeom prst="stripedRightArrow">
@@ -10175,7 +9988,7 @@
         </p:nvSpPr>
         <p:spPr>
           <a:xfrm rot="5400000">
-            <a:off x="3497553" y="4775369"/>
+            <a:off x="3497553" y="4929321"/>
             <a:ext cx="1048527" cy="484632"/>
           </a:xfrm>
           <a:prstGeom prst="stripedRightArrow">
@@ -10215,7 +10028,7 @@
         </p:nvSpPr>
         <p:spPr>
           <a:xfrm>
-            <a:off x="5145955" y="3270628"/>
+            <a:off x="5145955" y="3424580"/>
             <a:ext cx="1747689" cy="1112617"/>
           </a:xfrm>
           <a:prstGeom prst="rect">
@@ -10549,7 +10362,7 @@
         </p:nvSpPr>
         <p:spPr>
           <a:xfrm>
-            <a:off x="3484476" y="2668508"/>
+            <a:off x="3484476" y="2822460"/>
             <a:ext cx="2049372" cy="403904"/>
           </a:xfrm>
           <a:prstGeom prst="rect">
@@ -10807,7 +10620,7 @@
         </p:nvSpPr>
         <p:spPr>
           <a:xfrm>
-            <a:off x="3484476" y="5541948"/>
+            <a:off x="3484476" y="5695900"/>
             <a:ext cx="2058993" cy="403904"/>
           </a:xfrm>
           <a:prstGeom prst="rect">
@@ -11065,7 +10878,7 @@
         </p:nvSpPr>
         <p:spPr>
           <a:xfrm>
-            <a:off x="1264647" y="230925"/>
+            <a:off x="1264647" y="384877"/>
             <a:ext cx="6509497" cy="567692"/>
           </a:xfrm>
           <a:prstGeom prst="rect">
@@ -11293,7 +11106,7 @@
         </p:nvCxnSpPr>
         <p:spPr>
           <a:xfrm flipV="1">
-            <a:off x="3608153" y="6031152"/>
+            <a:off x="3608153" y="6185104"/>
             <a:ext cx="4411562" cy="10682"/>
           </a:xfrm>
           <a:prstGeom prst="line">
@@ -11323,7 +11136,7 @@
         </p:nvSpPr>
         <p:spPr>
           <a:xfrm rot="16200000">
-            <a:off x="6489087" y="4612715"/>
+            <a:off x="6489087" y="4766667"/>
             <a:ext cx="1647903" cy="1188965"/>
           </a:xfrm>
           <a:prstGeom prst="notchedRightArrow">
@@ -11391,7 +11204,7 @@
         </p:nvSpPr>
         <p:spPr>
           <a:xfrm>
-            <a:off x="6433162" y="6041834"/>
+            <a:off x="6433162" y="6195786"/>
             <a:ext cx="1721247" cy="403904"/>
           </a:xfrm>
           <a:prstGeom prst="rect">
@@ -11629,7 +11442,7 @@
         </p:nvSpPr>
         <p:spPr>
           <a:xfrm>
-            <a:off x="7620162" y="5161561"/>
+            <a:off x="7620162" y="5315513"/>
             <a:ext cx="1077643" cy="403904"/>
           </a:xfrm>
           <a:prstGeom prst="rect">
@@ -11835,7 +11648,7 @@
         </p:nvSpPr>
         <p:spPr>
           <a:xfrm>
-            <a:off x="769717" y="812421"/>
+            <a:off x="769717" y="966373"/>
             <a:ext cx="7639444" cy="1384995"/>
           </a:xfrm>
           <a:prstGeom prst="rect">
@@ -12173,37 +11986,6 @@
           <a:chExt cx="0" cy="0"/>
         </a:xfrm>
       </p:grpSpPr>
-      <p:sp>
-        <p:nvSpPr>
-          <p:cNvPr id="2" name="Segnaposto piè di pagina 1"/>
-          <p:cNvSpPr>
-            <a:spLocks noGrp="1"/>
-          </p:cNvSpPr>
-          <p:nvPr>
-            <p:ph type="ftr" sz="quarter" idx="11"/>
-          </p:nvPr>
-        </p:nvSpPr>
-        <p:spPr/>
-        <p:txBody>
-          <a:bodyPr/>
-          <a:lstStyle/>
-          <a:p>
-            <a:r>
-              <a:rPr lang="it-IT" smtClean="0">
-                <a:solidFill>
-                  <a:srgbClr val="FFFFFF"/>
-                </a:solidFill>
-              </a:rPr>
-              <a:t>Marco Lunardi - Final Project</a:t>
-            </a:r>
-            <a:endParaRPr lang="it-IT" dirty="0">
-              <a:solidFill>
-                <a:srgbClr val="FFFFFF"/>
-              </a:solidFill>
-            </a:endParaRPr>
-          </a:p>
-        </p:txBody>
-      </p:sp>
       <p:pic>
         <p:nvPicPr>
           <p:cNvPr id="5" name="Immagine 4" descr="metislogo.png"/>
@@ -12970,8 +12752,8 @@
         </p:blipFill>
         <p:spPr>
           <a:xfrm>
-            <a:off x="2451108" y="2724045"/>
-            <a:ext cx="4389120" cy="3520440"/>
+            <a:off x="2324111" y="2789488"/>
+            <a:ext cx="4632960" cy="3716020"/>
           </a:xfrm>
           <a:prstGeom prst="rect">
             <a:avLst/>
@@ -13025,7 +12807,7 @@
         </p:nvSpPr>
         <p:spPr>
           <a:xfrm>
-            <a:off x="1765720" y="698681"/>
+            <a:off x="1765720" y="746791"/>
             <a:ext cx="5748644" cy="5648047"/>
           </a:xfrm>
           <a:prstGeom prst="rect">
@@ -13279,37 +13061,6 @@
               <a:latin typeface="Avenir Light"/>
               <a:ea typeface="AppleGothic"/>
               <a:cs typeface="Avenir Light"/>
-            </a:endParaRPr>
-          </a:p>
-        </p:txBody>
-      </p:sp>
-      <p:sp>
-        <p:nvSpPr>
-          <p:cNvPr id="2" name="Segnaposto piè di pagina 1"/>
-          <p:cNvSpPr>
-            <a:spLocks noGrp="1"/>
-          </p:cNvSpPr>
-          <p:nvPr>
-            <p:ph type="ftr" sz="quarter" idx="11"/>
-          </p:nvPr>
-        </p:nvSpPr>
-        <p:spPr/>
-        <p:txBody>
-          <a:bodyPr/>
-          <a:lstStyle/>
-          <a:p>
-            <a:r>
-              <a:rPr lang="it-IT" smtClean="0">
-                <a:solidFill>
-                  <a:srgbClr val="FFFFFF"/>
-                </a:solidFill>
-              </a:rPr>
-              <a:t>Marco Lunardi - Final Project</a:t>
-            </a:r>
-            <a:endParaRPr lang="it-IT" dirty="0">
-              <a:solidFill>
-                <a:srgbClr val="FFFFFF"/>
-              </a:solidFill>
             </a:endParaRPr>
           </a:p>
         </p:txBody>
@@ -13365,7 +13116,7 @@
         </p:blipFill>
         <p:spPr>
           <a:xfrm>
-            <a:off x="3694779" y="1858844"/>
+            <a:off x="3694779" y="1906954"/>
             <a:ext cx="1893600" cy="1908000"/>
           </a:xfrm>
           <a:prstGeom prst="rect">

</xml_diff>

<commit_message>
pptx remastered after first run-through
</commit_message>
<xml_diff>
--- a/final_project/Metis Kojak.pptx
+++ b/final_project/Metis Kojak.pptx
@@ -4696,36 +4696,6 @@
           </a:p>
         </p:txBody>
       </p:sp>
-      <p:pic>
-        <p:nvPicPr>
-          <p:cNvPr id="5" name="Immagine 4" descr="metislogo.png"/>
-          <p:cNvPicPr>
-            <a:picLocks noChangeAspect="1"/>
-          </p:cNvPicPr>
-          <p:nvPr/>
-        </p:nvPicPr>
-        <p:blipFill>
-          <a:blip r:embed="rId3">
-            <a:extLst>
-              <a:ext uri="{28A0092B-C50C-407E-A947-70E740481C1C}">
-                <a14:useLocalDpi xmlns:a14="http://schemas.microsoft.com/office/drawing/2010/main" val="0"/>
-              </a:ext>
-            </a:extLst>
-          </a:blip>
-          <a:stretch>
-            <a:fillRect/>
-          </a:stretch>
-        </p:blipFill>
-        <p:spPr>
-          <a:xfrm>
-            <a:off x="8511836" y="71505"/>
-            <a:ext cx="561340" cy="904240"/>
-          </a:xfrm>
-          <a:prstGeom prst="rect">
-            <a:avLst/>
-          </a:prstGeom>
-        </p:spPr>
-      </p:pic>
     </p:spTree>
     <p:extLst>
       <p:ext uri="{BB962C8B-B14F-4D97-AF65-F5344CB8AC3E}">
@@ -4763,36 +4733,6 @@
           <a:chExt cx="0" cy="0"/>
         </a:xfrm>
       </p:grpSpPr>
-      <p:pic>
-        <p:nvPicPr>
-          <p:cNvPr id="5" name="Immagine 4" descr="metislogo.png"/>
-          <p:cNvPicPr>
-            <a:picLocks noChangeAspect="1"/>
-          </p:cNvPicPr>
-          <p:nvPr/>
-        </p:nvPicPr>
-        <p:blipFill>
-          <a:blip r:embed="rId3">
-            <a:extLst>
-              <a:ext uri="{28A0092B-C50C-407E-A947-70E740481C1C}">
-                <a14:useLocalDpi xmlns:a14="http://schemas.microsoft.com/office/drawing/2010/main" val="0"/>
-              </a:ext>
-            </a:extLst>
-          </a:blip>
-          <a:stretch>
-            <a:fillRect/>
-          </a:stretch>
-        </p:blipFill>
-        <p:spPr>
-          <a:xfrm>
-            <a:off x="8511836" y="71505"/>
-            <a:ext cx="561340" cy="904240"/>
-          </a:xfrm>
-          <a:prstGeom prst="rect">
-            <a:avLst/>
-          </a:prstGeom>
-        </p:spPr>
-      </p:pic>
       <p:sp>
         <p:nvSpPr>
           <p:cNvPr id="6" name="Segnaposto contenuto 2"/>
@@ -5282,16 +5222,13 @@
               </a:rPr>
               <a:t>expiration</a:t>
             </a:r>
-            <a:r>
-              <a:rPr lang="it-IT" sz="1800" dirty="0" smtClean="0">
-                <a:solidFill>
-                  <a:srgbClr val="FFFFFF"/>
-                </a:solidFill>
-                <a:latin typeface="Avenir Light"/>
-                <a:cs typeface="Avenir Light"/>
-              </a:rPr>
-              <a:t>.</a:t>
-            </a:r>
+            <a:endParaRPr lang="it-IT" sz="1800" dirty="0" smtClean="0">
+              <a:solidFill>
+                <a:srgbClr val="FFFFFF"/>
+              </a:solidFill>
+              <a:latin typeface="Avenir Light"/>
+              <a:cs typeface="Avenir Light"/>
+            </a:endParaRPr>
           </a:p>
           <a:p>
             <a:pPr algn="just"/>
@@ -5853,36 +5790,6 @@
           <a:chExt cx="0" cy="0"/>
         </a:xfrm>
       </p:grpSpPr>
-      <p:pic>
-        <p:nvPicPr>
-          <p:cNvPr id="5" name="Immagine 4" descr="metislogo.png"/>
-          <p:cNvPicPr>
-            <a:picLocks noChangeAspect="1"/>
-          </p:cNvPicPr>
-          <p:nvPr/>
-        </p:nvPicPr>
-        <p:blipFill>
-          <a:blip r:embed="rId3">
-            <a:extLst>
-              <a:ext uri="{28A0092B-C50C-407E-A947-70E740481C1C}">
-                <a14:useLocalDpi xmlns:a14="http://schemas.microsoft.com/office/drawing/2010/main" val="0"/>
-              </a:ext>
-            </a:extLst>
-          </a:blip>
-          <a:stretch>
-            <a:fillRect/>
-          </a:stretch>
-        </p:blipFill>
-        <p:spPr>
-          <a:xfrm>
-            <a:off x="8511836" y="71505"/>
-            <a:ext cx="561340" cy="904240"/>
-          </a:xfrm>
-          <a:prstGeom prst="rect">
-            <a:avLst/>
-          </a:prstGeom>
-        </p:spPr>
-      </p:pic>
       <p:sp>
         <p:nvSpPr>
           <p:cNvPr id="6" name="Segnaposto contenuto 2"/>
@@ -6172,7 +6079,7 @@
             </a:r>
           </a:p>
           <a:p>
-            <a:endParaRPr lang="it-IT" sz="2000" dirty="0">
+            <a:endParaRPr lang="it-IT" sz="1200" dirty="0">
               <a:solidFill>
                 <a:srgbClr val="FFFFFF"/>
               </a:solidFill>
@@ -6182,7 +6089,7 @@
           </a:p>
           <a:p>
             <a:pPr algn="just"/>
-            <a:endParaRPr lang="it-IT" sz="1600" dirty="0" smtClean="0">
+            <a:endParaRPr lang="it-IT" sz="1000" dirty="0" smtClean="0">
               <a:solidFill>
                 <a:srgbClr val="FFFFFF"/>
               </a:solidFill>
@@ -6192,27 +6099,67 @@
           </a:p>
           <a:p>
             <a:r>
-              <a:rPr lang="it-IT" sz="1600" dirty="0" err="1" smtClean="0">
-                <a:solidFill>
-                  <a:srgbClr val="FFFFFF"/>
-                </a:solidFill>
-                <a:latin typeface="Avenir Light"/>
-                <a:cs typeface="Avenir Light"/>
-              </a:rPr>
-              <a:t>Most</a:t>
-            </a:r>
-            <a:r>
-              <a:rPr lang="it-IT" sz="1600" dirty="0" smtClean="0">
-                <a:solidFill>
-                  <a:srgbClr val="FFFFFF"/>
-                </a:solidFill>
-                <a:latin typeface="Avenir Light"/>
-                <a:cs typeface="Avenir Light"/>
-              </a:rPr>
-              <a:t> of option </a:t>
-            </a:r>
-            <a:r>
-              <a:rPr lang="it-IT" sz="1600" dirty="0" err="1" smtClean="0">
+              <a:rPr lang="it-IT" sz="1800" dirty="0" smtClean="0">
+                <a:solidFill>
+                  <a:srgbClr val="FFFFFF"/>
+                </a:solidFill>
+                <a:latin typeface="Avenir Light"/>
+                <a:cs typeface="Avenir Light"/>
+              </a:rPr>
+              <a:t>The </a:t>
+            </a:r>
+            <a:r>
+              <a:rPr lang="it-IT" sz="1800" dirty="0" err="1" smtClean="0">
+                <a:solidFill>
+                  <a:srgbClr val="FFFFFF"/>
+                </a:solidFill>
+                <a:latin typeface="Avenir Light"/>
+                <a:cs typeface="Avenir Light"/>
+              </a:rPr>
+              <a:t>most</a:t>
+            </a:r>
+            <a:r>
+              <a:rPr lang="it-IT" sz="1800" dirty="0" smtClean="0">
+                <a:solidFill>
+                  <a:srgbClr val="FFFFFF"/>
+                </a:solidFill>
+                <a:latin typeface="Avenir Light"/>
+                <a:cs typeface="Avenir Light"/>
+              </a:rPr>
+              <a:t> </a:t>
+            </a:r>
+            <a:r>
+              <a:rPr lang="it-IT" sz="1800" dirty="0" err="1" smtClean="0">
+                <a:solidFill>
+                  <a:srgbClr val="FFFFFF"/>
+                </a:solidFill>
+                <a:latin typeface="Avenir Light"/>
+                <a:cs typeface="Avenir Light"/>
+              </a:rPr>
+              <a:t>profitable</a:t>
+            </a:r>
+            <a:r>
+              <a:rPr lang="it-IT" sz="1800" dirty="0" smtClean="0">
+                <a:solidFill>
+                  <a:srgbClr val="FFFFFF"/>
+                </a:solidFill>
+                <a:latin typeface="Avenir Light"/>
+                <a:cs typeface="Avenir Light"/>
+              </a:rPr>
+              <a:t> </a:t>
+            </a:r>
+            <a:r>
+              <a:rPr lang="it-IT" sz="1800" dirty="0" smtClean="0">
+                <a:solidFill>
+                  <a:srgbClr val="FFFFFF"/>
+                </a:solidFill>
+                <a:latin typeface="Avenir Light"/>
+                <a:cs typeface="Avenir Light"/>
+              </a:rPr>
+              <a:t>option </a:t>
+            </a:r>
+            <a:r>
+              <a:rPr lang="it-IT" sz="1800" dirty="0" err="1" smtClean="0">
                 <a:solidFill>
                   <a:srgbClr val="FFFFFF"/>
                 </a:solidFill>
@@ -6222,7 +6169,7 @@
               <a:t>trades</a:t>
             </a:r>
             <a:r>
-              <a:rPr lang="it-IT" sz="1600" dirty="0" smtClean="0">
+              <a:rPr lang="it-IT" sz="1800" dirty="0" smtClean="0">
                 <a:solidFill>
                   <a:srgbClr val="FFFFFF"/>
                 </a:solidFill>
@@ -6231,8 +6178,17 @@
               </a:rPr>
               <a:t> are made on </a:t>
             </a:r>
-            <a:r>
-              <a:rPr lang="it-IT" sz="1600" dirty="0" err="1" smtClean="0">
+            <a:endParaRPr lang="it-IT" sz="1800" dirty="0" smtClean="0">
+              <a:solidFill>
+                <a:srgbClr val="FFFFFF"/>
+              </a:solidFill>
+              <a:latin typeface="Avenir Light"/>
+              <a:cs typeface="Avenir Light"/>
+            </a:endParaRPr>
+          </a:p>
+          <a:p>
+            <a:r>
+              <a:rPr lang="it-IT" sz="1800" dirty="0" err="1" smtClean="0">
                 <a:solidFill>
                   <a:srgbClr val="FFFFFF"/>
                 </a:solidFill>
@@ -6242,7 +6198,7 @@
               <a:t>price</a:t>
             </a:r>
             <a:r>
-              <a:rPr lang="it-IT" sz="1600" dirty="0" smtClean="0">
+              <a:rPr lang="it-IT" sz="1800" dirty="0" smtClean="0">
                 <a:solidFill>
                   <a:srgbClr val="FFFFFF"/>
                 </a:solidFill>
@@ -6252,7 +6208,7 @@
               <a:t> </a:t>
             </a:r>
             <a:r>
-              <a:rPr lang="it-IT" sz="1600" dirty="0" err="1" smtClean="0">
+              <a:rPr lang="it-IT" sz="1800" dirty="0" err="1" smtClean="0">
                 <a:solidFill>
                   <a:srgbClr val="FFFFFF"/>
                 </a:solidFill>
@@ -6262,7 +6218,7 @@
               <a:t>minimums</a:t>
             </a:r>
             <a:r>
-              <a:rPr lang="it-IT" sz="1600" dirty="0" smtClean="0">
+              <a:rPr lang="it-IT" sz="1800" dirty="0" smtClean="0">
                 <a:solidFill>
                   <a:srgbClr val="FFFFFF"/>
                 </a:solidFill>
@@ -6272,7 +6228,7 @@
               <a:t> and </a:t>
             </a:r>
             <a:r>
-              <a:rPr lang="it-IT" sz="1600" dirty="0" err="1" smtClean="0">
+              <a:rPr lang="it-IT" sz="1800" dirty="0" err="1" smtClean="0">
                 <a:solidFill>
                   <a:srgbClr val="FFFFFF"/>
                 </a:solidFill>
@@ -6282,7 +6238,7 @@
               <a:t>maximums</a:t>
             </a:r>
             <a:r>
-              <a:rPr lang="it-IT" sz="1600" dirty="0" smtClean="0">
+              <a:rPr lang="it-IT" sz="1800" dirty="0" smtClean="0">
                 <a:solidFill>
                   <a:srgbClr val="FFFFFF"/>
                 </a:solidFill>
@@ -6331,7 +6287,7 @@
           <p:nvPr/>
         </p:nvPicPr>
         <p:blipFill>
-          <a:blip r:embed="rId4">
+          <a:blip r:embed="rId3">
             <a:extLst>
               <a:ext uri="{28A0092B-C50C-407E-A947-70E740481C1C}">
                 <a14:useLocalDpi xmlns:a14="http://schemas.microsoft.com/office/drawing/2010/main" val="0"/>
@@ -6471,36 +6427,6 @@
           <a:chExt cx="0" cy="0"/>
         </a:xfrm>
       </p:grpSpPr>
-      <p:pic>
-        <p:nvPicPr>
-          <p:cNvPr id="5" name="Immagine 4" descr="metislogo.png"/>
-          <p:cNvPicPr>
-            <a:picLocks noChangeAspect="1"/>
-          </p:cNvPicPr>
-          <p:nvPr/>
-        </p:nvPicPr>
-        <p:blipFill>
-          <a:blip r:embed="rId3">
-            <a:extLst>
-              <a:ext uri="{28A0092B-C50C-407E-A947-70E740481C1C}">
-                <a14:useLocalDpi xmlns:a14="http://schemas.microsoft.com/office/drawing/2010/main" val="0"/>
-              </a:ext>
-            </a:extLst>
-          </a:blip>
-          <a:stretch>
-            <a:fillRect/>
-          </a:stretch>
-        </p:blipFill>
-        <p:spPr>
-          <a:xfrm>
-            <a:off x="8511836" y="71505"/>
-            <a:ext cx="561340" cy="904240"/>
-          </a:xfrm>
-          <a:prstGeom prst="rect">
-            <a:avLst/>
-          </a:prstGeom>
-        </p:spPr>
-      </p:pic>
       <p:sp>
         <p:nvSpPr>
           <p:cNvPr id="6" name="Segnaposto contenuto 2"/>
@@ -6511,8 +6437,8 @@
         </p:nvSpPr>
         <p:spPr>
           <a:xfrm>
-            <a:off x="904418" y="731268"/>
-            <a:ext cx="7418150" cy="5561236"/>
+            <a:off x="356627" y="513793"/>
+            <a:ext cx="8454665" cy="5561236"/>
           </a:xfrm>
           <a:prstGeom prst="rect">
             <a:avLst/>
@@ -6722,7 +6648,7 @@
               <a:buChar char="•"/>
             </a:pPr>
             <a:r>
-              <a:rPr lang="it-IT" sz="1600" dirty="0">
+              <a:rPr lang="it-IT" sz="1800" dirty="0">
                 <a:solidFill>
                   <a:srgbClr val="FFFFFF"/>
                 </a:solidFill>
@@ -6732,7 +6658,7 @@
               <a:t>35 </a:t>
             </a:r>
             <a:r>
-              <a:rPr lang="it-IT" sz="1600" dirty="0" err="1" smtClean="0">
+              <a:rPr lang="it-IT" sz="1800" dirty="0" err="1" smtClean="0">
                 <a:solidFill>
                   <a:srgbClr val="FFFFFF"/>
                 </a:solidFill>
@@ -6742,7 +6668,7 @@
               <a:t>years</a:t>
             </a:r>
             <a:r>
-              <a:rPr lang="it-IT" sz="1600" dirty="0" smtClean="0">
+              <a:rPr lang="it-IT" sz="1800" dirty="0" smtClean="0">
                 <a:solidFill>
                   <a:srgbClr val="FFFFFF"/>
                 </a:solidFill>
@@ -6752,7 +6678,7 @@
               <a:t> </a:t>
             </a:r>
             <a:r>
-              <a:rPr lang="it-IT" sz="1600" dirty="0">
+              <a:rPr lang="it-IT" sz="1800" dirty="0">
                 <a:solidFill>
                   <a:srgbClr val="FFFFFF"/>
                 </a:solidFill>
@@ -6762,7 +6688,7 @@
               <a:t>of </a:t>
             </a:r>
             <a:r>
-              <a:rPr lang="it-IT" sz="1600" dirty="0" err="1">
+              <a:rPr lang="it-IT" sz="1800" dirty="0" err="1">
                 <a:solidFill>
                   <a:srgbClr val="FFFFFF"/>
                 </a:solidFill>
@@ -6772,7 +6698,7 @@
               <a:t>daily</a:t>
             </a:r>
             <a:r>
-              <a:rPr lang="it-IT" sz="1600" dirty="0">
+              <a:rPr lang="it-IT" sz="1800" dirty="0">
                 <a:solidFill>
                   <a:srgbClr val="FFFFFF"/>
                 </a:solidFill>
@@ -6782,7 +6708,7 @@
               <a:t> and </a:t>
             </a:r>
             <a:r>
-              <a:rPr lang="it-IT" sz="1600" dirty="0" err="1">
+              <a:rPr lang="it-IT" sz="1800" dirty="0" err="1">
                 <a:solidFill>
                   <a:srgbClr val="FFFFFF"/>
                 </a:solidFill>
@@ -6792,7 +6718,7 @@
               <a:t>weekly</a:t>
             </a:r>
             <a:r>
-              <a:rPr lang="it-IT" sz="1600" dirty="0">
+              <a:rPr lang="it-IT" sz="1800" dirty="0">
                 <a:solidFill>
                   <a:srgbClr val="FFFFFF"/>
                 </a:solidFill>
@@ -6802,7 +6728,7 @@
               <a:t> S&amp;P 500 </a:t>
             </a:r>
             <a:r>
-              <a:rPr lang="it-IT" sz="1600" dirty="0" err="1" smtClean="0">
+              <a:rPr lang="it-IT" sz="1800" dirty="0" err="1" smtClean="0">
                 <a:solidFill>
                   <a:srgbClr val="FFFFFF"/>
                 </a:solidFill>
@@ -6812,7 +6738,7 @@
               <a:t>index</a:t>
             </a:r>
             <a:r>
-              <a:rPr lang="it-IT" sz="1600" dirty="0" smtClean="0">
+              <a:rPr lang="it-IT" sz="1800" dirty="0" smtClean="0">
                 <a:solidFill>
                   <a:srgbClr val="FFFFFF"/>
                 </a:solidFill>
@@ -6827,7 +6753,7 @@
               <a:buFont typeface="Arial"/>
               <a:buChar char="•"/>
             </a:pPr>
-            <a:endParaRPr lang="it-IT" sz="1600" dirty="0">
+            <a:endParaRPr lang="it-IT" sz="1800" dirty="0">
               <a:solidFill>
                 <a:srgbClr val="FFFFFF"/>
               </a:solidFill>
@@ -6841,7 +6767,7 @@
               <a:buChar char="•"/>
             </a:pPr>
             <a:r>
-              <a:rPr lang="it-IT" sz="1600" dirty="0">
+              <a:rPr lang="it-IT" sz="1800" dirty="0">
                 <a:solidFill>
                   <a:srgbClr val="FFFFFF"/>
                 </a:solidFill>
@@ -6851,7 +6777,7 @@
               <a:t>25 </a:t>
             </a:r>
             <a:r>
-              <a:rPr lang="it-IT" sz="1600" dirty="0" err="1">
+              <a:rPr lang="it-IT" sz="1800" dirty="0" err="1">
                 <a:solidFill>
                   <a:srgbClr val="FFFFFF"/>
                 </a:solidFill>
@@ -6861,7 +6787,7 @@
               <a:t>years</a:t>
             </a:r>
             <a:r>
-              <a:rPr lang="it-IT" sz="1600" dirty="0">
+              <a:rPr lang="it-IT" sz="1800" dirty="0">
                 <a:solidFill>
                   <a:srgbClr val="FFFFFF"/>
                 </a:solidFill>
@@ -6871,7 +6797,7 @@
               <a:t> of </a:t>
             </a:r>
             <a:r>
-              <a:rPr lang="it-IT" sz="1600" dirty="0" err="1">
+              <a:rPr lang="it-IT" sz="1800" dirty="0" err="1">
                 <a:solidFill>
                   <a:srgbClr val="FFFFFF"/>
                 </a:solidFill>
@@ -6881,7 +6807,7 @@
               <a:t>daily</a:t>
             </a:r>
             <a:r>
-              <a:rPr lang="it-IT" sz="1600" dirty="0">
+              <a:rPr lang="it-IT" sz="1800" dirty="0">
                 <a:solidFill>
                   <a:srgbClr val="FFFFFF"/>
                 </a:solidFill>
@@ -6891,7 +6817,7 @@
               <a:t> data on </a:t>
             </a:r>
             <a:r>
-              <a:rPr lang="it-IT" sz="1600" dirty="0" err="1">
+              <a:rPr lang="it-IT" sz="1800" dirty="0" err="1">
                 <a:solidFill>
                   <a:srgbClr val="FFFFFF"/>
                 </a:solidFill>
@@ -6901,7 +6827,7 @@
               <a:t>options</a:t>
             </a:r>
             <a:r>
-              <a:rPr lang="it-IT" sz="1600" dirty="0">
+              <a:rPr lang="it-IT" sz="1800" dirty="0">
                 <a:solidFill>
                   <a:srgbClr val="FFFFFF"/>
                 </a:solidFill>
@@ -6911,7 +6837,7 @@
               <a:t> on S&amp;P </a:t>
             </a:r>
             <a:r>
-              <a:rPr lang="it-IT" sz="1600" dirty="0" smtClean="0">
+              <a:rPr lang="it-IT" sz="1800" dirty="0" smtClean="0">
                 <a:solidFill>
                   <a:srgbClr val="FFFFFF"/>
                 </a:solidFill>
@@ -6926,7 +6852,7 @@
               <a:buFont typeface="Arial"/>
               <a:buChar char="•"/>
             </a:pPr>
-            <a:endParaRPr lang="it-IT" sz="1600" dirty="0" smtClean="0">
+            <a:endParaRPr lang="it-IT" sz="1800" dirty="0" smtClean="0">
               <a:solidFill>
                 <a:srgbClr val="FFFFFF"/>
               </a:solidFill>
@@ -6940,7 +6866,7 @@
               <a:buChar char="•"/>
             </a:pPr>
             <a:r>
-              <a:rPr lang="it-IT" sz="1600" dirty="0" smtClean="0">
+              <a:rPr lang="it-IT" sz="1800" dirty="0" smtClean="0">
                 <a:solidFill>
                   <a:srgbClr val="FFFFFF"/>
                 </a:solidFill>
@@ -6950,7 +6876,7 @@
               <a:t>426 </a:t>
             </a:r>
             <a:r>
-              <a:rPr lang="it-IT" sz="1600" dirty="0" err="1" smtClean="0">
+              <a:rPr lang="it-IT" sz="1800" dirty="0" err="1" smtClean="0">
                 <a:solidFill>
                   <a:srgbClr val="FFFFFF"/>
                 </a:solidFill>
@@ -6960,7 +6886,7 @@
               <a:t>samples</a:t>
             </a:r>
             <a:r>
-              <a:rPr lang="it-IT" sz="1600" dirty="0" smtClean="0">
+              <a:rPr lang="it-IT" sz="1800" dirty="0" smtClean="0">
                 <a:solidFill>
                   <a:srgbClr val="FFFFFF"/>
                 </a:solidFill>
@@ -6970,7 +6896,7 @@
               <a:t> (</a:t>
             </a:r>
             <a:r>
-              <a:rPr lang="it-IT" sz="1600" dirty="0" err="1" smtClean="0">
+              <a:rPr lang="it-IT" sz="1800" dirty="0" err="1" smtClean="0">
                 <a:solidFill>
                   <a:srgbClr val="FFFFFF"/>
                 </a:solidFill>
@@ -6980,7 +6906,7 @@
               <a:t>months</a:t>
             </a:r>
             <a:r>
-              <a:rPr lang="it-IT" sz="1600" dirty="0" smtClean="0">
+              <a:rPr lang="it-IT" sz="1800" dirty="0" smtClean="0">
                 <a:solidFill>
                   <a:srgbClr val="FFFFFF"/>
                 </a:solidFill>
@@ -6990,7 +6916,7 @@
               <a:t>) to </a:t>
             </a:r>
             <a:r>
-              <a:rPr lang="it-IT" sz="1600" dirty="0" err="1" smtClean="0">
+              <a:rPr lang="it-IT" sz="1800" dirty="0" err="1" smtClean="0">
                 <a:solidFill>
                   <a:srgbClr val="FFFFFF"/>
                 </a:solidFill>
@@ -7000,7 +6926,7 @@
               <a:t>train</a:t>
             </a:r>
             <a:r>
-              <a:rPr lang="it-IT" sz="1600" dirty="0" smtClean="0">
+              <a:rPr lang="it-IT" sz="1800" dirty="0" smtClean="0">
                 <a:solidFill>
                   <a:srgbClr val="FFFFFF"/>
                 </a:solidFill>
@@ -7015,7 +6941,7 @@
               <a:buFont typeface="Arial"/>
               <a:buChar char="•"/>
             </a:pPr>
-            <a:endParaRPr lang="it-IT" sz="1600" dirty="0">
+            <a:endParaRPr lang="it-IT" sz="1800" dirty="0">
               <a:solidFill>
                 <a:srgbClr val="FFFFFF"/>
               </a:solidFill>
@@ -7029,7 +6955,7 @@
               <a:buChar char="•"/>
             </a:pPr>
             <a:r>
-              <a:rPr lang="it-IT" sz="1600" dirty="0" smtClean="0">
+              <a:rPr lang="it-IT" sz="1800" dirty="0" smtClean="0">
                 <a:solidFill>
                   <a:srgbClr val="FFFFFF"/>
                 </a:solidFill>
@@ -7039,7 +6965,7 @@
               <a:t>32 input </a:t>
             </a:r>
             <a:r>
-              <a:rPr lang="it-IT" sz="1600" dirty="0" err="1" smtClean="0">
+              <a:rPr lang="it-IT" sz="1800" dirty="0" err="1" smtClean="0">
                 <a:solidFill>
                   <a:srgbClr val="FFFFFF"/>
                 </a:solidFill>
@@ -7049,7 +6975,7 @@
               <a:t>variables</a:t>
             </a:r>
             <a:r>
-              <a:rPr lang="it-IT" sz="1600" dirty="0" smtClean="0">
+              <a:rPr lang="it-IT" sz="1800" dirty="0" smtClean="0">
                 <a:solidFill>
                   <a:srgbClr val="FFFFFF"/>
                 </a:solidFill>
@@ -7059,7 +6985,7 @@
               <a:t>: </a:t>
             </a:r>
             <a:r>
-              <a:rPr lang="it-IT" sz="1600" dirty="0" err="1" smtClean="0">
+              <a:rPr lang="it-IT" sz="1800" dirty="0" err="1" smtClean="0">
                 <a:solidFill>
                   <a:srgbClr val="FFFFFF"/>
                 </a:solidFill>
@@ -7069,7 +6995,7 @@
               <a:t>mostly</a:t>
             </a:r>
             <a:r>
-              <a:rPr lang="it-IT" sz="1600" dirty="0" smtClean="0">
+              <a:rPr lang="it-IT" sz="1800" dirty="0" smtClean="0">
                 <a:solidFill>
                   <a:srgbClr val="FFFFFF"/>
                 </a:solidFill>
@@ -7079,7 +7005,7 @@
               <a:t> </a:t>
             </a:r>
             <a:r>
-              <a:rPr lang="it-IT" sz="1600" dirty="0" err="1">
+              <a:rPr lang="it-IT" sz="1800" dirty="0" err="1">
                 <a:solidFill>
                   <a:srgbClr val="FFFFFF"/>
                 </a:solidFill>
@@ -7089,7 +7015,7 @@
               <a:t>m</a:t>
             </a:r>
             <a:r>
-              <a:rPr lang="it-IT" sz="1600" dirty="0" err="1" smtClean="0">
+              <a:rPr lang="it-IT" sz="1800" dirty="0" err="1" smtClean="0">
                 <a:solidFill>
                   <a:srgbClr val="FFFFFF"/>
                 </a:solidFill>
@@ -7099,7 +7025,7 @@
               <a:t>oving</a:t>
             </a:r>
             <a:r>
-              <a:rPr lang="it-IT" sz="1600" dirty="0" smtClean="0">
+              <a:rPr lang="it-IT" sz="1800" dirty="0" smtClean="0">
                 <a:solidFill>
                   <a:srgbClr val="FFFFFF"/>
                 </a:solidFill>
@@ -7109,7 +7035,7 @@
               <a:t> </a:t>
             </a:r>
             <a:r>
-              <a:rPr lang="it-IT" sz="1600" dirty="0" err="1" smtClean="0">
+              <a:rPr lang="it-IT" sz="1800" dirty="0" err="1" smtClean="0">
                 <a:solidFill>
                   <a:srgbClr val="FFFFFF"/>
                 </a:solidFill>
@@ -7119,7 +7045,7 @@
               <a:t>averages</a:t>
             </a:r>
             <a:r>
-              <a:rPr lang="it-IT" sz="1600" dirty="0" smtClean="0">
+              <a:rPr lang="it-IT" sz="1800" dirty="0" smtClean="0">
                 <a:solidFill>
                   <a:srgbClr val="FFFFFF"/>
                 </a:solidFill>
@@ -7129,7 +7055,7 @@
               <a:t> and some </a:t>
             </a:r>
             <a:r>
-              <a:rPr lang="it-IT" sz="1600" dirty="0" err="1" smtClean="0">
+              <a:rPr lang="it-IT" sz="1800" dirty="0" err="1" smtClean="0">
                 <a:solidFill>
                   <a:srgbClr val="FFFFFF"/>
                 </a:solidFill>
@@ -7139,7 +7065,7 @@
               <a:t>customized</a:t>
             </a:r>
             <a:r>
-              <a:rPr lang="it-IT" sz="1600" dirty="0" smtClean="0">
+              <a:rPr lang="it-IT" sz="1800" dirty="0" smtClean="0">
                 <a:solidFill>
                   <a:srgbClr val="FFFFFF"/>
                 </a:solidFill>
@@ -7149,7 +7075,7 @@
               <a:t> </a:t>
             </a:r>
             <a:r>
-              <a:rPr lang="it-IT" sz="1600" dirty="0" err="1" smtClean="0">
+              <a:rPr lang="it-IT" sz="1800" dirty="0" err="1" smtClean="0">
                 <a:solidFill>
                   <a:srgbClr val="FFFFFF"/>
                 </a:solidFill>
@@ -7158,7 +7084,7 @@
               </a:rPr>
               <a:t>indicators</a:t>
             </a:r>
-            <a:endParaRPr lang="it-IT" sz="1600" dirty="0">
+            <a:endParaRPr lang="it-IT" sz="1800" dirty="0">
               <a:solidFill>
                 <a:srgbClr val="FFFFFF"/>
               </a:solidFill>
@@ -7168,7 +7094,7 @@
           </a:p>
           <a:p>
             <a:pPr algn="just"/>
-            <a:endParaRPr lang="it-IT" sz="1600" dirty="0" smtClean="0">
+            <a:endParaRPr lang="it-IT" sz="1800" dirty="0" smtClean="0">
               <a:solidFill>
                 <a:srgbClr val="FFFFFF"/>
               </a:solidFill>
@@ -7178,7 +7104,7 @@
           </a:p>
           <a:p>
             <a:pPr algn="just"/>
-            <a:endParaRPr lang="it-IT" sz="1600" dirty="0" smtClean="0">
+            <a:endParaRPr lang="it-IT" sz="1800" dirty="0" smtClean="0">
               <a:solidFill>
                 <a:srgbClr val="FFFFFF"/>
               </a:solidFill>
@@ -7188,7 +7114,7 @@
           </a:p>
           <a:p>
             <a:pPr algn="just"/>
-            <a:endParaRPr lang="it-IT" sz="1600" dirty="0">
+            <a:endParaRPr lang="it-IT" sz="1800" dirty="0" smtClean="0">
               <a:solidFill>
                 <a:srgbClr val="FFFFFF"/>
               </a:solidFill>
@@ -7197,8 +7123,18 @@
             </a:endParaRPr>
           </a:p>
           <a:p>
-            <a:r>
-              <a:rPr lang="it-IT" sz="1600" dirty="0" err="1" smtClean="0">
+            <a:pPr algn="just"/>
+            <a:endParaRPr lang="it-IT" sz="1800" dirty="0">
+              <a:solidFill>
+                <a:srgbClr val="FFFFFF"/>
+              </a:solidFill>
+              <a:latin typeface="Avenir Light"/>
+              <a:cs typeface="Avenir Light"/>
+            </a:endParaRPr>
+          </a:p>
+          <a:p>
+            <a:r>
+              <a:rPr lang="it-IT" sz="1800" dirty="0" err="1" smtClean="0">
                 <a:solidFill>
                   <a:srgbClr val="FFFFFF"/>
                 </a:solidFill>
@@ -7208,7 +7144,7 @@
               <a:t>All</a:t>
             </a:r>
             <a:r>
-              <a:rPr lang="it-IT" sz="1600" dirty="0" smtClean="0">
+              <a:rPr lang="it-IT" sz="1800" dirty="0" smtClean="0">
                 <a:solidFill>
                   <a:srgbClr val="FFFFFF"/>
                 </a:solidFill>
@@ -7218,7 +7154,7 @@
               <a:t> data </a:t>
             </a:r>
             <a:r>
-              <a:rPr lang="it-IT" sz="1600" dirty="0" err="1" smtClean="0">
+              <a:rPr lang="it-IT" sz="1800" dirty="0" err="1" smtClean="0">
                 <a:solidFill>
                   <a:srgbClr val="FFFFFF"/>
                 </a:solidFill>
@@ -7228,7 +7164,7 @@
               <a:t>available</a:t>
             </a:r>
             <a:r>
-              <a:rPr lang="it-IT" sz="1600" dirty="0" smtClean="0">
+              <a:rPr lang="it-IT" sz="1800" dirty="0" smtClean="0">
                 <a:solidFill>
                   <a:srgbClr val="FFFFFF"/>
                 </a:solidFill>
@@ -7238,7 +7174,7 @@
               <a:t> for free (Google Finance, Yahoo </a:t>
             </a:r>
             <a:r>
-              <a:rPr lang="it-IT" sz="1600" dirty="0" err="1" smtClean="0">
+              <a:rPr lang="it-IT" sz="1800" dirty="0" err="1" smtClean="0">
                 <a:solidFill>
                   <a:srgbClr val="FFFFFF"/>
                 </a:solidFill>
@@ -7248,7 +7184,7 @@
               <a:t>finance</a:t>
             </a:r>
             <a:r>
-              <a:rPr lang="it-IT" sz="1600" dirty="0" smtClean="0">
+              <a:rPr lang="it-IT" sz="1800" dirty="0" smtClean="0">
                 <a:solidFill>
                   <a:srgbClr val="FFFFFF"/>
                 </a:solidFill>
@@ -7257,7 +7193,7 @@
               </a:rPr>
               <a:t>,…)</a:t>
             </a:r>
-            <a:endParaRPr lang="it-IT" sz="1600" dirty="0">
+            <a:endParaRPr lang="it-IT" sz="1800" dirty="0">
               <a:solidFill>
                 <a:srgbClr val="FFFFFF"/>
               </a:solidFill>
@@ -7304,36 +7240,6 @@
           <a:chExt cx="0" cy="0"/>
         </a:xfrm>
       </p:grpSpPr>
-      <p:pic>
-        <p:nvPicPr>
-          <p:cNvPr id="5" name="Immagine 4" descr="metislogo.png"/>
-          <p:cNvPicPr>
-            <a:picLocks noChangeAspect="1"/>
-          </p:cNvPicPr>
-          <p:nvPr/>
-        </p:nvPicPr>
-        <p:blipFill>
-          <a:blip r:embed="rId3">
-            <a:extLst>
-              <a:ext uri="{28A0092B-C50C-407E-A947-70E740481C1C}">
-                <a14:useLocalDpi xmlns:a14="http://schemas.microsoft.com/office/drawing/2010/main" val="0"/>
-              </a:ext>
-            </a:extLst>
-          </a:blip>
-          <a:stretch>
-            <a:fillRect/>
-          </a:stretch>
-        </p:blipFill>
-        <p:spPr>
-          <a:xfrm>
-            <a:off x="8511836" y="71505"/>
-            <a:ext cx="561340" cy="904240"/>
-          </a:xfrm>
-          <a:prstGeom prst="rect">
-            <a:avLst/>
-          </a:prstGeom>
-        </p:spPr>
-      </p:pic>
       <p:sp>
         <p:nvSpPr>
           <p:cNvPr id="6" name="Segnaposto contenuto 2"/>
@@ -7345,7 +7251,7 @@
         <p:spPr>
           <a:xfrm>
             <a:off x="620009" y="481096"/>
-            <a:ext cx="8100222" cy="5936705"/>
+            <a:ext cx="8100222" cy="6103976"/>
           </a:xfrm>
           <a:prstGeom prst="rect">
             <a:avLst/>
@@ -7353,7 +7259,7 @@
         </p:spPr>
         <p:txBody>
           <a:bodyPr vert="horz" lIns="91440" tIns="45720" rIns="91440" bIns="45720" rtlCol="0">
-            <a:normAutofit/>
+            <a:normAutofit lnSpcReduction="10000"/>
           </a:bodyPr>
           <a:lstStyle>
             <a:lvl1pPr marL="0" indent="0" algn="ctr" defTabSz="457200" rtl="0" eaLnBrk="1" latinLnBrk="0" hangingPunct="1">
@@ -7540,6 +7446,105 @@
             </a:endParaRPr>
           </a:p>
           <a:p>
+            <a:endParaRPr lang="it-IT" sz="1200" dirty="0" smtClean="0">
+              <a:solidFill>
+                <a:srgbClr val="FFFFFF"/>
+              </a:solidFill>
+              <a:latin typeface="Avenir Light"/>
+              <a:cs typeface="Avenir Light"/>
+            </a:endParaRPr>
+          </a:p>
+          <a:p>
+            <a:r>
+              <a:rPr lang="it-IT" sz="2400" dirty="0" err="1" smtClean="0">
+                <a:solidFill>
+                  <a:srgbClr val="FFFFFF"/>
+                </a:solidFill>
+                <a:latin typeface="Avenir Light"/>
+                <a:cs typeface="Avenir Light"/>
+              </a:rPr>
+              <a:t>Four</a:t>
+            </a:r>
+            <a:r>
+              <a:rPr lang="it-IT" sz="2400" dirty="0" smtClean="0">
+                <a:solidFill>
+                  <a:srgbClr val="FFFFFF"/>
+                </a:solidFill>
+                <a:latin typeface="Avenir Light"/>
+                <a:cs typeface="Avenir Light"/>
+              </a:rPr>
+              <a:t> </a:t>
+            </a:r>
+            <a:r>
+              <a:rPr lang="it-IT" sz="2400" dirty="0" err="1" smtClean="0">
+                <a:solidFill>
+                  <a:srgbClr val="FFFFFF"/>
+                </a:solidFill>
+                <a:latin typeface="Avenir Light"/>
+                <a:cs typeface="Avenir Light"/>
+              </a:rPr>
+              <a:t>independent</a:t>
+            </a:r>
+            <a:r>
+              <a:rPr lang="it-IT" sz="2400" dirty="0" smtClean="0">
+                <a:solidFill>
+                  <a:srgbClr val="FFFFFF"/>
+                </a:solidFill>
+                <a:latin typeface="Avenir Light"/>
+                <a:cs typeface="Avenir Light"/>
+              </a:rPr>
+              <a:t> </a:t>
+            </a:r>
+            <a:r>
+              <a:rPr lang="it-IT" sz="2400" dirty="0" err="1">
+                <a:solidFill>
+                  <a:srgbClr val="FFFFFF"/>
+                </a:solidFill>
+                <a:latin typeface="Avenir Light"/>
+                <a:cs typeface="Avenir Light"/>
+              </a:rPr>
+              <a:t>R</a:t>
+            </a:r>
+            <a:r>
+              <a:rPr lang="it-IT" sz="2400" dirty="0" err="1" smtClean="0">
+                <a:solidFill>
+                  <a:srgbClr val="FFFFFF"/>
+                </a:solidFill>
+                <a:latin typeface="Avenir Light"/>
+                <a:cs typeface="Avenir Light"/>
+              </a:rPr>
+              <a:t>egression</a:t>
+            </a:r>
+            <a:r>
+              <a:rPr lang="it-IT" sz="2400" dirty="0" smtClean="0">
+                <a:solidFill>
+                  <a:srgbClr val="FFFFFF"/>
+                </a:solidFill>
+                <a:latin typeface="Avenir Light"/>
+                <a:cs typeface="Avenir Light"/>
+              </a:rPr>
+              <a:t> </a:t>
+            </a:r>
+            <a:r>
+              <a:rPr lang="it-IT" sz="2400" dirty="0" err="1">
+                <a:solidFill>
+                  <a:srgbClr val="FFFFFF"/>
+                </a:solidFill>
+                <a:latin typeface="Avenir Light"/>
+                <a:cs typeface="Avenir Light"/>
+              </a:rPr>
+              <a:t>M</a:t>
+            </a:r>
+            <a:r>
+              <a:rPr lang="it-IT" sz="2400" dirty="0" err="1" smtClean="0">
+                <a:solidFill>
+                  <a:srgbClr val="FFFFFF"/>
+                </a:solidFill>
+                <a:latin typeface="Avenir Light"/>
+                <a:cs typeface="Avenir Light"/>
+              </a:rPr>
+              <a:t>odels</a:t>
+            </a:r>
             <a:endParaRPr lang="it-IT" sz="2400" dirty="0" smtClean="0">
               <a:solidFill>
                 <a:srgbClr val="FFFFFF"/>
@@ -7557,7 +7562,7 @@
                 <a:latin typeface="Avenir Light"/>
                 <a:cs typeface="Avenir Light"/>
               </a:rPr>
-              <a:t>Four</a:t>
+              <a:t>using</a:t>
             </a:r>
             <a:r>
               <a:rPr lang="it-IT" sz="2400" dirty="0" smtClean="0">
@@ -7567,7 +7572,7 @@
                 <a:latin typeface="Avenir Light"/>
                 <a:cs typeface="Avenir Light"/>
               </a:rPr>
-              <a:t> </a:t>
+              <a:t> Ridge, Lasso, </a:t>
             </a:r>
             <a:r>
               <a:rPr lang="it-IT" sz="2400" dirty="0" err="1" smtClean="0">
@@ -7577,7 +7582,7 @@
                 <a:latin typeface="Avenir Light"/>
                 <a:cs typeface="Avenir Light"/>
               </a:rPr>
-              <a:t>independent</a:t>
+              <a:t>Elastic</a:t>
             </a:r>
             <a:r>
               <a:rPr lang="it-IT" sz="2400" dirty="0" smtClean="0">
@@ -7587,7 +7592,39 @@
                 <a:latin typeface="Avenir Light"/>
                 <a:cs typeface="Avenir Light"/>
               </a:rPr>
-              <a:t> </a:t>
+              <a:t> Net</a:t>
+            </a:r>
+          </a:p>
+          <a:p>
+            <a:r>
+              <a:rPr lang="it-IT" sz="2400" dirty="0" smtClean="0">
+                <a:solidFill>
+                  <a:srgbClr val="FFFFFF"/>
+                </a:solidFill>
+                <a:latin typeface="Avenir Light"/>
+                <a:cs typeface="Avenir Light"/>
+              </a:rPr>
+              <a:t>and </a:t>
+            </a:r>
+            <a:r>
+              <a:rPr lang="it-IT" sz="2400" dirty="0">
+                <a:solidFill>
+                  <a:srgbClr val="FFFFFF"/>
+                </a:solidFill>
+                <a:latin typeface="Avenir Light"/>
+                <a:cs typeface="Avenir Light"/>
+              </a:rPr>
+              <a:t>C</a:t>
+            </a:r>
+            <a:r>
+              <a:rPr lang="it-IT" sz="2400" dirty="0" smtClean="0">
+                <a:solidFill>
+                  <a:srgbClr val="FFFFFF"/>
+                </a:solidFill>
+                <a:latin typeface="Avenir Light"/>
+                <a:cs typeface="Avenir Light"/>
+              </a:rPr>
+              <a:t>ross </a:t>
             </a:r>
             <a:r>
               <a:rPr lang="it-IT" sz="2400" dirty="0" err="1">
@@ -7597,7 +7634,7 @@
                 <a:latin typeface="Avenir Light"/>
                 <a:cs typeface="Avenir Light"/>
               </a:rPr>
-              <a:t>R</a:t>
+              <a:t>V</a:t>
             </a:r>
             <a:r>
               <a:rPr lang="it-IT" sz="2400" dirty="0" err="1" smtClean="0">
@@ -7607,37 +7644,7 @@
                 <a:latin typeface="Avenir Light"/>
                 <a:cs typeface="Avenir Light"/>
               </a:rPr>
-              <a:t>egression</a:t>
-            </a:r>
-            <a:r>
-              <a:rPr lang="it-IT" sz="2400" dirty="0" smtClean="0">
-                <a:solidFill>
-                  <a:srgbClr val="FFFFFF"/>
-                </a:solidFill>
-                <a:latin typeface="Avenir Light"/>
-                <a:cs typeface="Avenir Light"/>
-              </a:rPr>
-              <a:t> </a:t>
-            </a:r>
-            <a:r>
-              <a:rPr lang="it-IT" sz="2400" dirty="0" err="1">
-                <a:solidFill>
-                  <a:srgbClr val="FFFFFF"/>
-                </a:solidFill>
-                <a:latin typeface="Avenir Light"/>
-                <a:cs typeface="Avenir Light"/>
-              </a:rPr>
-              <a:t>M</a:t>
-            </a:r>
-            <a:r>
-              <a:rPr lang="it-IT" sz="2400" dirty="0" err="1" smtClean="0">
-                <a:solidFill>
-                  <a:srgbClr val="FFFFFF"/>
-                </a:solidFill>
-                <a:latin typeface="Avenir Light"/>
-                <a:cs typeface="Avenir Light"/>
-              </a:rPr>
-              <a:t>odels</a:t>
+              <a:t>alidation</a:t>
             </a:r>
             <a:endParaRPr lang="it-IT" sz="2400" dirty="0" smtClean="0">
               <a:solidFill>
@@ -7648,99 +7655,7 @@
             </a:endParaRPr>
           </a:p>
           <a:p>
-            <a:r>
-              <a:rPr lang="it-IT" sz="2400" dirty="0" err="1" smtClean="0">
-                <a:solidFill>
-                  <a:srgbClr val="FFFFFF"/>
-                </a:solidFill>
-                <a:latin typeface="Avenir Light"/>
-                <a:cs typeface="Avenir Light"/>
-              </a:rPr>
-              <a:t>using</a:t>
-            </a:r>
-            <a:r>
-              <a:rPr lang="it-IT" sz="2400" dirty="0" smtClean="0">
-                <a:solidFill>
-                  <a:srgbClr val="FFFFFF"/>
-                </a:solidFill>
-                <a:latin typeface="Avenir Light"/>
-                <a:cs typeface="Avenir Light"/>
-              </a:rPr>
-              <a:t> Ridge, Lasso, </a:t>
-            </a:r>
-            <a:r>
-              <a:rPr lang="it-IT" sz="2400" dirty="0" err="1" smtClean="0">
-                <a:solidFill>
-                  <a:srgbClr val="FFFFFF"/>
-                </a:solidFill>
-                <a:latin typeface="Avenir Light"/>
-                <a:cs typeface="Avenir Light"/>
-              </a:rPr>
-              <a:t>Elastic</a:t>
-            </a:r>
-            <a:r>
-              <a:rPr lang="it-IT" sz="2400" dirty="0" smtClean="0">
-                <a:solidFill>
-                  <a:srgbClr val="FFFFFF"/>
-                </a:solidFill>
-                <a:latin typeface="Avenir Light"/>
-                <a:cs typeface="Avenir Light"/>
-              </a:rPr>
-              <a:t> Net</a:t>
-            </a:r>
-          </a:p>
-          <a:p>
-            <a:r>
-              <a:rPr lang="it-IT" sz="2400" dirty="0" smtClean="0">
-                <a:solidFill>
-                  <a:srgbClr val="FFFFFF"/>
-                </a:solidFill>
-                <a:latin typeface="Avenir Light"/>
-                <a:cs typeface="Avenir Light"/>
-              </a:rPr>
-              <a:t>and </a:t>
-            </a:r>
-            <a:r>
-              <a:rPr lang="it-IT" sz="2400" dirty="0">
-                <a:solidFill>
-                  <a:srgbClr val="FFFFFF"/>
-                </a:solidFill>
-                <a:latin typeface="Avenir Light"/>
-                <a:cs typeface="Avenir Light"/>
-              </a:rPr>
-              <a:t>C</a:t>
-            </a:r>
-            <a:r>
-              <a:rPr lang="it-IT" sz="2400" dirty="0" smtClean="0">
-                <a:solidFill>
-                  <a:srgbClr val="FFFFFF"/>
-                </a:solidFill>
-                <a:latin typeface="Avenir Light"/>
-                <a:cs typeface="Avenir Light"/>
-              </a:rPr>
-              <a:t>ross </a:t>
-            </a:r>
-            <a:r>
-              <a:rPr lang="it-IT" sz="2400" dirty="0" err="1">
-                <a:solidFill>
-                  <a:srgbClr val="FFFFFF"/>
-                </a:solidFill>
-                <a:latin typeface="Avenir Light"/>
-                <a:cs typeface="Avenir Light"/>
-              </a:rPr>
-              <a:t>V</a:t>
-            </a:r>
-            <a:r>
-              <a:rPr lang="it-IT" sz="2400" dirty="0" err="1" smtClean="0">
-                <a:solidFill>
-                  <a:srgbClr val="FFFFFF"/>
-                </a:solidFill>
-                <a:latin typeface="Avenir Light"/>
-                <a:cs typeface="Avenir Light"/>
-              </a:rPr>
-              <a:t>alidation</a:t>
-            </a:r>
-            <a:endParaRPr lang="it-IT" sz="2400" dirty="0" smtClean="0">
+            <a:endParaRPr lang="it-IT" sz="2000" dirty="0" smtClean="0">
               <a:solidFill>
                 <a:srgbClr val="FFFFFF"/>
               </a:solidFill>
@@ -7749,7 +7664,7 @@
             </a:endParaRPr>
           </a:p>
           <a:p>
-            <a:endParaRPr lang="it-IT" sz="2000" dirty="0">
+            <a:endParaRPr lang="it-IT" sz="2400" dirty="0">
               <a:solidFill>
                 <a:srgbClr val="FFFFFF"/>
               </a:solidFill>
@@ -8081,6 +7996,24 @@
             </a:endParaRPr>
           </a:p>
           <a:p>
+            <a:endParaRPr lang="it-IT" sz="1600" dirty="0" smtClean="0">
+              <a:solidFill>
+                <a:srgbClr val="FFFFFF"/>
+              </a:solidFill>
+              <a:latin typeface="Avenir Light"/>
+              <a:cs typeface="Avenir Light"/>
+            </a:endParaRPr>
+          </a:p>
+          <a:p>
+            <a:endParaRPr lang="it-IT" sz="1600" dirty="0" smtClean="0">
+              <a:solidFill>
+                <a:srgbClr val="FFFFFF"/>
+              </a:solidFill>
+              <a:latin typeface="Avenir Light"/>
+              <a:cs typeface="Avenir Light"/>
+            </a:endParaRPr>
+          </a:p>
+          <a:p>
             <a:r>
               <a:rPr lang="it-IT" sz="1600" dirty="0" err="1" smtClean="0">
                 <a:solidFill>
@@ -8099,7 +8032,17 @@
                 <a:latin typeface="Avenir Light"/>
                 <a:cs typeface="Avenir Light"/>
               </a:rPr>
-              <a:t> 2015 </a:t>
+              <a:t> </a:t>
+            </a:r>
+            <a:r>
+              <a:rPr lang="it-IT" sz="1600" dirty="0" smtClean="0">
+                <a:solidFill>
+                  <a:srgbClr val="FFFFFF"/>
+                </a:solidFill>
+                <a:latin typeface="Avenir Light"/>
+                <a:cs typeface="Avenir Light"/>
+              </a:rPr>
+              <a:t>2015 </a:t>
             </a:r>
             <a:r>
               <a:rPr lang="it-IT" sz="1600" dirty="0" err="1" smtClean="0">
@@ -8306,7 +8249,7 @@
           <p:nvPr/>
         </p:nvPicPr>
         <p:blipFill>
-          <a:blip r:embed="rId4">
+          <a:blip r:embed="rId3">
             <a:extLst>
               <a:ext uri="{28A0092B-C50C-407E-A947-70E740481C1C}">
                 <a14:useLocalDpi xmlns:a14="http://schemas.microsoft.com/office/drawing/2010/main" val="0"/>
@@ -8364,36 +8307,6 @@
           <a:chExt cx="0" cy="0"/>
         </a:xfrm>
       </p:grpSpPr>
-      <p:pic>
-        <p:nvPicPr>
-          <p:cNvPr id="5" name="Immagine 4" descr="metislogo.png"/>
-          <p:cNvPicPr>
-            <a:picLocks noChangeAspect="1"/>
-          </p:cNvPicPr>
-          <p:nvPr/>
-        </p:nvPicPr>
-        <p:blipFill>
-          <a:blip r:embed="rId3">
-            <a:extLst>
-              <a:ext uri="{28A0092B-C50C-407E-A947-70E740481C1C}">
-                <a14:useLocalDpi xmlns:a14="http://schemas.microsoft.com/office/drawing/2010/main" val="0"/>
-              </a:ext>
-            </a:extLst>
-          </a:blip>
-          <a:stretch>
-            <a:fillRect/>
-          </a:stretch>
-        </p:blipFill>
-        <p:spPr>
-          <a:xfrm>
-            <a:off x="8511836" y="71505"/>
-            <a:ext cx="561340" cy="904240"/>
-          </a:xfrm>
-          <a:prstGeom prst="rect">
-            <a:avLst/>
-          </a:prstGeom>
-        </p:spPr>
-      </p:pic>
       <p:sp>
         <p:nvSpPr>
           <p:cNvPr id="6" name="Segnaposto contenuto 2"/>
@@ -8404,8 +8317,8 @@
         </p:nvSpPr>
         <p:spPr>
           <a:xfrm>
-            <a:off x="1193036" y="673531"/>
-            <a:ext cx="6735025" cy="2424717"/>
+            <a:off x="982899" y="482155"/>
+            <a:ext cx="7398187" cy="2424717"/>
           </a:xfrm>
           <a:prstGeom prst="rect">
             <a:avLst/>
@@ -8413,7 +8326,7 @@
         </p:spPr>
         <p:txBody>
           <a:bodyPr vert="horz" lIns="91440" tIns="45720" rIns="91440" bIns="45720" rtlCol="0">
-            <a:normAutofit/>
+            <a:normAutofit lnSpcReduction="10000"/>
           </a:bodyPr>
           <a:lstStyle>
             <a:lvl1pPr marL="0" indent="0" algn="ctr" defTabSz="457200" rtl="0" eaLnBrk="1" latinLnBrk="0" hangingPunct="1">
@@ -8634,7 +8547,7 @@
           <a:p>
             <a:pPr algn="just"/>
             <a:r>
-              <a:rPr lang="it-IT" sz="1600" dirty="0" smtClean="0">
+              <a:rPr lang="it-IT" sz="1800" dirty="0" smtClean="0">
                 <a:solidFill>
                   <a:srgbClr val="FFFFFF"/>
                 </a:solidFill>
@@ -8644,7 +8557,7 @@
               <a:t>An </a:t>
             </a:r>
             <a:r>
-              <a:rPr lang="it-IT" sz="1600" dirty="0" err="1" smtClean="0">
+              <a:rPr lang="it-IT" sz="1800" dirty="0" err="1" smtClean="0">
                 <a:solidFill>
                   <a:srgbClr val="FFFFFF"/>
                 </a:solidFill>
@@ -8654,7 +8567,7 @@
               <a:t>Indicator</a:t>
             </a:r>
             <a:r>
-              <a:rPr lang="it-IT" sz="1600" dirty="0" smtClean="0">
+              <a:rPr lang="it-IT" sz="1800" dirty="0" smtClean="0">
                 <a:solidFill>
                   <a:srgbClr val="FFFFFF"/>
                 </a:solidFill>
@@ -8664,7 +8577,7 @@
               <a:t> I </a:t>
             </a:r>
             <a:r>
-              <a:rPr lang="it-IT" sz="1600" dirty="0" err="1" smtClean="0">
+              <a:rPr lang="it-IT" sz="1800" dirty="0" err="1" smtClean="0">
                 <a:solidFill>
                   <a:srgbClr val="FFFFFF"/>
                 </a:solidFill>
@@ -8674,7 +8587,7 @@
               <a:t>developed</a:t>
             </a:r>
             <a:r>
-              <a:rPr lang="it-IT" sz="1600" dirty="0" smtClean="0">
+              <a:rPr lang="it-IT" sz="1800" dirty="0" smtClean="0">
                 <a:solidFill>
                   <a:srgbClr val="FFFFFF"/>
                 </a:solidFill>
@@ -8684,7 +8597,7 @@
               <a:t> to </a:t>
             </a:r>
             <a:r>
-              <a:rPr lang="it-IT" sz="1600" dirty="0" err="1" smtClean="0">
+              <a:rPr lang="it-IT" sz="1800" dirty="0" err="1" smtClean="0">
                 <a:solidFill>
                   <a:srgbClr val="FFFFFF"/>
                 </a:solidFill>
@@ -8694,7 +8607,7 @@
               <a:t>measure</a:t>
             </a:r>
             <a:r>
-              <a:rPr lang="it-IT" sz="1600" dirty="0" smtClean="0">
+              <a:rPr lang="it-IT" sz="1800" dirty="0" smtClean="0">
                 <a:solidFill>
                   <a:srgbClr val="FFFFFF"/>
                 </a:solidFill>
@@ -8704,7 +8617,7 @@
               <a:t> the </a:t>
             </a:r>
             <a:r>
-              <a:rPr lang="it-IT" sz="1600" dirty="0" err="1" smtClean="0">
+              <a:rPr lang="it-IT" sz="1800" dirty="0" err="1" smtClean="0">
                 <a:solidFill>
                   <a:srgbClr val="FFFFFF"/>
                 </a:solidFill>
@@ -8714,7 +8627,7 @@
               <a:t>distance</a:t>
             </a:r>
             <a:r>
-              <a:rPr lang="it-IT" sz="1600" dirty="0" smtClean="0">
+              <a:rPr lang="it-IT" sz="1800" dirty="0" smtClean="0">
                 <a:solidFill>
                   <a:srgbClr val="FFFFFF"/>
                 </a:solidFill>
@@ -8724,7 +8637,7 @@
               <a:t> (in %) </a:t>
             </a:r>
             <a:r>
-              <a:rPr lang="it-IT" sz="1600" dirty="0" err="1" smtClean="0">
+              <a:rPr lang="it-IT" sz="1800" dirty="0" err="1" smtClean="0">
                 <a:solidFill>
                   <a:srgbClr val="FFFFFF"/>
                 </a:solidFill>
@@ -8734,7 +8647,7 @@
               <a:t>between</a:t>
             </a:r>
             <a:r>
-              <a:rPr lang="it-IT" sz="1600" dirty="0" smtClean="0">
+              <a:rPr lang="it-IT" sz="1800" dirty="0" smtClean="0">
                 <a:solidFill>
                   <a:srgbClr val="FFFFFF"/>
                 </a:solidFill>
@@ -8744,7 +8657,7 @@
               <a:t> the </a:t>
             </a:r>
             <a:r>
-              <a:rPr lang="it-IT" sz="1600" dirty="0" err="1" smtClean="0">
+              <a:rPr lang="it-IT" sz="1800" dirty="0" err="1" smtClean="0">
                 <a:solidFill>
                   <a:srgbClr val="FFFFFF"/>
                 </a:solidFill>
@@ -8754,7 +8667,7 @@
               <a:t>current</a:t>
             </a:r>
             <a:r>
-              <a:rPr lang="it-IT" sz="1600" dirty="0" smtClean="0">
+              <a:rPr lang="it-IT" sz="1800" dirty="0" smtClean="0">
                 <a:solidFill>
                   <a:srgbClr val="FFFFFF"/>
                 </a:solidFill>
@@ -8764,7 +8677,7 @@
               <a:t> </a:t>
             </a:r>
             <a:r>
-              <a:rPr lang="it-IT" sz="1600" dirty="0" err="1" smtClean="0">
+              <a:rPr lang="it-IT" sz="1800" dirty="0" err="1" smtClean="0">
                 <a:solidFill>
                   <a:srgbClr val="FFFFFF"/>
                 </a:solidFill>
@@ -8774,7 +8687,7 @@
               <a:t>price</a:t>
             </a:r>
             <a:r>
-              <a:rPr lang="it-IT" sz="1600" dirty="0" smtClean="0">
+              <a:rPr lang="it-IT" sz="1800" dirty="0" smtClean="0">
                 <a:solidFill>
                   <a:srgbClr val="FFFFFF"/>
                 </a:solidFill>
@@ -8784,7 +8697,7 @@
               <a:t> and the </a:t>
             </a:r>
             <a:r>
-              <a:rPr lang="it-IT" sz="1600" dirty="0" err="1" smtClean="0">
+              <a:rPr lang="it-IT" sz="1800" dirty="0" err="1" smtClean="0">
                 <a:solidFill>
                   <a:srgbClr val="FFFFFF"/>
                 </a:solidFill>
@@ -8794,7 +8707,7 @@
               <a:t>most</a:t>
             </a:r>
             <a:r>
-              <a:rPr lang="it-IT" sz="1600" dirty="0" smtClean="0">
+              <a:rPr lang="it-IT" sz="1800" dirty="0" smtClean="0">
                 <a:solidFill>
                   <a:srgbClr val="FFFFFF"/>
                 </a:solidFill>
@@ -8804,7 +8717,7 @@
               <a:t> “</a:t>
             </a:r>
             <a:r>
-              <a:rPr lang="it-IT" sz="1600" dirty="0" err="1" smtClean="0">
+              <a:rPr lang="it-IT" sz="1800" dirty="0" err="1" smtClean="0">
                 <a:solidFill>
                   <a:srgbClr val="FFFFFF"/>
                 </a:solidFill>
@@ -8814,7 +8727,7 @@
               <a:t>crowded</a:t>
             </a:r>
             <a:r>
-              <a:rPr lang="it-IT" sz="1600" dirty="0" smtClean="0">
+              <a:rPr lang="it-IT" sz="1800" dirty="0" smtClean="0">
                 <a:solidFill>
                   <a:srgbClr val="FFFFFF"/>
                 </a:solidFill>
@@ -8824,7 +8737,7 @@
               <a:t>” </a:t>
             </a:r>
             <a:r>
-              <a:rPr lang="it-IT" sz="1600" dirty="0" err="1" smtClean="0">
+              <a:rPr lang="it-IT" sz="1800" dirty="0" err="1" smtClean="0">
                 <a:solidFill>
                   <a:srgbClr val="FFFFFF"/>
                 </a:solidFill>
@@ -8834,7 +8747,7 @@
               <a:t>options</a:t>
             </a:r>
             <a:r>
-              <a:rPr lang="it-IT" sz="1600" dirty="0" smtClean="0">
+              <a:rPr lang="it-IT" sz="1800" dirty="0" smtClean="0">
                 <a:solidFill>
                   <a:srgbClr val="FFFFFF"/>
                 </a:solidFill>
@@ -8844,7 +8757,7 @@
               <a:t> strikes, </a:t>
             </a:r>
             <a:r>
-              <a:rPr lang="it-IT" sz="1600" dirty="0" err="1" smtClean="0">
+              <a:rPr lang="it-IT" sz="1800" dirty="0" err="1" smtClean="0">
                 <a:solidFill>
                   <a:srgbClr val="FFFFFF"/>
                 </a:solidFill>
@@ -8854,7 +8767,7 @@
               <a:t>that</a:t>
             </a:r>
             <a:r>
-              <a:rPr lang="it-IT" sz="1600" dirty="0" smtClean="0">
+              <a:rPr lang="it-IT" sz="1800" dirty="0" smtClean="0">
                 <a:solidFill>
                   <a:srgbClr val="FFFFFF"/>
                 </a:solidFill>
@@ -8864,7 +8777,7 @@
               <a:t> </a:t>
             </a:r>
             <a:r>
-              <a:rPr lang="it-IT" sz="1600" dirty="0" err="1" smtClean="0">
+              <a:rPr lang="it-IT" sz="1800" dirty="0" err="1" smtClean="0">
                 <a:solidFill>
                   <a:srgbClr val="FFFFFF"/>
                 </a:solidFill>
@@ -8874,7 +8787,7 @@
               <a:t>tend</a:t>
             </a:r>
             <a:r>
-              <a:rPr lang="it-IT" sz="1600" dirty="0" smtClean="0">
+              <a:rPr lang="it-IT" sz="1800" dirty="0" smtClean="0">
                 <a:solidFill>
                   <a:srgbClr val="FFFFFF"/>
                 </a:solidFill>
@@ -8884,7 +8797,7 @@
               <a:t> to </a:t>
             </a:r>
             <a:r>
-              <a:rPr lang="it-IT" sz="1600" dirty="0" err="1" smtClean="0">
+              <a:rPr lang="it-IT" sz="1800" dirty="0" err="1" smtClean="0">
                 <a:solidFill>
                   <a:srgbClr val="FFFFFF"/>
                 </a:solidFill>
@@ -8894,7 +8807,7 @@
               <a:t>attract</a:t>
             </a:r>
             <a:r>
-              <a:rPr lang="it-IT" sz="1600" dirty="0" smtClean="0">
+              <a:rPr lang="it-IT" sz="1800" dirty="0" smtClean="0">
                 <a:solidFill>
                   <a:srgbClr val="FFFFFF"/>
                 </a:solidFill>
@@ -8904,7 +8817,7 @@
               <a:t> the </a:t>
             </a:r>
             <a:r>
-              <a:rPr lang="it-IT" sz="1600" dirty="0" err="1" smtClean="0">
+              <a:rPr lang="it-IT" sz="1800" dirty="0" err="1" smtClean="0">
                 <a:solidFill>
                   <a:srgbClr val="FFFFFF"/>
                 </a:solidFill>
@@ -8914,7 +8827,7 @@
               <a:t>price</a:t>
             </a:r>
             <a:r>
-              <a:rPr lang="it-IT" sz="1600" dirty="0" smtClean="0">
+              <a:rPr lang="it-IT" sz="1800" dirty="0" smtClean="0">
                 <a:solidFill>
                   <a:srgbClr val="FFFFFF"/>
                 </a:solidFill>
@@ -8924,7 +8837,7 @@
               <a:t> </a:t>
             </a:r>
             <a:r>
-              <a:rPr lang="it-IT" sz="1600" dirty="0" err="1" smtClean="0">
+              <a:rPr lang="it-IT" sz="1800" dirty="0" err="1" smtClean="0">
                 <a:solidFill>
                   <a:srgbClr val="FFFFFF"/>
                 </a:solidFill>
@@ -8934,7 +8847,7 @@
               <a:t>when</a:t>
             </a:r>
             <a:r>
-              <a:rPr lang="it-IT" sz="1600" dirty="0" smtClean="0">
+              <a:rPr lang="it-IT" sz="1800" dirty="0" smtClean="0">
                 <a:solidFill>
                   <a:srgbClr val="FFFFFF"/>
                 </a:solidFill>
@@ -8944,7 +8857,7 @@
               <a:t> </a:t>
             </a:r>
             <a:r>
-              <a:rPr lang="it-IT" sz="1600" dirty="0" err="1" smtClean="0">
+              <a:rPr lang="it-IT" sz="1800" dirty="0" err="1" smtClean="0">
                 <a:solidFill>
                   <a:srgbClr val="FFFFFF"/>
                 </a:solidFill>
@@ -8954,7 +8867,7 @@
               <a:t>expiration</a:t>
             </a:r>
             <a:r>
-              <a:rPr lang="it-IT" sz="1600" dirty="0" smtClean="0">
+              <a:rPr lang="it-IT" sz="1800" dirty="0" smtClean="0">
                 <a:solidFill>
                   <a:srgbClr val="FFFFFF"/>
                 </a:solidFill>
@@ -8964,7 +8877,7 @@
               <a:t> </a:t>
             </a:r>
             <a:r>
-              <a:rPr lang="it-IT" sz="1600" dirty="0" err="1" smtClean="0">
+              <a:rPr lang="it-IT" sz="1800" dirty="0" err="1" smtClean="0">
                 <a:solidFill>
                   <a:srgbClr val="FFFFFF"/>
                 </a:solidFill>
@@ -8974,7 +8887,7 @@
               <a:t>is</a:t>
             </a:r>
             <a:r>
-              <a:rPr lang="it-IT" sz="1600" dirty="0" smtClean="0">
+              <a:rPr lang="it-IT" sz="1800" dirty="0" smtClean="0">
                 <a:solidFill>
                   <a:srgbClr val="FFFFFF"/>
                 </a:solidFill>
@@ -8984,7 +8897,7 @@
               <a:t> </a:t>
             </a:r>
             <a:r>
-              <a:rPr lang="it-IT" sz="1600" dirty="0" err="1" smtClean="0">
+              <a:rPr lang="it-IT" sz="1800" dirty="0" err="1" smtClean="0">
                 <a:solidFill>
                   <a:srgbClr val="FFFFFF"/>
                 </a:solidFill>
@@ -8993,20 +8906,7 @@
               </a:rPr>
               <a:t>approaching</a:t>
             </a:r>
-            <a:r>
-              <a:rPr lang="it-IT" sz="1600" dirty="0" smtClean="0">
-                <a:solidFill>
-                  <a:srgbClr val="FFFFFF"/>
-                </a:solidFill>
-                <a:latin typeface="Avenir Light"/>
-                <a:cs typeface="Avenir Light"/>
-              </a:rPr>
-              <a:t>.</a:t>
-            </a:r>
-          </a:p>
-          <a:p>
-            <a:pPr algn="just"/>
-            <a:endParaRPr lang="it-IT" sz="1600" dirty="0" smtClean="0">
+            <a:endParaRPr lang="it-IT" sz="1800" dirty="0" smtClean="0">
               <a:solidFill>
                 <a:srgbClr val="FFFFFF"/>
               </a:solidFill>
@@ -9016,8 +8916,18 @@
           </a:p>
           <a:p>
             <a:pPr algn="just"/>
-            <a:r>
-              <a:rPr lang="it-IT" sz="1600" dirty="0" err="1" smtClean="0">
+            <a:endParaRPr lang="it-IT" sz="1800" dirty="0" smtClean="0">
+              <a:solidFill>
+                <a:srgbClr val="FFFFFF"/>
+              </a:solidFill>
+              <a:latin typeface="Avenir Light"/>
+              <a:cs typeface="Avenir Light"/>
+            </a:endParaRPr>
+          </a:p>
+          <a:p>
+            <a:pPr algn="just"/>
+            <a:r>
+              <a:rPr lang="it-IT" sz="1800" dirty="0" err="1" smtClean="0">
                 <a:solidFill>
                   <a:srgbClr val="FFFFFF"/>
                 </a:solidFill>
@@ -9027,7 +8937,7 @@
               <a:t>It</a:t>
             </a:r>
             <a:r>
-              <a:rPr lang="it-IT" sz="1600" dirty="0" smtClean="0">
+              <a:rPr lang="it-IT" sz="1800" dirty="0" smtClean="0">
                 <a:solidFill>
                   <a:srgbClr val="FFFFFF"/>
                 </a:solidFill>
@@ -9037,7 +8947,7 @@
               <a:t> </a:t>
             </a:r>
             <a:r>
-              <a:rPr lang="it-IT" sz="1600" dirty="0" err="1" smtClean="0">
+              <a:rPr lang="it-IT" sz="1800" dirty="0" err="1" smtClean="0">
                 <a:solidFill>
                   <a:srgbClr val="FFFFFF"/>
                 </a:solidFill>
@@ -9047,7 +8957,7 @@
               <a:t>has</a:t>
             </a:r>
             <a:r>
-              <a:rPr lang="it-IT" sz="1600" dirty="0" smtClean="0">
+              <a:rPr lang="it-IT" sz="1800" dirty="0" smtClean="0">
                 <a:solidFill>
                   <a:srgbClr val="FFFFFF"/>
                 </a:solidFill>
@@ -9057,7 +8967,7 @@
               <a:t> to be </a:t>
             </a:r>
             <a:r>
-              <a:rPr lang="it-IT" sz="1600" dirty="0" err="1" smtClean="0">
+              <a:rPr lang="it-IT" sz="1800" dirty="0" err="1" smtClean="0">
                 <a:solidFill>
                   <a:srgbClr val="FFFFFF"/>
                 </a:solidFill>
@@ -9067,7 +8977,7 @@
               <a:t>checked</a:t>
             </a:r>
             <a:r>
-              <a:rPr lang="it-IT" sz="1600" dirty="0" smtClean="0">
+              <a:rPr lang="it-IT" sz="1800" dirty="0" smtClean="0">
                 <a:solidFill>
                   <a:srgbClr val="FFFFFF"/>
                 </a:solidFill>
@@ -9077,7 +8987,7 @@
               <a:t> </a:t>
             </a:r>
             <a:r>
-              <a:rPr lang="it-IT" sz="1600" dirty="0" err="1" smtClean="0">
+              <a:rPr lang="it-IT" sz="1800" dirty="0" err="1" smtClean="0">
                 <a:solidFill>
                   <a:srgbClr val="FFFFFF"/>
                 </a:solidFill>
@@ -9087,7 +8997,7 @@
               <a:t>daily</a:t>
             </a:r>
             <a:r>
-              <a:rPr lang="it-IT" sz="1600" dirty="0" smtClean="0">
+              <a:rPr lang="it-IT" sz="1800" dirty="0" smtClean="0">
                 <a:solidFill>
                   <a:srgbClr val="FFFFFF"/>
                 </a:solidFill>
@@ -9097,7 +9007,7 @@
               <a:t>, and </a:t>
             </a:r>
             <a:r>
-              <a:rPr lang="it-IT" sz="1600" dirty="0" err="1" smtClean="0">
+              <a:rPr lang="it-IT" sz="1800" dirty="0" err="1" smtClean="0">
                 <a:solidFill>
                   <a:srgbClr val="FFFFFF"/>
                 </a:solidFill>
@@ -9107,7 +9017,7 @@
               <a:t>matched</a:t>
             </a:r>
             <a:r>
-              <a:rPr lang="it-IT" sz="1600" dirty="0" smtClean="0">
+              <a:rPr lang="it-IT" sz="1800" dirty="0" smtClean="0">
                 <a:solidFill>
                   <a:srgbClr val="FFFFFF"/>
                 </a:solidFill>
@@ -9117,7 +9027,7 @@
               <a:t> with the </a:t>
             </a:r>
             <a:r>
-              <a:rPr lang="it-IT" sz="1600" dirty="0" err="1" smtClean="0">
+              <a:rPr lang="it-IT" sz="1800" dirty="0" err="1" smtClean="0">
                 <a:solidFill>
                   <a:srgbClr val="FFFFFF"/>
                 </a:solidFill>
@@ -9127,7 +9037,7 @@
               <a:t>predicted</a:t>
             </a:r>
             <a:r>
-              <a:rPr lang="it-IT" sz="1600" dirty="0" smtClean="0">
+              <a:rPr lang="it-IT" sz="1800" dirty="0" smtClean="0">
                 <a:solidFill>
                   <a:srgbClr val="FFFFFF"/>
                 </a:solidFill>
@@ -9137,7 +9047,7 @@
               <a:t> </a:t>
             </a:r>
             <a:r>
-              <a:rPr lang="it-IT" sz="1600" dirty="0" err="1" smtClean="0">
+              <a:rPr lang="it-IT" sz="1800" dirty="0" err="1" smtClean="0">
                 <a:solidFill>
                   <a:srgbClr val="FFFFFF"/>
                 </a:solidFill>
@@ -9147,7 +9057,7 @@
               <a:t>price</a:t>
             </a:r>
             <a:r>
-              <a:rPr lang="it-IT" sz="1600" dirty="0" smtClean="0">
+              <a:rPr lang="it-IT" sz="1800" dirty="0" smtClean="0">
                 <a:solidFill>
                   <a:srgbClr val="FFFFFF"/>
                 </a:solidFill>
@@ -9157,7 +9067,7 @@
               <a:t> </a:t>
             </a:r>
             <a:r>
-              <a:rPr lang="it-IT" sz="1600" dirty="0" err="1" smtClean="0">
+              <a:rPr lang="it-IT" sz="1800" dirty="0" err="1" smtClean="0">
                 <a:solidFill>
                   <a:srgbClr val="FFFFFF"/>
                 </a:solidFill>
@@ -9166,7 +9076,7 @@
               </a:rPr>
               <a:t>range</a:t>
             </a:r>
-            <a:endParaRPr lang="it-IT" sz="1600" dirty="0" smtClean="0">
+            <a:endParaRPr lang="it-IT" sz="1800" dirty="0" smtClean="0">
               <a:solidFill>
                 <a:srgbClr val="FFFFFF"/>
               </a:solidFill>
@@ -9185,7 +9095,7 @@
           <p:nvPr/>
         </p:nvPicPr>
         <p:blipFill>
-          <a:blip r:embed="rId4">
+          <a:blip r:embed="rId3">
             <a:extLst>
               <a:ext uri="{28A0092B-C50C-407E-A947-70E740481C1C}">
                 <a14:useLocalDpi xmlns:a14="http://schemas.microsoft.com/office/drawing/2010/main" val="0"/>
@@ -9214,8 +9124,8 @@
         </p:nvSpPr>
         <p:spPr>
           <a:xfrm>
-            <a:off x="1193036" y="4252877"/>
-            <a:ext cx="3155866" cy="1169551"/>
+            <a:off x="922011" y="4157189"/>
+            <a:ext cx="3426891" cy="1323439"/>
           </a:xfrm>
           <a:prstGeom prst="rect">
             <a:avLst/>
@@ -9229,7 +9139,7 @@
           <a:lstStyle/>
           <a:p>
             <a:r>
-              <a:rPr lang="it-IT" sz="1400" dirty="0">
+              <a:rPr lang="it-IT" sz="1600" dirty="0">
                 <a:solidFill>
                   <a:srgbClr val="FFFFFF"/>
                 </a:solidFill>
@@ -9239,7 +9149,7 @@
               <a:t>March 9th </a:t>
             </a:r>
             <a:r>
-              <a:rPr lang="it-IT" sz="1400" dirty="0" smtClean="0">
+              <a:rPr lang="it-IT" sz="1600" dirty="0" smtClean="0">
                 <a:solidFill>
                   <a:srgbClr val="FFFFFF"/>
                 </a:solidFill>
@@ -9249,7 +9159,7 @@
               <a:t>2009: </a:t>
             </a:r>
             <a:r>
-              <a:rPr lang="it-IT" sz="1400" dirty="0">
+              <a:rPr lang="it-IT" sz="1600" dirty="0">
                 <a:solidFill>
                   <a:srgbClr val="FFFFFF"/>
                 </a:solidFill>
@@ -9261,7 +9171,7 @@
           </a:p>
           <a:p>
             <a:r>
-              <a:rPr lang="it-IT" sz="1400" dirty="0">
+              <a:rPr lang="it-IT" sz="1600" dirty="0">
                 <a:solidFill>
                   <a:srgbClr val="FFFFFF"/>
                 </a:solidFill>
@@ -9271,7 +9181,7 @@
               <a:t>5th </a:t>
             </a:r>
             <a:r>
-              <a:rPr lang="it-IT" sz="1400" dirty="0" err="1">
+              <a:rPr lang="it-IT" sz="1600" dirty="0" err="1">
                 <a:solidFill>
                   <a:srgbClr val="FFFFFF"/>
                 </a:solidFill>
@@ -9281,7 +9191,7 @@
               <a:t>Element</a:t>
             </a:r>
             <a:r>
-              <a:rPr lang="it-IT" sz="1400" dirty="0">
+              <a:rPr lang="it-IT" sz="1600" dirty="0">
                 <a:solidFill>
                   <a:srgbClr val="FFFFFF"/>
                 </a:solidFill>
@@ -9291,7 +9201,7 @@
               <a:t> </a:t>
             </a:r>
             <a:r>
-              <a:rPr lang="it-IT" sz="1400" dirty="0" err="1">
+              <a:rPr lang="it-IT" sz="1600" dirty="0" err="1">
                 <a:solidFill>
                   <a:srgbClr val="FFFFFF"/>
                 </a:solidFill>
@@ -9301,7 +9211,7 @@
               <a:t>indication</a:t>
             </a:r>
             <a:r>
-              <a:rPr lang="it-IT" sz="1400" dirty="0">
+              <a:rPr lang="it-IT" sz="1600" dirty="0">
                 <a:solidFill>
                   <a:srgbClr val="FFFFFF"/>
                 </a:solidFill>
@@ -9311,7 +9221,7 @@
               <a:t>: +11.6</a:t>
             </a:r>
             <a:r>
-              <a:rPr lang="it-IT" sz="1400" dirty="0" smtClean="0">
+              <a:rPr lang="it-IT" sz="1600" dirty="0" smtClean="0">
                 <a:solidFill>
                   <a:srgbClr val="FFFFFF"/>
                 </a:solidFill>
@@ -9322,7 +9232,7 @@
             </a:r>
           </a:p>
           <a:p>
-            <a:endParaRPr lang="it-IT" sz="1400" dirty="0">
+            <a:endParaRPr lang="it-IT" sz="1600" dirty="0">
               <a:solidFill>
                 <a:srgbClr val="FFFFFF"/>
               </a:solidFill>
@@ -9332,7 +9242,7 @@
           </a:p>
           <a:p>
             <a:r>
-              <a:rPr lang="it-IT" sz="1400" dirty="0">
+              <a:rPr lang="it-IT" sz="1600" dirty="0">
                 <a:solidFill>
                   <a:srgbClr val="FFFFFF"/>
                 </a:solidFill>
@@ -9342,7 +9252,7 @@
               <a:t>March 20th 2009 (</a:t>
             </a:r>
             <a:r>
-              <a:rPr lang="it-IT" sz="1400" dirty="0" err="1">
+              <a:rPr lang="it-IT" sz="1600" dirty="0" err="1">
                 <a:solidFill>
                   <a:srgbClr val="FFFFFF"/>
                 </a:solidFill>
@@ -9352,7 +9262,7 @@
               <a:t>options</a:t>
             </a:r>
             <a:r>
-              <a:rPr lang="it-IT" sz="1400" dirty="0">
+              <a:rPr lang="it-IT" sz="1600" dirty="0">
                 <a:solidFill>
                   <a:srgbClr val="FFFFFF"/>
                 </a:solidFill>
@@ -9362,7 +9272,7 @@
               <a:t> </a:t>
             </a:r>
             <a:r>
-              <a:rPr lang="it-IT" sz="1400" dirty="0" err="1" smtClean="0">
+              <a:rPr lang="it-IT" sz="1600" dirty="0" err="1" smtClean="0">
                 <a:solidFill>
                   <a:srgbClr val="FFFFFF"/>
                 </a:solidFill>
@@ -9372,7 +9282,7 @@
               <a:t>expir</a:t>
             </a:r>
             <a:r>
-              <a:rPr lang="it-IT" sz="1400" dirty="0">
+              <a:rPr lang="it-IT" sz="1600" dirty="0">
                 <a:solidFill>
                   <a:srgbClr val="FFFFFF"/>
                 </a:solidFill>
@@ -9382,7 +9292,7 @@
               <a:t>.</a:t>
             </a:r>
             <a:r>
-              <a:rPr lang="it-IT" sz="1400" dirty="0" smtClean="0">
+              <a:rPr lang="it-IT" sz="1600" dirty="0" smtClean="0">
                 <a:solidFill>
                   <a:srgbClr val="FFFFFF"/>
                 </a:solidFill>
@@ -9392,7 +9302,7 @@
               <a:t>)</a:t>
             </a:r>
             <a:r>
-              <a:rPr lang="it-IT" sz="1400" dirty="0" smtClean="0">
+              <a:rPr lang="it-IT" sz="1600" dirty="0" smtClean="0">
                 <a:solidFill>
                   <a:srgbClr val="FFFFFF"/>
                 </a:solidFill>
@@ -9404,7 +9314,7 @@
           </a:p>
           <a:p>
             <a:r>
-              <a:rPr lang="it-IT" sz="1400" dirty="0" smtClean="0">
+              <a:rPr lang="it-IT" sz="1600" dirty="0" smtClean="0">
                 <a:solidFill>
                   <a:srgbClr val="FFFFFF"/>
                 </a:solidFill>
@@ -9414,7 +9324,7 @@
               <a:t>S</a:t>
             </a:r>
             <a:r>
-              <a:rPr lang="it-IT" sz="1400" dirty="0">
+              <a:rPr lang="it-IT" sz="1600" dirty="0">
                 <a:solidFill>
                   <a:srgbClr val="FFFFFF"/>
                 </a:solidFill>
@@ -9545,36 +9455,6 @@
           <a:chExt cx="0" cy="0"/>
         </a:xfrm>
       </p:grpSpPr>
-      <p:pic>
-        <p:nvPicPr>
-          <p:cNvPr id="5" name="Immagine 4" descr="metislogo.png"/>
-          <p:cNvPicPr>
-            <a:picLocks noChangeAspect="1"/>
-          </p:cNvPicPr>
-          <p:nvPr/>
-        </p:nvPicPr>
-        <p:blipFill>
-          <a:blip r:embed="rId3">
-            <a:extLst>
-              <a:ext uri="{28A0092B-C50C-407E-A947-70E740481C1C}">
-                <a14:useLocalDpi xmlns:a14="http://schemas.microsoft.com/office/drawing/2010/main" val="0"/>
-              </a:ext>
-            </a:extLst>
-          </a:blip>
-          <a:stretch>
-            <a:fillRect/>
-          </a:stretch>
-        </p:blipFill>
-        <p:spPr>
-          <a:xfrm>
-            <a:off x="8511836" y="71505"/>
-            <a:ext cx="561340" cy="904240"/>
-          </a:xfrm>
-          <a:prstGeom prst="rect">
-            <a:avLst/>
-          </a:prstGeom>
-        </p:spPr>
-      </p:pic>
       <p:sp>
         <p:nvSpPr>
           <p:cNvPr id="6" name="Segnaposto contenuto 2"/>
@@ -9585,7 +9465,7 @@
         </p:nvSpPr>
         <p:spPr>
           <a:xfrm>
-            <a:off x="2004207" y="4121080"/>
+            <a:off x="1264647" y="4231256"/>
             <a:ext cx="1603946" cy="606181"/>
           </a:xfrm>
           <a:prstGeom prst="rect">
@@ -9814,7 +9694,7 @@
         </p:nvSpPr>
         <p:spPr>
           <a:xfrm>
-            <a:off x="3336097" y="3758804"/>
+            <a:off x="2596537" y="3868980"/>
             <a:ext cx="1371600" cy="1371600"/>
           </a:xfrm>
           <a:prstGeom prst="mathMinus">
@@ -9852,7 +9732,7 @@
         </p:nvCxnSpPr>
         <p:spPr>
           <a:xfrm>
-            <a:off x="3588905" y="3147192"/>
+            <a:off x="2849345" y="3257368"/>
             <a:ext cx="1739351" cy="0"/>
           </a:xfrm>
           <a:prstGeom prst="line">
@@ -9882,7 +9762,7 @@
         </p:nvCxnSpPr>
         <p:spPr>
           <a:xfrm>
-            <a:off x="3608153" y="5695900"/>
+            <a:off x="2868593" y="5806076"/>
             <a:ext cx="1640472" cy="0"/>
           </a:xfrm>
           <a:prstGeom prst="line">
@@ -9912,7 +9792,7 @@
         </p:nvSpPr>
         <p:spPr>
           <a:xfrm>
-            <a:off x="4763993" y="3175224"/>
+            <a:off x="4024433" y="3285400"/>
             <a:ext cx="484632" cy="2520676"/>
           </a:xfrm>
           <a:prstGeom prst="upDownArrow">
@@ -9950,7 +9830,7 @@
         </p:nvSpPr>
         <p:spPr>
           <a:xfrm rot="16200000">
-            <a:off x="3486942" y="3467783"/>
+            <a:off x="2747382" y="3577959"/>
             <a:ext cx="1069749" cy="484632"/>
           </a:xfrm>
           <a:prstGeom prst="stripedRightArrow">
@@ -9988,7 +9868,7 @@
         </p:nvSpPr>
         <p:spPr>
           <a:xfrm rot="5400000">
-            <a:off x="3497553" y="4929321"/>
+            <a:off x="2757993" y="5039497"/>
             <a:ext cx="1048527" cy="484632"/>
           </a:xfrm>
           <a:prstGeom prst="stripedRightArrow">
@@ -10028,7 +9908,7 @@
         </p:nvSpPr>
         <p:spPr>
           <a:xfrm>
-            <a:off x="5145955" y="3424580"/>
+            <a:off x="4406395" y="3534756"/>
             <a:ext cx="1747689" cy="1112617"/>
           </a:xfrm>
           <a:prstGeom prst="rect">
@@ -10362,7 +10242,7 @@
         </p:nvSpPr>
         <p:spPr>
           <a:xfrm>
-            <a:off x="3484476" y="2822460"/>
+            <a:off x="2744916" y="2932636"/>
             <a:ext cx="2049372" cy="403904"/>
           </a:xfrm>
           <a:prstGeom prst="rect">
@@ -10620,7 +10500,7 @@
         </p:nvSpPr>
         <p:spPr>
           <a:xfrm>
-            <a:off x="3484476" y="5695900"/>
+            <a:off x="2744916" y="5806076"/>
             <a:ext cx="2058993" cy="403904"/>
           </a:xfrm>
           <a:prstGeom prst="rect">
@@ -11093,8 +10973,25 @@
                 <a:latin typeface="Avenir Light"/>
                 <a:cs typeface="Avenir Light"/>
               </a:rPr>
-              <a:t> in Graphics</a:t>
-            </a:r>
+              <a:t>: 3 </a:t>
+            </a:r>
+            <a:r>
+              <a:rPr lang="it-IT" sz="2400" dirty="0" err="1" smtClean="0">
+                <a:solidFill>
+                  <a:srgbClr val="FFFFFF"/>
+                </a:solidFill>
+                <a:latin typeface="Avenir Light"/>
+                <a:cs typeface="Avenir Light"/>
+              </a:rPr>
+              <a:t>conditions</a:t>
+            </a:r>
+            <a:endParaRPr lang="it-IT" sz="2400" dirty="0" smtClean="0">
+              <a:solidFill>
+                <a:srgbClr val="FFFFFF"/>
+              </a:solidFill>
+              <a:latin typeface="Avenir Light"/>
+              <a:cs typeface="Avenir Light"/>
+            </a:endParaRPr>
           </a:p>
         </p:txBody>
       </p:sp>
@@ -11106,7 +11003,7 @@
         </p:nvCxnSpPr>
         <p:spPr>
           <a:xfrm flipV="1">
-            <a:off x="3608153" y="6185104"/>
+            <a:off x="2868593" y="6295280"/>
             <a:ext cx="4411562" cy="10682"/>
           </a:xfrm>
           <a:prstGeom prst="line">
@@ -11136,7 +11033,7 @@
         </p:nvSpPr>
         <p:spPr>
           <a:xfrm rot="16200000">
-            <a:off x="6489087" y="4766667"/>
+            <a:off x="5749527" y="4876843"/>
             <a:ext cx="1647903" cy="1188965"/>
           </a:xfrm>
           <a:prstGeom prst="notchedRightArrow">
@@ -11204,7 +11101,7 @@
         </p:nvSpPr>
         <p:spPr>
           <a:xfrm>
-            <a:off x="6433162" y="6195786"/>
+            <a:off x="5693602" y="6305962"/>
             <a:ext cx="1721247" cy="403904"/>
           </a:xfrm>
           <a:prstGeom prst="rect">
@@ -11442,7 +11339,7 @@
         </p:nvSpPr>
         <p:spPr>
           <a:xfrm>
-            <a:off x="7620162" y="5315513"/>
+            <a:off x="6880602" y="5425689"/>
             <a:ext cx="1077643" cy="403904"/>
           </a:xfrm>
           <a:prstGeom prst="rect">
@@ -11648,8 +11545,8 @@
         </p:nvSpPr>
         <p:spPr>
           <a:xfrm>
-            <a:off x="769717" y="966373"/>
-            <a:ext cx="7639444" cy="1384995"/>
+            <a:off x="1844091" y="1227341"/>
+            <a:ext cx="5364739" cy="1169551"/>
           </a:xfrm>
           <a:prstGeom prst="rect">
             <a:avLst/>
@@ -11662,58 +11559,100 @@
           </a:bodyPr>
           <a:lstStyle/>
           <a:p>
-            <a:pPr algn="ctr"/>
-            <a:r>
-              <a:rPr lang="it-IT" sz="2000" dirty="0" smtClean="0">
+            <a:pPr marL="342900" indent="-342900" algn="just">
+              <a:buAutoNum type="arabicPeriod"/>
+            </a:pPr>
+            <a:r>
+              <a:rPr lang="it-IT" dirty="0" err="1" smtClean="0">
                 <a:solidFill>
                   <a:schemeClr val="bg1"/>
                 </a:solidFill>
                 <a:latin typeface="Avenir Light"/>
                 <a:cs typeface="Avenir Light"/>
               </a:rPr>
-              <a:t>3 </a:t>
-            </a:r>
-            <a:r>
-              <a:rPr lang="it-IT" sz="2000" dirty="0" err="1" smtClean="0">
+              <a:t>Current</a:t>
+            </a:r>
+            <a:r>
+              <a:rPr lang="it-IT" dirty="0" smtClean="0">
                 <a:solidFill>
                   <a:schemeClr val="bg1"/>
                 </a:solidFill>
                 <a:latin typeface="Avenir Light"/>
                 <a:cs typeface="Avenir Light"/>
               </a:rPr>
-              <a:t>conditions</a:t>
-            </a:r>
-            <a:r>
-              <a:rPr lang="it-IT" sz="2000" dirty="0" smtClean="0">
+              <a:t> </a:t>
+            </a:r>
+            <a:r>
+              <a:rPr lang="it-IT" dirty="0" smtClean="0">
                 <a:solidFill>
                   <a:schemeClr val="bg1"/>
                 </a:solidFill>
                 <a:latin typeface="Avenir Light"/>
                 <a:cs typeface="Avenir Light"/>
               </a:rPr>
-              <a:t> to be </a:t>
-            </a:r>
-            <a:r>
-              <a:rPr lang="it-IT" sz="2000" dirty="0" err="1" smtClean="0">
+              <a:t>Price </a:t>
+            </a:r>
+            <a:r>
+              <a:rPr lang="it-IT" dirty="0" err="1" smtClean="0">
                 <a:solidFill>
                   <a:schemeClr val="bg1"/>
                 </a:solidFill>
                 <a:latin typeface="Avenir Light"/>
                 <a:cs typeface="Avenir Light"/>
               </a:rPr>
-              <a:t>verified</a:t>
-            </a:r>
-            <a:r>
-              <a:rPr lang="it-IT" sz="2000" dirty="0">
+              <a:t>outside</a:t>
+            </a:r>
+            <a:r>
+              <a:rPr lang="it-IT" dirty="0" smtClean="0">
                 <a:solidFill>
                   <a:schemeClr val="bg1"/>
                 </a:solidFill>
                 <a:latin typeface="Avenir Light"/>
                 <a:cs typeface="Avenir Light"/>
               </a:rPr>
-              <a:t>:</a:t>
-            </a:r>
-            <a:endParaRPr lang="it-IT" sz="2000" dirty="0" smtClean="0">
+              <a:t> the </a:t>
+            </a:r>
+            <a:r>
+              <a:rPr lang="it-IT" dirty="0" err="1">
+                <a:solidFill>
+                  <a:schemeClr val="bg1"/>
+                </a:solidFill>
+                <a:latin typeface="Avenir Light"/>
+                <a:cs typeface="Avenir Light"/>
+              </a:rPr>
+              <a:t>P</a:t>
+            </a:r>
+            <a:r>
+              <a:rPr lang="it-IT" dirty="0" err="1" smtClean="0">
+                <a:solidFill>
+                  <a:schemeClr val="bg1"/>
+                </a:solidFill>
+                <a:latin typeface="Avenir Light"/>
+                <a:cs typeface="Avenir Light"/>
+              </a:rPr>
+              <a:t>redicted</a:t>
+            </a:r>
+            <a:r>
+              <a:rPr lang="it-IT" dirty="0" smtClean="0">
+                <a:solidFill>
+                  <a:schemeClr val="bg1"/>
+                </a:solidFill>
+                <a:latin typeface="Avenir Light"/>
+                <a:cs typeface="Avenir Light"/>
+              </a:rPr>
+              <a:t> Price </a:t>
+            </a:r>
+            <a:r>
+              <a:rPr lang="it-IT" dirty="0" err="1" smtClean="0">
+                <a:solidFill>
+                  <a:schemeClr val="bg1"/>
+                </a:solidFill>
+                <a:latin typeface="Avenir Light"/>
+                <a:cs typeface="Avenir Light"/>
+              </a:rPr>
+              <a:t>Range</a:t>
+            </a:r>
+            <a:endParaRPr lang="it-IT" dirty="0" smtClean="0">
               <a:solidFill>
                 <a:schemeClr val="bg1"/>
               </a:solidFill>
@@ -11722,8 +11661,10 @@
             </a:endParaRPr>
           </a:p>
           <a:p>
-            <a:pPr algn="ctr"/>
-            <a:endParaRPr lang="it-IT" sz="1600" dirty="0">
+            <a:pPr marL="342900" indent="-342900" algn="just">
+              <a:buAutoNum type="arabicPeriod"/>
+            </a:pPr>
+            <a:endParaRPr lang="it-IT" sz="800" dirty="0" smtClean="0">
               <a:solidFill>
                 <a:schemeClr val="bg1"/>
               </a:solidFill>
@@ -11732,90 +11673,80 @@
             </a:endParaRPr>
           </a:p>
           <a:p>
-            <a:pPr marL="342900" indent="-342900" algn="ctr">
+            <a:pPr marL="342900" indent="-342900" algn="just">
               <a:buAutoNum type="arabicPeriod"/>
             </a:pPr>
             <a:r>
-              <a:rPr lang="it-IT" sz="1600" dirty="0" err="1" smtClean="0">
+              <a:rPr lang="it-IT" dirty="0" smtClean="0">
                 <a:solidFill>
                   <a:schemeClr val="bg1"/>
                 </a:solidFill>
                 <a:latin typeface="Avenir Light"/>
                 <a:cs typeface="Avenir Light"/>
               </a:rPr>
-              <a:t>Current</a:t>
-            </a:r>
-            <a:r>
-              <a:rPr lang="it-IT" sz="1600" dirty="0" smtClean="0">
+              <a:t>5th </a:t>
+            </a:r>
+            <a:r>
+              <a:rPr lang="it-IT" dirty="0" err="1" smtClean="0">
                 <a:solidFill>
                   <a:schemeClr val="bg1"/>
                 </a:solidFill>
                 <a:latin typeface="Avenir Light"/>
                 <a:cs typeface="Avenir Light"/>
               </a:rPr>
-              <a:t> Price </a:t>
-            </a:r>
-            <a:r>
-              <a:rPr lang="it-IT" sz="1600" dirty="0" err="1" smtClean="0">
+              <a:t>Element</a:t>
+            </a:r>
+            <a:r>
+              <a:rPr lang="it-IT" dirty="0" smtClean="0">
                 <a:solidFill>
                   <a:schemeClr val="bg1"/>
                 </a:solidFill>
                 <a:latin typeface="Avenir Light"/>
                 <a:cs typeface="Avenir Light"/>
               </a:rPr>
-              <a:t>outside</a:t>
-            </a:r>
-            <a:r>
-              <a:rPr lang="it-IT" sz="1600" dirty="0" smtClean="0">
+              <a:t> </a:t>
+            </a:r>
+            <a:r>
+              <a:rPr lang="it-IT" dirty="0" err="1" smtClean="0">
                 <a:solidFill>
                   <a:schemeClr val="bg1"/>
                 </a:solidFill>
                 <a:latin typeface="Avenir Light"/>
                 <a:cs typeface="Avenir Light"/>
               </a:rPr>
-              <a:t> the </a:t>
-            </a:r>
-            <a:r>
-              <a:rPr lang="it-IT" sz="1600" dirty="0" err="1">
+              <a:t>pointing</a:t>
+            </a:r>
+            <a:r>
+              <a:rPr lang="it-IT" dirty="0" smtClean="0">
                 <a:solidFill>
                   <a:schemeClr val="bg1"/>
                 </a:solidFill>
                 <a:latin typeface="Avenir Light"/>
                 <a:cs typeface="Avenir Light"/>
               </a:rPr>
-              <a:t>P</a:t>
-            </a:r>
-            <a:r>
-              <a:rPr lang="it-IT" sz="1600" dirty="0" err="1" smtClean="0">
+              <a:t> to the Price </a:t>
+            </a:r>
+            <a:r>
+              <a:rPr lang="it-IT" dirty="0" err="1">
                 <a:solidFill>
                   <a:schemeClr val="bg1"/>
                 </a:solidFill>
                 <a:latin typeface="Avenir Light"/>
                 <a:cs typeface="Avenir Light"/>
               </a:rPr>
-              <a:t>redicted</a:t>
-            </a:r>
-            <a:r>
-              <a:rPr lang="it-IT" sz="1600" dirty="0" smtClean="0">
+              <a:t>R</a:t>
+            </a:r>
+            <a:r>
+              <a:rPr lang="it-IT" dirty="0" err="1" smtClean="0">
                 <a:solidFill>
                   <a:schemeClr val="bg1"/>
                 </a:solidFill>
                 <a:latin typeface="Avenir Light"/>
                 <a:cs typeface="Avenir Light"/>
               </a:rPr>
-              <a:t> Price </a:t>
-            </a:r>
-            <a:r>
-              <a:rPr lang="it-IT" sz="1600" dirty="0" err="1" smtClean="0">
-                <a:solidFill>
-                  <a:schemeClr val="bg1"/>
-                </a:solidFill>
-                <a:latin typeface="Avenir Light"/>
-                <a:cs typeface="Avenir Light"/>
-              </a:rPr>
-              <a:t>Range</a:t>
-            </a:r>
-            <a:endParaRPr lang="it-IT" sz="1600" dirty="0" smtClean="0">
+              <a:t>ange</a:t>
+            </a:r>
+            <a:endParaRPr lang="it-IT" dirty="0" smtClean="0">
               <a:solidFill>
                 <a:schemeClr val="bg1"/>
               </a:solidFill>
@@ -11824,80 +11755,10 @@
             </a:endParaRPr>
           </a:p>
           <a:p>
-            <a:pPr marL="342900" indent="-342900" algn="ctr">
+            <a:pPr marL="342900" indent="-342900" algn="just">
               <a:buAutoNum type="arabicPeriod"/>
             </a:pPr>
-            <a:r>
-              <a:rPr lang="it-IT" sz="1600" dirty="0" smtClean="0">
-                <a:solidFill>
-                  <a:schemeClr val="bg1"/>
-                </a:solidFill>
-                <a:latin typeface="Avenir Light"/>
-                <a:cs typeface="Avenir Light"/>
-              </a:rPr>
-              <a:t>5th </a:t>
-            </a:r>
-            <a:r>
-              <a:rPr lang="it-IT" sz="1600" dirty="0" err="1" smtClean="0">
-                <a:solidFill>
-                  <a:schemeClr val="bg1"/>
-                </a:solidFill>
-                <a:latin typeface="Avenir Light"/>
-                <a:cs typeface="Avenir Light"/>
-              </a:rPr>
-              <a:t>Element</a:t>
-            </a:r>
-            <a:r>
-              <a:rPr lang="it-IT" sz="1600" dirty="0" smtClean="0">
-                <a:solidFill>
-                  <a:schemeClr val="bg1"/>
-                </a:solidFill>
-                <a:latin typeface="Avenir Light"/>
-                <a:cs typeface="Avenir Light"/>
-              </a:rPr>
-              <a:t> </a:t>
-            </a:r>
-            <a:r>
-              <a:rPr lang="it-IT" sz="1600" dirty="0" err="1" smtClean="0">
-                <a:solidFill>
-                  <a:schemeClr val="bg1"/>
-                </a:solidFill>
-                <a:latin typeface="Avenir Light"/>
-                <a:cs typeface="Avenir Light"/>
-              </a:rPr>
-              <a:t>pointing</a:t>
-            </a:r>
-            <a:r>
-              <a:rPr lang="it-IT" sz="1600" dirty="0" smtClean="0">
-                <a:solidFill>
-                  <a:schemeClr val="bg1"/>
-                </a:solidFill>
-                <a:latin typeface="Avenir Light"/>
-                <a:cs typeface="Avenir Light"/>
-              </a:rPr>
-              <a:t> to the Price </a:t>
-            </a:r>
-            <a:r>
-              <a:rPr lang="it-IT" sz="1600" dirty="0" err="1">
-                <a:solidFill>
-                  <a:schemeClr val="bg1"/>
-                </a:solidFill>
-                <a:latin typeface="Avenir Light"/>
-                <a:cs typeface="Avenir Light"/>
-              </a:rPr>
-              <a:t>R</a:t>
-            </a:r>
-            <a:r>
-              <a:rPr lang="it-IT" sz="1600" dirty="0" err="1" smtClean="0">
-                <a:solidFill>
-                  <a:schemeClr val="bg1"/>
-                </a:solidFill>
-                <a:latin typeface="Avenir Light"/>
-                <a:cs typeface="Avenir Light"/>
-              </a:rPr>
-              <a:t>ange</a:t>
-            </a:r>
-            <a:endParaRPr lang="it-IT" sz="1600" dirty="0" smtClean="0">
+            <a:endParaRPr lang="it-IT" sz="800" dirty="0" smtClean="0">
               <a:solidFill>
                 <a:schemeClr val="bg1"/>
               </a:solidFill>
@@ -11906,11 +11767,11 @@
             </a:endParaRPr>
           </a:p>
           <a:p>
-            <a:pPr marL="342900" indent="-342900" algn="ctr">
+            <a:pPr marL="342900" indent="-342900" algn="just">
               <a:buAutoNum type="arabicPeriod"/>
             </a:pPr>
             <a:r>
-              <a:rPr lang="it-IT" sz="1600" dirty="0" smtClean="0">
+              <a:rPr lang="it-IT" dirty="0" smtClean="0">
                 <a:solidFill>
                   <a:schemeClr val="bg1"/>
                 </a:solidFill>
@@ -11920,7 +11781,7 @@
               <a:t>5th </a:t>
             </a:r>
             <a:r>
-              <a:rPr lang="it-IT" sz="1600" dirty="0" err="1" smtClean="0">
+              <a:rPr lang="it-IT" dirty="0" err="1" smtClean="0">
                 <a:solidFill>
                   <a:schemeClr val="bg1"/>
                 </a:solidFill>
@@ -11930,7 +11791,7 @@
               <a:t>Element</a:t>
             </a:r>
             <a:r>
-              <a:rPr lang="it-IT" sz="1600" dirty="0" smtClean="0">
+              <a:rPr lang="it-IT" dirty="0" smtClean="0">
                 <a:solidFill>
                   <a:schemeClr val="bg1"/>
                 </a:solidFill>
@@ -11939,7 +11800,7 @@
               </a:rPr>
               <a:t> Value &gt; 1%</a:t>
             </a:r>
-            <a:endParaRPr lang="it-IT" sz="1600" dirty="0">
+            <a:endParaRPr lang="it-IT" dirty="0">
               <a:solidFill>
                 <a:schemeClr val="bg1"/>
               </a:solidFill>
@@ -11986,9 +11847,793 @@
           <a:chExt cx="0" cy="0"/>
         </a:xfrm>
       </p:grpSpPr>
+      <p:sp>
+        <p:nvSpPr>
+          <p:cNvPr id="6" name="Segnaposto contenuto 2"/>
+          <p:cNvSpPr txBox="1">
+            <a:spLocks/>
+          </p:cNvSpPr>
+          <p:nvPr/>
+        </p:nvSpPr>
+        <p:spPr>
+          <a:xfrm>
+            <a:off x="0" y="73880"/>
+            <a:ext cx="9144000" cy="2915433"/>
+          </a:xfrm>
+          <a:prstGeom prst="rect">
+            <a:avLst/>
+          </a:prstGeom>
+        </p:spPr>
+        <p:txBody>
+          <a:bodyPr vert="horz" lIns="91440" tIns="45720" rIns="91440" bIns="45720" rtlCol="0">
+            <a:normAutofit/>
+          </a:bodyPr>
+          <a:lstStyle>
+            <a:lvl1pPr marL="0" indent="0" algn="ctr" defTabSz="457200" rtl="0" eaLnBrk="1" latinLnBrk="0" hangingPunct="1">
+              <a:spcBef>
+                <a:spcPct val="20000"/>
+              </a:spcBef>
+              <a:buFont typeface="Arial"/>
+              <a:buNone/>
+              <a:defRPr sz="3200" kern="1200">
+                <a:solidFill>
+                  <a:schemeClr val="tx1">
+                    <a:tint val="75000"/>
+                  </a:schemeClr>
+                </a:solidFill>
+                <a:latin typeface="+mn-lt"/>
+                <a:ea typeface="+mn-ea"/>
+                <a:cs typeface="+mn-cs"/>
+              </a:defRPr>
+            </a:lvl1pPr>
+            <a:lvl2pPr marL="457200" indent="0" algn="ctr" defTabSz="457200" rtl="0" eaLnBrk="1" latinLnBrk="0" hangingPunct="1">
+              <a:spcBef>
+                <a:spcPct val="20000"/>
+              </a:spcBef>
+              <a:buFont typeface="Arial"/>
+              <a:buNone/>
+              <a:defRPr sz="2800" kern="1200">
+                <a:solidFill>
+                  <a:schemeClr val="tx1">
+                    <a:tint val="75000"/>
+                  </a:schemeClr>
+                </a:solidFill>
+                <a:latin typeface="+mn-lt"/>
+                <a:ea typeface="+mn-ea"/>
+                <a:cs typeface="+mn-cs"/>
+              </a:defRPr>
+            </a:lvl2pPr>
+            <a:lvl3pPr marL="914400" indent="0" algn="ctr" defTabSz="457200" rtl="0" eaLnBrk="1" latinLnBrk="0" hangingPunct="1">
+              <a:spcBef>
+                <a:spcPct val="20000"/>
+              </a:spcBef>
+              <a:buFont typeface="Arial"/>
+              <a:buNone/>
+              <a:defRPr sz="2400" kern="1200">
+                <a:solidFill>
+                  <a:schemeClr val="tx1">
+                    <a:tint val="75000"/>
+                  </a:schemeClr>
+                </a:solidFill>
+                <a:latin typeface="+mn-lt"/>
+                <a:ea typeface="+mn-ea"/>
+                <a:cs typeface="+mn-cs"/>
+              </a:defRPr>
+            </a:lvl3pPr>
+            <a:lvl4pPr marL="1371600" indent="0" algn="ctr" defTabSz="457200" rtl="0" eaLnBrk="1" latinLnBrk="0" hangingPunct="1">
+              <a:spcBef>
+                <a:spcPct val="20000"/>
+              </a:spcBef>
+              <a:buFont typeface="Arial"/>
+              <a:buNone/>
+              <a:defRPr sz="2000" kern="1200">
+                <a:solidFill>
+                  <a:schemeClr val="tx1">
+                    <a:tint val="75000"/>
+                  </a:schemeClr>
+                </a:solidFill>
+                <a:latin typeface="+mn-lt"/>
+                <a:ea typeface="+mn-ea"/>
+                <a:cs typeface="+mn-cs"/>
+              </a:defRPr>
+            </a:lvl4pPr>
+            <a:lvl5pPr marL="1828800" indent="0" algn="ctr" defTabSz="457200" rtl="0" eaLnBrk="1" latinLnBrk="0" hangingPunct="1">
+              <a:spcBef>
+                <a:spcPct val="20000"/>
+              </a:spcBef>
+              <a:buFont typeface="Arial"/>
+              <a:buNone/>
+              <a:defRPr sz="2000" kern="1200">
+                <a:solidFill>
+                  <a:schemeClr val="tx1">
+                    <a:tint val="75000"/>
+                  </a:schemeClr>
+                </a:solidFill>
+                <a:latin typeface="+mn-lt"/>
+                <a:ea typeface="+mn-ea"/>
+                <a:cs typeface="+mn-cs"/>
+              </a:defRPr>
+            </a:lvl5pPr>
+            <a:lvl6pPr marL="2286000" indent="0" algn="ctr" defTabSz="457200" rtl="0" eaLnBrk="1" latinLnBrk="0" hangingPunct="1">
+              <a:spcBef>
+                <a:spcPct val="20000"/>
+              </a:spcBef>
+              <a:buFont typeface="Arial"/>
+              <a:buNone/>
+              <a:defRPr sz="2000" kern="1200">
+                <a:solidFill>
+                  <a:schemeClr val="tx1">
+                    <a:tint val="75000"/>
+                  </a:schemeClr>
+                </a:solidFill>
+                <a:latin typeface="+mn-lt"/>
+                <a:ea typeface="+mn-ea"/>
+                <a:cs typeface="+mn-cs"/>
+              </a:defRPr>
+            </a:lvl6pPr>
+            <a:lvl7pPr marL="2743200" indent="0" algn="ctr" defTabSz="457200" rtl="0" eaLnBrk="1" latinLnBrk="0" hangingPunct="1">
+              <a:spcBef>
+                <a:spcPct val="20000"/>
+              </a:spcBef>
+              <a:buFont typeface="Arial"/>
+              <a:buNone/>
+              <a:defRPr sz="2000" kern="1200">
+                <a:solidFill>
+                  <a:schemeClr val="tx1">
+                    <a:tint val="75000"/>
+                  </a:schemeClr>
+                </a:solidFill>
+                <a:latin typeface="+mn-lt"/>
+                <a:ea typeface="+mn-ea"/>
+                <a:cs typeface="+mn-cs"/>
+              </a:defRPr>
+            </a:lvl7pPr>
+            <a:lvl8pPr marL="3200400" indent="0" algn="ctr" defTabSz="457200" rtl="0" eaLnBrk="1" latinLnBrk="0" hangingPunct="1">
+              <a:spcBef>
+                <a:spcPct val="20000"/>
+              </a:spcBef>
+              <a:buFont typeface="Arial"/>
+              <a:buNone/>
+              <a:defRPr sz="2000" kern="1200">
+                <a:solidFill>
+                  <a:schemeClr val="tx1">
+                    <a:tint val="75000"/>
+                  </a:schemeClr>
+                </a:solidFill>
+                <a:latin typeface="+mn-lt"/>
+                <a:ea typeface="+mn-ea"/>
+                <a:cs typeface="+mn-cs"/>
+              </a:defRPr>
+            </a:lvl8pPr>
+            <a:lvl9pPr marL="3657600" indent="0" algn="ctr" defTabSz="457200" rtl="0" eaLnBrk="1" latinLnBrk="0" hangingPunct="1">
+              <a:spcBef>
+                <a:spcPct val="20000"/>
+              </a:spcBef>
+              <a:buFont typeface="Arial"/>
+              <a:buNone/>
+              <a:defRPr sz="2000" kern="1200">
+                <a:solidFill>
+                  <a:schemeClr val="tx1">
+                    <a:tint val="75000"/>
+                  </a:schemeClr>
+                </a:solidFill>
+                <a:latin typeface="+mn-lt"/>
+                <a:ea typeface="+mn-ea"/>
+                <a:cs typeface="+mn-cs"/>
+              </a:defRPr>
+            </a:lvl9pPr>
+          </a:lstStyle>
+          <a:p>
+            <a:r>
+              <a:rPr lang="it-IT" sz="2400" dirty="0" smtClean="0">
+                <a:solidFill>
+                  <a:srgbClr val="FFFFFF"/>
+                </a:solidFill>
+                <a:latin typeface="Avenir Light"/>
+                <a:cs typeface="Avenir Light"/>
+              </a:rPr>
+              <a:t>The </a:t>
+            </a:r>
+            <a:r>
+              <a:rPr lang="it-IT" sz="2400" dirty="0" err="1" smtClean="0">
+                <a:solidFill>
+                  <a:srgbClr val="FFFFFF"/>
+                </a:solidFill>
+                <a:latin typeface="Avenir Light"/>
+                <a:cs typeface="Avenir Light"/>
+              </a:rPr>
+              <a:t>Outcomes</a:t>
+            </a:r>
+            <a:endParaRPr lang="it-IT" sz="2400" dirty="0" smtClean="0">
+              <a:solidFill>
+                <a:srgbClr val="FFFFFF"/>
+              </a:solidFill>
+              <a:latin typeface="Avenir Light"/>
+              <a:cs typeface="Avenir Light"/>
+            </a:endParaRPr>
+          </a:p>
+          <a:p>
+            <a:endParaRPr lang="it-IT" sz="1200" dirty="0" smtClean="0">
+              <a:solidFill>
+                <a:srgbClr val="FFFFFF"/>
+              </a:solidFill>
+              <a:latin typeface="Avenir Light"/>
+              <a:cs typeface="Avenir Light"/>
+            </a:endParaRPr>
+          </a:p>
+          <a:p>
+            <a:r>
+              <a:rPr lang="it-IT" sz="1800" dirty="0" err="1" smtClean="0">
+                <a:solidFill>
+                  <a:srgbClr val="FFFFFF"/>
+                </a:solidFill>
+                <a:latin typeface="Avenir Light"/>
+                <a:cs typeface="Avenir Light"/>
+              </a:rPr>
+              <a:t>Based</a:t>
+            </a:r>
+            <a:r>
+              <a:rPr lang="it-IT" sz="1800" dirty="0" smtClean="0">
+                <a:solidFill>
+                  <a:srgbClr val="FFFFFF"/>
+                </a:solidFill>
+                <a:latin typeface="Avenir Light"/>
+                <a:cs typeface="Avenir Light"/>
+              </a:rPr>
+              <a:t> </a:t>
+            </a:r>
+            <a:r>
+              <a:rPr lang="it-IT" sz="1800" dirty="0" err="1" smtClean="0">
+                <a:solidFill>
+                  <a:srgbClr val="FFFFFF"/>
+                </a:solidFill>
+                <a:latin typeface="Avenir Light"/>
+                <a:cs typeface="Avenir Light"/>
+              </a:rPr>
+              <a:t>upon</a:t>
+            </a:r>
+            <a:r>
+              <a:rPr lang="it-IT" sz="1800" dirty="0" smtClean="0">
+                <a:solidFill>
+                  <a:srgbClr val="FFFFFF"/>
+                </a:solidFill>
+                <a:latin typeface="Avenir Light"/>
+                <a:cs typeface="Avenir Light"/>
+              </a:rPr>
+              <a:t> </a:t>
+            </a:r>
+            <a:r>
+              <a:rPr lang="it-IT" sz="1800" dirty="0" err="1" smtClean="0">
+                <a:solidFill>
+                  <a:srgbClr val="FFFFFF"/>
+                </a:solidFill>
+                <a:latin typeface="Avenir Light"/>
+                <a:cs typeface="Avenir Light"/>
+              </a:rPr>
+              <a:t>available</a:t>
+            </a:r>
+            <a:r>
+              <a:rPr lang="it-IT" sz="1800" dirty="0" smtClean="0">
+                <a:solidFill>
+                  <a:srgbClr val="FFFFFF"/>
+                </a:solidFill>
+                <a:latin typeface="Avenir Light"/>
+                <a:cs typeface="Avenir Light"/>
+              </a:rPr>
+              <a:t> data, </a:t>
+            </a:r>
+            <a:r>
+              <a:rPr lang="it-IT" sz="1800" dirty="0" err="1" smtClean="0">
+                <a:solidFill>
+                  <a:srgbClr val="FFFFFF"/>
+                </a:solidFill>
+                <a:latin typeface="Avenir Light"/>
+                <a:cs typeface="Avenir Light"/>
+              </a:rPr>
+              <a:t>every</a:t>
+            </a:r>
+            <a:r>
+              <a:rPr lang="it-IT" sz="1800" dirty="0" smtClean="0">
+                <a:solidFill>
+                  <a:srgbClr val="FFFFFF"/>
+                </a:solidFill>
+                <a:latin typeface="Avenir Light"/>
+                <a:cs typeface="Avenir Light"/>
+              </a:rPr>
+              <a:t> </a:t>
+            </a:r>
+            <a:r>
+              <a:rPr lang="it-IT" sz="1800" dirty="0" smtClean="0">
+                <a:solidFill>
+                  <a:srgbClr val="FFFFFF"/>
+                </a:solidFill>
+                <a:latin typeface="Avenir Light"/>
+                <a:cs typeface="Avenir Light"/>
+              </a:rPr>
+              <a:t>“</a:t>
+            </a:r>
+            <a:r>
+              <a:rPr lang="it-IT" sz="1800" dirty="0" err="1" smtClean="0">
+                <a:solidFill>
+                  <a:srgbClr val="FFFFFF"/>
+                </a:solidFill>
+                <a:latin typeface="Avenir Light"/>
+                <a:cs typeface="Avenir Light"/>
+              </a:rPr>
+              <a:t>perfect</a:t>
+            </a:r>
+            <a:r>
+              <a:rPr lang="it-IT" sz="1800" dirty="0" smtClean="0">
+                <a:solidFill>
+                  <a:srgbClr val="FFFFFF"/>
+                </a:solidFill>
+                <a:latin typeface="Avenir Light"/>
+                <a:cs typeface="Avenir Light"/>
+              </a:rPr>
+              <a:t>” scenario </a:t>
+            </a:r>
+            <a:r>
+              <a:rPr lang="it-IT" sz="1800" dirty="0" err="1" smtClean="0">
+                <a:solidFill>
+                  <a:srgbClr val="FFFFFF"/>
+                </a:solidFill>
+                <a:latin typeface="Avenir Light"/>
+                <a:cs typeface="Avenir Light"/>
+              </a:rPr>
+              <a:t>assured</a:t>
+            </a:r>
+            <a:r>
+              <a:rPr lang="it-IT" sz="1800" dirty="0" smtClean="0">
+                <a:solidFill>
+                  <a:srgbClr val="FFFFFF"/>
+                </a:solidFill>
+                <a:latin typeface="Avenir Light"/>
+                <a:cs typeface="Avenir Light"/>
+              </a:rPr>
+              <a:t> 100% of </a:t>
+            </a:r>
+            <a:r>
+              <a:rPr lang="it-IT" sz="1800" dirty="0" err="1" smtClean="0">
+                <a:solidFill>
+                  <a:srgbClr val="FFFFFF"/>
+                </a:solidFill>
+                <a:latin typeface="Avenir Light"/>
+                <a:cs typeface="Avenir Light"/>
+              </a:rPr>
+              <a:t>profitable</a:t>
+            </a:r>
+            <a:r>
+              <a:rPr lang="it-IT" sz="1800" dirty="0" smtClean="0">
+                <a:solidFill>
+                  <a:srgbClr val="FFFFFF"/>
+                </a:solidFill>
+                <a:latin typeface="Avenir Light"/>
+                <a:cs typeface="Avenir Light"/>
+              </a:rPr>
+              <a:t> </a:t>
+            </a:r>
+            <a:r>
+              <a:rPr lang="it-IT" sz="1800" dirty="0" err="1" smtClean="0">
+                <a:solidFill>
+                  <a:srgbClr val="FFFFFF"/>
+                </a:solidFill>
+                <a:latin typeface="Avenir Light"/>
+                <a:cs typeface="Avenir Light"/>
+              </a:rPr>
+              <a:t>trades</a:t>
+            </a:r>
+            <a:endParaRPr lang="it-IT" sz="1800" dirty="0" smtClean="0">
+              <a:solidFill>
+                <a:srgbClr val="FFFFFF"/>
+              </a:solidFill>
+              <a:latin typeface="Avenir Light"/>
+              <a:cs typeface="Avenir Light"/>
+            </a:endParaRPr>
+          </a:p>
+          <a:p>
+            <a:endParaRPr lang="it-IT" sz="1200" dirty="0" smtClean="0">
+              <a:solidFill>
+                <a:srgbClr val="FFFFFF"/>
+              </a:solidFill>
+              <a:latin typeface="Avenir Light"/>
+              <a:cs typeface="Avenir Light"/>
+            </a:endParaRPr>
+          </a:p>
+          <a:p>
+            <a:r>
+              <a:rPr lang="it-IT" sz="1800" dirty="0" smtClean="0">
+                <a:solidFill>
+                  <a:srgbClr val="FFFFFF"/>
+                </a:solidFill>
+                <a:latin typeface="Avenir Light"/>
+                <a:cs typeface="Avenir Light"/>
+              </a:rPr>
+              <a:t>The </a:t>
+            </a:r>
+            <a:r>
+              <a:rPr lang="it-IT" sz="1800" dirty="0" err="1" smtClean="0">
+                <a:solidFill>
+                  <a:srgbClr val="FFFFFF"/>
+                </a:solidFill>
+                <a:latin typeface="Avenir Light"/>
+                <a:cs typeface="Avenir Light"/>
+              </a:rPr>
+              <a:t>perfect</a:t>
+            </a:r>
+            <a:r>
+              <a:rPr lang="it-IT" sz="1800" dirty="0" smtClean="0">
+                <a:solidFill>
+                  <a:srgbClr val="FFFFFF"/>
+                </a:solidFill>
+                <a:latin typeface="Avenir Light"/>
+                <a:cs typeface="Avenir Light"/>
+              </a:rPr>
+              <a:t> scenario </a:t>
+            </a:r>
+            <a:r>
+              <a:rPr lang="it-IT" sz="1800" dirty="0" err="1" smtClean="0">
+                <a:solidFill>
+                  <a:srgbClr val="FFFFFF"/>
+                </a:solidFill>
+                <a:latin typeface="Avenir Light"/>
+                <a:cs typeface="Avenir Light"/>
+              </a:rPr>
+              <a:t>occurred</a:t>
+            </a:r>
+            <a:r>
+              <a:rPr lang="it-IT" sz="1800" dirty="0" smtClean="0">
+                <a:solidFill>
+                  <a:srgbClr val="FFFFFF"/>
+                </a:solidFill>
+                <a:latin typeface="Avenir Light"/>
+                <a:cs typeface="Avenir Light"/>
+              </a:rPr>
+              <a:t> in </a:t>
+            </a:r>
+            <a:r>
+              <a:rPr lang="it-IT" sz="1800" dirty="0" err="1" smtClean="0">
+                <a:solidFill>
+                  <a:srgbClr val="FFFFFF"/>
+                </a:solidFill>
+                <a:latin typeface="Avenir Light"/>
+                <a:cs typeface="Avenir Light"/>
+              </a:rPr>
+              <a:t>about</a:t>
+            </a:r>
+            <a:r>
+              <a:rPr lang="it-IT" sz="1800" dirty="0" smtClean="0">
+                <a:solidFill>
+                  <a:srgbClr val="FFFFFF"/>
+                </a:solidFill>
+                <a:latin typeface="Avenir Light"/>
+                <a:cs typeface="Avenir Light"/>
+              </a:rPr>
+              <a:t> 52% of the </a:t>
+            </a:r>
+            <a:r>
+              <a:rPr lang="it-IT" sz="1800" dirty="0" err="1" smtClean="0">
+                <a:solidFill>
+                  <a:srgbClr val="FFFFFF"/>
+                </a:solidFill>
+                <a:latin typeface="Avenir Light"/>
+                <a:cs typeface="Avenir Light"/>
+              </a:rPr>
+              <a:t>analyzed</a:t>
+            </a:r>
+            <a:r>
+              <a:rPr lang="it-IT" sz="1800" dirty="0" smtClean="0">
+                <a:solidFill>
+                  <a:srgbClr val="FFFFFF"/>
+                </a:solidFill>
+                <a:latin typeface="Avenir Light"/>
+                <a:cs typeface="Avenir Light"/>
+              </a:rPr>
+              <a:t> </a:t>
+            </a:r>
+            <a:r>
+              <a:rPr lang="it-IT" sz="1800" dirty="0" err="1" smtClean="0">
+                <a:solidFill>
+                  <a:srgbClr val="FFFFFF"/>
+                </a:solidFill>
+                <a:latin typeface="Avenir Light"/>
+                <a:cs typeface="Avenir Light"/>
+              </a:rPr>
+              <a:t>samples</a:t>
+            </a:r>
+            <a:r>
+              <a:rPr lang="it-IT" sz="1800" dirty="0" smtClean="0">
+                <a:solidFill>
+                  <a:srgbClr val="FFFFFF"/>
+                </a:solidFill>
+                <a:latin typeface="Avenir Light"/>
+                <a:cs typeface="Avenir Light"/>
+              </a:rPr>
+              <a:t>, </a:t>
+            </a:r>
+            <a:r>
+              <a:rPr lang="it-IT" sz="1800" dirty="0" err="1" smtClean="0">
+                <a:solidFill>
+                  <a:srgbClr val="FFFFFF"/>
+                </a:solidFill>
+                <a:latin typeface="Avenir Light"/>
+                <a:cs typeface="Avenir Light"/>
+              </a:rPr>
+              <a:t>but</a:t>
+            </a:r>
+            <a:r>
+              <a:rPr lang="it-IT" sz="1800" dirty="0" smtClean="0">
+                <a:solidFill>
+                  <a:srgbClr val="FFFFFF"/>
+                </a:solidFill>
+                <a:latin typeface="Avenir Light"/>
+                <a:cs typeface="Avenir Light"/>
+              </a:rPr>
+              <a:t> </a:t>
+            </a:r>
+            <a:r>
+              <a:rPr lang="it-IT" sz="1800" dirty="0" err="1" smtClean="0">
+                <a:solidFill>
+                  <a:srgbClr val="FFFFFF"/>
+                </a:solidFill>
+                <a:latin typeface="Avenir Light"/>
+                <a:cs typeface="Avenir Light"/>
+              </a:rPr>
+              <a:t>indications</a:t>
+            </a:r>
+            <a:r>
+              <a:rPr lang="it-IT" sz="1800" dirty="0" smtClean="0">
+                <a:solidFill>
+                  <a:srgbClr val="FFFFFF"/>
+                </a:solidFill>
+                <a:latin typeface="Avenir Light"/>
+                <a:cs typeface="Avenir Light"/>
+              </a:rPr>
+              <a:t> </a:t>
+            </a:r>
+            <a:r>
+              <a:rPr lang="it-IT" sz="1800" dirty="0" err="1" smtClean="0">
+                <a:solidFill>
+                  <a:srgbClr val="FFFFFF"/>
+                </a:solidFill>
+                <a:latin typeface="Avenir Light"/>
+                <a:cs typeface="Avenir Light"/>
+              </a:rPr>
+              <a:t>provided</a:t>
+            </a:r>
+            <a:r>
+              <a:rPr lang="it-IT" sz="1800" dirty="0" smtClean="0">
+                <a:solidFill>
+                  <a:srgbClr val="FFFFFF"/>
+                </a:solidFill>
+                <a:latin typeface="Avenir Light"/>
+                <a:cs typeface="Avenir Light"/>
+              </a:rPr>
+              <a:t> by the model can be </a:t>
+            </a:r>
+            <a:r>
+              <a:rPr lang="it-IT" sz="1800" dirty="0" err="1" smtClean="0">
+                <a:solidFill>
+                  <a:srgbClr val="FFFFFF"/>
+                </a:solidFill>
+                <a:latin typeface="Avenir Light"/>
+                <a:cs typeface="Avenir Light"/>
+              </a:rPr>
+              <a:t>useful</a:t>
+            </a:r>
+            <a:r>
+              <a:rPr lang="it-IT" sz="1800" dirty="0" smtClean="0">
+                <a:solidFill>
+                  <a:srgbClr val="FFFFFF"/>
+                </a:solidFill>
+                <a:latin typeface="Avenir Light"/>
+                <a:cs typeface="Avenir Light"/>
+              </a:rPr>
+              <a:t> </a:t>
+            </a:r>
+            <a:r>
+              <a:rPr lang="it-IT" sz="1800" dirty="0" err="1" smtClean="0">
+                <a:solidFill>
+                  <a:srgbClr val="FFFFFF"/>
+                </a:solidFill>
+                <a:latin typeface="Avenir Light"/>
+                <a:cs typeface="Avenir Light"/>
+              </a:rPr>
+              <a:t>even</a:t>
+            </a:r>
+            <a:r>
+              <a:rPr lang="it-IT" sz="1800" dirty="0" smtClean="0">
+                <a:solidFill>
+                  <a:srgbClr val="FFFFFF"/>
+                </a:solidFill>
+                <a:latin typeface="Avenir Light"/>
+                <a:cs typeface="Avenir Light"/>
+              </a:rPr>
+              <a:t> in </a:t>
+            </a:r>
+            <a:r>
+              <a:rPr lang="it-IT" sz="1800" dirty="0" err="1" smtClean="0">
+                <a:solidFill>
+                  <a:srgbClr val="FFFFFF"/>
+                </a:solidFill>
+                <a:latin typeface="Avenir Light"/>
+                <a:cs typeface="Avenir Light"/>
+              </a:rPr>
+              <a:t>not</a:t>
+            </a:r>
+            <a:r>
+              <a:rPr lang="it-IT" sz="1800" dirty="0" smtClean="0">
+                <a:solidFill>
+                  <a:srgbClr val="FFFFFF"/>
+                </a:solidFill>
+                <a:latin typeface="Avenir Light"/>
+                <a:cs typeface="Avenir Light"/>
+              </a:rPr>
+              <a:t> </a:t>
+            </a:r>
+            <a:r>
+              <a:rPr lang="it-IT" sz="1800" dirty="0" err="1" smtClean="0">
+                <a:solidFill>
+                  <a:srgbClr val="FFFFFF"/>
+                </a:solidFill>
+                <a:latin typeface="Avenir Light"/>
+                <a:cs typeface="Avenir Light"/>
+              </a:rPr>
+              <a:t>perfect</a:t>
+            </a:r>
+            <a:r>
+              <a:rPr lang="it-IT" sz="1800" dirty="0" smtClean="0">
+                <a:solidFill>
+                  <a:srgbClr val="FFFFFF"/>
+                </a:solidFill>
+                <a:latin typeface="Avenir Light"/>
+                <a:cs typeface="Avenir Light"/>
+              </a:rPr>
+              <a:t> </a:t>
+            </a:r>
+            <a:r>
+              <a:rPr lang="it-IT" sz="1800" dirty="0" err="1" smtClean="0">
+                <a:solidFill>
+                  <a:srgbClr val="FFFFFF"/>
+                </a:solidFill>
+                <a:latin typeface="Avenir Light"/>
+                <a:cs typeface="Avenir Light"/>
+              </a:rPr>
+              <a:t>scenarios</a:t>
+            </a:r>
+            <a:endParaRPr lang="it-IT" sz="1800" dirty="0" smtClean="0">
+              <a:solidFill>
+                <a:srgbClr val="FFFFFF"/>
+              </a:solidFill>
+              <a:latin typeface="Avenir Light"/>
+              <a:cs typeface="Avenir Light"/>
+            </a:endParaRPr>
+          </a:p>
+          <a:p>
+            <a:endParaRPr lang="it-IT" sz="1200" dirty="0">
+              <a:solidFill>
+                <a:srgbClr val="FFFFFF"/>
+              </a:solidFill>
+              <a:latin typeface="Avenir Light"/>
+              <a:cs typeface="Avenir Light"/>
+            </a:endParaRPr>
+          </a:p>
+          <a:p>
+            <a:r>
+              <a:rPr lang="it-IT" sz="1800" dirty="0" smtClean="0">
+                <a:solidFill>
+                  <a:srgbClr val="FFFFFF"/>
+                </a:solidFill>
+                <a:latin typeface="Avenir Light"/>
+                <a:cs typeface="Avenir Light"/>
+              </a:rPr>
+              <a:t>The </a:t>
+            </a:r>
+            <a:r>
+              <a:rPr lang="it-IT" sz="1800" dirty="0" err="1" smtClean="0">
+                <a:solidFill>
+                  <a:srgbClr val="FFFFFF"/>
+                </a:solidFill>
+                <a:latin typeface="Avenir Light"/>
+                <a:cs typeface="Avenir Light"/>
+              </a:rPr>
+              <a:t>actual</a:t>
+            </a:r>
+            <a:r>
+              <a:rPr lang="it-IT" sz="1800" dirty="0" smtClean="0">
+                <a:solidFill>
+                  <a:srgbClr val="FFFFFF"/>
+                </a:solidFill>
+                <a:latin typeface="Avenir Light"/>
+                <a:cs typeface="Avenir Light"/>
+              </a:rPr>
+              <a:t> </a:t>
+            </a:r>
+            <a:r>
+              <a:rPr lang="it-IT" sz="1800" dirty="0" err="1" smtClean="0">
+                <a:solidFill>
+                  <a:srgbClr val="FFFFFF"/>
+                </a:solidFill>
+                <a:latin typeface="Avenir Light"/>
+                <a:cs typeface="Avenir Light"/>
+              </a:rPr>
+              <a:t>results</a:t>
+            </a:r>
+            <a:r>
+              <a:rPr lang="it-IT" sz="1800" dirty="0" smtClean="0">
+                <a:solidFill>
+                  <a:srgbClr val="FFFFFF"/>
+                </a:solidFill>
+                <a:latin typeface="Avenir Light"/>
+                <a:cs typeface="Avenir Light"/>
+              </a:rPr>
+              <a:t> from a subset of the model are a </a:t>
+            </a:r>
+            <a:r>
+              <a:rPr lang="it-IT" sz="1800" dirty="0" err="1" smtClean="0">
+                <a:solidFill>
+                  <a:srgbClr val="FFFFFF"/>
+                </a:solidFill>
+                <a:latin typeface="Avenir Light"/>
+                <a:cs typeface="Avenir Light"/>
+              </a:rPr>
+              <a:t>good</a:t>
+            </a:r>
+            <a:r>
+              <a:rPr lang="it-IT" sz="1800" dirty="0" smtClean="0">
+                <a:solidFill>
+                  <a:srgbClr val="FFFFFF"/>
+                </a:solidFill>
+                <a:latin typeface="Avenir Light"/>
+                <a:cs typeface="Avenir Light"/>
+              </a:rPr>
+              <a:t> </a:t>
+            </a:r>
+            <a:r>
+              <a:rPr lang="it-IT" sz="1800" dirty="0" err="1" smtClean="0">
+                <a:solidFill>
+                  <a:srgbClr val="FFFFFF"/>
+                </a:solidFill>
+                <a:latin typeface="Avenir Light"/>
+                <a:cs typeface="Avenir Light"/>
+              </a:rPr>
+              <a:t>proof</a:t>
+            </a:r>
+            <a:r>
+              <a:rPr lang="it-IT" sz="1800" dirty="0" smtClean="0">
+                <a:solidFill>
+                  <a:srgbClr val="FFFFFF"/>
+                </a:solidFill>
+                <a:latin typeface="Avenir Light"/>
+                <a:cs typeface="Avenir Light"/>
+              </a:rPr>
+              <a:t> of the model </a:t>
+            </a:r>
+            <a:r>
+              <a:rPr lang="it-IT" sz="1800" dirty="0" err="1" smtClean="0">
+                <a:solidFill>
+                  <a:srgbClr val="FFFFFF"/>
+                </a:solidFill>
+                <a:latin typeface="Avenir Light"/>
+                <a:cs typeface="Avenir Light"/>
+              </a:rPr>
+              <a:t>potential</a:t>
+            </a:r>
+            <a:r>
+              <a:rPr lang="it-IT" sz="1800" dirty="0" smtClean="0">
+                <a:solidFill>
+                  <a:srgbClr val="FFFFFF"/>
+                </a:solidFill>
+                <a:latin typeface="Avenir Light"/>
+                <a:cs typeface="Avenir Light"/>
+              </a:rPr>
+              <a:t>:</a:t>
+            </a:r>
+          </a:p>
+        </p:txBody>
+      </p:sp>
       <p:pic>
         <p:nvPicPr>
-          <p:cNvPr id="5" name="Immagine 4" descr="metislogo.png"/>
+          <p:cNvPr id="4" name="Immagine 3" descr="track.jpg"/>
           <p:cNvPicPr>
             <a:picLocks noChangeAspect="1"/>
           </p:cNvPicPr>
@@ -12008,752 +12653,8 @@
         </p:blipFill>
         <p:spPr>
           <a:xfrm>
-            <a:off x="8511836" y="71505"/>
-            <a:ext cx="561340" cy="904240"/>
-          </a:xfrm>
-          <a:prstGeom prst="rect">
-            <a:avLst/>
-          </a:prstGeom>
-        </p:spPr>
-      </p:pic>
-      <p:sp>
-        <p:nvSpPr>
-          <p:cNvPr id="6" name="Segnaposto contenuto 2"/>
-          <p:cNvSpPr txBox="1">
-            <a:spLocks/>
-          </p:cNvSpPr>
-          <p:nvPr/>
-        </p:nvSpPr>
-        <p:spPr>
-          <a:xfrm>
-            <a:off x="327130" y="186966"/>
-            <a:ext cx="8495754" cy="2915433"/>
-          </a:xfrm>
-          <a:prstGeom prst="rect">
-            <a:avLst/>
-          </a:prstGeom>
-        </p:spPr>
-        <p:txBody>
-          <a:bodyPr vert="horz" lIns="91440" tIns="45720" rIns="91440" bIns="45720" rtlCol="0">
-            <a:normAutofit/>
-          </a:bodyPr>
-          <a:lstStyle>
-            <a:lvl1pPr marL="0" indent="0" algn="ctr" defTabSz="457200" rtl="0" eaLnBrk="1" latinLnBrk="0" hangingPunct="1">
-              <a:spcBef>
-                <a:spcPct val="20000"/>
-              </a:spcBef>
-              <a:buFont typeface="Arial"/>
-              <a:buNone/>
-              <a:defRPr sz="3200" kern="1200">
-                <a:solidFill>
-                  <a:schemeClr val="tx1">
-                    <a:tint val="75000"/>
-                  </a:schemeClr>
-                </a:solidFill>
-                <a:latin typeface="+mn-lt"/>
-                <a:ea typeface="+mn-ea"/>
-                <a:cs typeface="+mn-cs"/>
-              </a:defRPr>
-            </a:lvl1pPr>
-            <a:lvl2pPr marL="457200" indent="0" algn="ctr" defTabSz="457200" rtl="0" eaLnBrk="1" latinLnBrk="0" hangingPunct="1">
-              <a:spcBef>
-                <a:spcPct val="20000"/>
-              </a:spcBef>
-              <a:buFont typeface="Arial"/>
-              <a:buNone/>
-              <a:defRPr sz="2800" kern="1200">
-                <a:solidFill>
-                  <a:schemeClr val="tx1">
-                    <a:tint val="75000"/>
-                  </a:schemeClr>
-                </a:solidFill>
-                <a:latin typeface="+mn-lt"/>
-                <a:ea typeface="+mn-ea"/>
-                <a:cs typeface="+mn-cs"/>
-              </a:defRPr>
-            </a:lvl2pPr>
-            <a:lvl3pPr marL="914400" indent="0" algn="ctr" defTabSz="457200" rtl="0" eaLnBrk="1" latinLnBrk="0" hangingPunct="1">
-              <a:spcBef>
-                <a:spcPct val="20000"/>
-              </a:spcBef>
-              <a:buFont typeface="Arial"/>
-              <a:buNone/>
-              <a:defRPr sz="2400" kern="1200">
-                <a:solidFill>
-                  <a:schemeClr val="tx1">
-                    <a:tint val="75000"/>
-                  </a:schemeClr>
-                </a:solidFill>
-                <a:latin typeface="+mn-lt"/>
-                <a:ea typeface="+mn-ea"/>
-                <a:cs typeface="+mn-cs"/>
-              </a:defRPr>
-            </a:lvl3pPr>
-            <a:lvl4pPr marL="1371600" indent="0" algn="ctr" defTabSz="457200" rtl="0" eaLnBrk="1" latinLnBrk="0" hangingPunct="1">
-              <a:spcBef>
-                <a:spcPct val="20000"/>
-              </a:spcBef>
-              <a:buFont typeface="Arial"/>
-              <a:buNone/>
-              <a:defRPr sz="2000" kern="1200">
-                <a:solidFill>
-                  <a:schemeClr val="tx1">
-                    <a:tint val="75000"/>
-                  </a:schemeClr>
-                </a:solidFill>
-                <a:latin typeface="+mn-lt"/>
-                <a:ea typeface="+mn-ea"/>
-                <a:cs typeface="+mn-cs"/>
-              </a:defRPr>
-            </a:lvl4pPr>
-            <a:lvl5pPr marL="1828800" indent="0" algn="ctr" defTabSz="457200" rtl="0" eaLnBrk="1" latinLnBrk="0" hangingPunct="1">
-              <a:spcBef>
-                <a:spcPct val="20000"/>
-              </a:spcBef>
-              <a:buFont typeface="Arial"/>
-              <a:buNone/>
-              <a:defRPr sz="2000" kern="1200">
-                <a:solidFill>
-                  <a:schemeClr val="tx1">
-                    <a:tint val="75000"/>
-                  </a:schemeClr>
-                </a:solidFill>
-                <a:latin typeface="+mn-lt"/>
-                <a:ea typeface="+mn-ea"/>
-                <a:cs typeface="+mn-cs"/>
-              </a:defRPr>
-            </a:lvl5pPr>
-            <a:lvl6pPr marL="2286000" indent="0" algn="ctr" defTabSz="457200" rtl="0" eaLnBrk="1" latinLnBrk="0" hangingPunct="1">
-              <a:spcBef>
-                <a:spcPct val="20000"/>
-              </a:spcBef>
-              <a:buFont typeface="Arial"/>
-              <a:buNone/>
-              <a:defRPr sz="2000" kern="1200">
-                <a:solidFill>
-                  <a:schemeClr val="tx1">
-                    <a:tint val="75000"/>
-                  </a:schemeClr>
-                </a:solidFill>
-                <a:latin typeface="+mn-lt"/>
-                <a:ea typeface="+mn-ea"/>
-                <a:cs typeface="+mn-cs"/>
-              </a:defRPr>
-            </a:lvl6pPr>
-            <a:lvl7pPr marL="2743200" indent="0" algn="ctr" defTabSz="457200" rtl="0" eaLnBrk="1" latinLnBrk="0" hangingPunct="1">
-              <a:spcBef>
-                <a:spcPct val="20000"/>
-              </a:spcBef>
-              <a:buFont typeface="Arial"/>
-              <a:buNone/>
-              <a:defRPr sz="2000" kern="1200">
-                <a:solidFill>
-                  <a:schemeClr val="tx1">
-                    <a:tint val="75000"/>
-                  </a:schemeClr>
-                </a:solidFill>
-                <a:latin typeface="+mn-lt"/>
-                <a:ea typeface="+mn-ea"/>
-                <a:cs typeface="+mn-cs"/>
-              </a:defRPr>
-            </a:lvl7pPr>
-            <a:lvl8pPr marL="3200400" indent="0" algn="ctr" defTabSz="457200" rtl="0" eaLnBrk="1" latinLnBrk="0" hangingPunct="1">
-              <a:spcBef>
-                <a:spcPct val="20000"/>
-              </a:spcBef>
-              <a:buFont typeface="Arial"/>
-              <a:buNone/>
-              <a:defRPr sz="2000" kern="1200">
-                <a:solidFill>
-                  <a:schemeClr val="tx1">
-                    <a:tint val="75000"/>
-                  </a:schemeClr>
-                </a:solidFill>
-                <a:latin typeface="+mn-lt"/>
-                <a:ea typeface="+mn-ea"/>
-                <a:cs typeface="+mn-cs"/>
-              </a:defRPr>
-            </a:lvl8pPr>
-            <a:lvl9pPr marL="3657600" indent="0" algn="ctr" defTabSz="457200" rtl="0" eaLnBrk="1" latinLnBrk="0" hangingPunct="1">
-              <a:spcBef>
-                <a:spcPct val="20000"/>
-              </a:spcBef>
-              <a:buFont typeface="Arial"/>
-              <a:buNone/>
-              <a:defRPr sz="2000" kern="1200">
-                <a:solidFill>
-                  <a:schemeClr val="tx1">
-                    <a:tint val="75000"/>
-                  </a:schemeClr>
-                </a:solidFill>
-                <a:latin typeface="+mn-lt"/>
-                <a:ea typeface="+mn-ea"/>
-                <a:cs typeface="+mn-cs"/>
-              </a:defRPr>
-            </a:lvl9pPr>
-          </a:lstStyle>
-          <a:p>
-            <a:r>
-              <a:rPr lang="it-IT" sz="2400" dirty="0" smtClean="0">
-                <a:solidFill>
-                  <a:srgbClr val="FFFFFF"/>
-                </a:solidFill>
-                <a:latin typeface="Avenir Light"/>
-                <a:cs typeface="Avenir Light"/>
-              </a:rPr>
-              <a:t>The </a:t>
-            </a:r>
-            <a:r>
-              <a:rPr lang="it-IT" sz="2400" dirty="0" err="1" smtClean="0">
-                <a:solidFill>
-                  <a:srgbClr val="FFFFFF"/>
-                </a:solidFill>
-                <a:latin typeface="Avenir Light"/>
-                <a:cs typeface="Avenir Light"/>
-              </a:rPr>
-              <a:t>Outcomes</a:t>
-            </a:r>
-            <a:endParaRPr lang="it-IT" sz="2400" dirty="0" smtClean="0">
-              <a:solidFill>
-                <a:srgbClr val="FFFFFF"/>
-              </a:solidFill>
-              <a:latin typeface="Avenir Light"/>
-              <a:cs typeface="Avenir Light"/>
-            </a:endParaRPr>
-          </a:p>
-          <a:p>
-            <a:endParaRPr lang="it-IT" sz="1800" dirty="0" smtClean="0">
-              <a:solidFill>
-                <a:srgbClr val="FFFFFF"/>
-              </a:solidFill>
-              <a:latin typeface="Avenir Light"/>
-              <a:cs typeface="Avenir Light"/>
-            </a:endParaRPr>
-          </a:p>
-          <a:p>
-            <a:r>
-              <a:rPr lang="it-IT" sz="1600" dirty="0" err="1" smtClean="0">
-                <a:solidFill>
-                  <a:srgbClr val="FFFFFF"/>
-                </a:solidFill>
-                <a:latin typeface="Avenir Light"/>
-                <a:cs typeface="Avenir Light"/>
-              </a:rPr>
-              <a:t>Every</a:t>
-            </a:r>
-            <a:r>
-              <a:rPr lang="it-IT" sz="1600" dirty="0" smtClean="0">
-                <a:solidFill>
-                  <a:srgbClr val="FFFFFF"/>
-                </a:solidFill>
-                <a:latin typeface="Avenir Light"/>
-                <a:cs typeface="Avenir Light"/>
-              </a:rPr>
-              <a:t> “</a:t>
-            </a:r>
-            <a:r>
-              <a:rPr lang="it-IT" sz="1600" dirty="0" err="1" smtClean="0">
-                <a:solidFill>
-                  <a:srgbClr val="FFFFFF"/>
-                </a:solidFill>
-                <a:latin typeface="Avenir Light"/>
-                <a:cs typeface="Avenir Light"/>
-              </a:rPr>
-              <a:t>perfect</a:t>
-            </a:r>
-            <a:r>
-              <a:rPr lang="it-IT" sz="1600" dirty="0" smtClean="0">
-                <a:solidFill>
-                  <a:srgbClr val="FFFFFF"/>
-                </a:solidFill>
-                <a:latin typeface="Avenir Light"/>
-                <a:cs typeface="Avenir Light"/>
-              </a:rPr>
-              <a:t>” scenario </a:t>
-            </a:r>
-            <a:r>
-              <a:rPr lang="it-IT" sz="1600" dirty="0" err="1" smtClean="0">
-                <a:solidFill>
-                  <a:srgbClr val="FFFFFF"/>
-                </a:solidFill>
-                <a:latin typeface="Avenir Light"/>
-                <a:cs typeface="Avenir Light"/>
-              </a:rPr>
-              <a:t>assured</a:t>
-            </a:r>
-            <a:r>
-              <a:rPr lang="it-IT" sz="1600" dirty="0" smtClean="0">
-                <a:solidFill>
-                  <a:srgbClr val="FFFFFF"/>
-                </a:solidFill>
-                <a:latin typeface="Avenir Light"/>
-                <a:cs typeface="Avenir Light"/>
-              </a:rPr>
-              <a:t> 100% of </a:t>
-            </a:r>
-            <a:r>
-              <a:rPr lang="it-IT" sz="1600" dirty="0" err="1" smtClean="0">
-                <a:solidFill>
-                  <a:srgbClr val="FFFFFF"/>
-                </a:solidFill>
-                <a:latin typeface="Avenir Light"/>
-                <a:cs typeface="Avenir Light"/>
-              </a:rPr>
-              <a:t>expected</a:t>
-            </a:r>
-            <a:r>
-              <a:rPr lang="it-IT" sz="1600" dirty="0" smtClean="0">
-                <a:solidFill>
-                  <a:srgbClr val="FFFFFF"/>
-                </a:solidFill>
-                <a:latin typeface="Avenir Light"/>
-                <a:cs typeface="Avenir Light"/>
-              </a:rPr>
-              <a:t> </a:t>
-            </a:r>
-            <a:r>
-              <a:rPr lang="it-IT" sz="1600" dirty="0" smtClean="0">
-                <a:solidFill>
-                  <a:srgbClr val="FFFFFF"/>
-                </a:solidFill>
-                <a:latin typeface="Avenir Light"/>
-                <a:cs typeface="Avenir Light"/>
-              </a:rPr>
-              <a:t>profit</a:t>
-            </a:r>
-            <a:endParaRPr lang="it-IT" sz="1600" dirty="0" smtClean="0">
-              <a:solidFill>
-                <a:srgbClr val="FFFFFF"/>
-              </a:solidFill>
-              <a:latin typeface="Avenir Light"/>
-              <a:cs typeface="Avenir Light"/>
-            </a:endParaRPr>
-          </a:p>
-          <a:p>
-            <a:endParaRPr lang="it-IT" sz="1000" dirty="0" smtClean="0">
-              <a:solidFill>
-                <a:srgbClr val="FFFFFF"/>
-              </a:solidFill>
-              <a:latin typeface="Avenir Light"/>
-              <a:cs typeface="Avenir Light"/>
-            </a:endParaRPr>
-          </a:p>
-          <a:p>
-            <a:r>
-              <a:rPr lang="it-IT" sz="1600" dirty="0" smtClean="0">
-                <a:solidFill>
-                  <a:srgbClr val="FFFFFF"/>
-                </a:solidFill>
-                <a:latin typeface="Avenir Light"/>
-                <a:cs typeface="Avenir Light"/>
-              </a:rPr>
-              <a:t>The </a:t>
-            </a:r>
-            <a:r>
-              <a:rPr lang="it-IT" sz="1600" dirty="0" err="1" smtClean="0">
-                <a:solidFill>
-                  <a:srgbClr val="FFFFFF"/>
-                </a:solidFill>
-                <a:latin typeface="Avenir Light"/>
-                <a:cs typeface="Avenir Light"/>
-              </a:rPr>
-              <a:t>perfect</a:t>
-            </a:r>
-            <a:r>
-              <a:rPr lang="it-IT" sz="1600" dirty="0" smtClean="0">
-                <a:solidFill>
-                  <a:srgbClr val="FFFFFF"/>
-                </a:solidFill>
-                <a:latin typeface="Avenir Light"/>
-                <a:cs typeface="Avenir Light"/>
-              </a:rPr>
-              <a:t> scenario </a:t>
-            </a:r>
-            <a:r>
-              <a:rPr lang="it-IT" sz="1600" dirty="0" err="1" smtClean="0">
-                <a:solidFill>
-                  <a:srgbClr val="FFFFFF"/>
-                </a:solidFill>
-                <a:latin typeface="Avenir Light"/>
-                <a:cs typeface="Avenir Light"/>
-              </a:rPr>
-              <a:t>occurred</a:t>
-            </a:r>
-            <a:r>
-              <a:rPr lang="it-IT" sz="1600" dirty="0" smtClean="0">
-                <a:solidFill>
-                  <a:srgbClr val="FFFFFF"/>
-                </a:solidFill>
-                <a:latin typeface="Avenir Light"/>
-                <a:cs typeface="Avenir Light"/>
-              </a:rPr>
-              <a:t> in </a:t>
-            </a:r>
-            <a:r>
-              <a:rPr lang="it-IT" sz="1600" dirty="0" err="1" smtClean="0">
-                <a:solidFill>
-                  <a:srgbClr val="FFFFFF"/>
-                </a:solidFill>
-                <a:latin typeface="Avenir Light"/>
-                <a:cs typeface="Avenir Light"/>
-              </a:rPr>
-              <a:t>about</a:t>
-            </a:r>
-            <a:r>
-              <a:rPr lang="it-IT" sz="1600" dirty="0" smtClean="0">
-                <a:solidFill>
-                  <a:srgbClr val="FFFFFF"/>
-                </a:solidFill>
-                <a:latin typeface="Avenir Light"/>
-                <a:cs typeface="Avenir Light"/>
-              </a:rPr>
-              <a:t> 52% of the </a:t>
-            </a:r>
-            <a:r>
-              <a:rPr lang="it-IT" sz="1600" dirty="0" err="1" smtClean="0">
-                <a:solidFill>
-                  <a:srgbClr val="FFFFFF"/>
-                </a:solidFill>
-                <a:latin typeface="Avenir Light"/>
-                <a:cs typeface="Avenir Light"/>
-              </a:rPr>
-              <a:t>analyzed</a:t>
-            </a:r>
-            <a:r>
-              <a:rPr lang="it-IT" sz="1600" dirty="0" smtClean="0">
-                <a:solidFill>
-                  <a:srgbClr val="FFFFFF"/>
-                </a:solidFill>
-                <a:latin typeface="Avenir Light"/>
-                <a:cs typeface="Avenir Light"/>
-              </a:rPr>
-              <a:t> </a:t>
-            </a:r>
-            <a:r>
-              <a:rPr lang="it-IT" sz="1600" dirty="0" err="1" smtClean="0">
-                <a:solidFill>
-                  <a:srgbClr val="FFFFFF"/>
-                </a:solidFill>
-                <a:latin typeface="Avenir Light"/>
-                <a:cs typeface="Avenir Light"/>
-              </a:rPr>
-              <a:t>samples</a:t>
-            </a:r>
-            <a:r>
-              <a:rPr lang="it-IT" sz="1600" dirty="0" smtClean="0">
-                <a:solidFill>
-                  <a:srgbClr val="FFFFFF"/>
-                </a:solidFill>
-                <a:latin typeface="Avenir Light"/>
-                <a:cs typeface="Avenir Light"/>
-              </a:rPr>
-              <a:t>, </a:t>
-            </a:r>
-            <a:r>
-              <a:rPr lang="it-IT" sz="1600" dirty="0" err="1" smtClean="0">
-                <a:solidFill>
-                  <a:srgbClr val="FFFFFF"/>
-                </a:solidFill>
-                <a:latin typeface="Avenir Light"/>
-                <a:cs typeface="Avenir Light"/>
-              </a:rPr>
-              <a:t>but</a:t>
-            </a:r>
-            <a:r>
-              <a:rPr lang="it-IT" sz="1600" dirty="0" smtClean="0">
-                <a:solidFill>
-                  <a:srgbClr val="FFFFFF"/>
-                </a:solidFill>
-                <a:latin typeface="Avenir Light"/>
-                <a:cs typeface="Avenir Light"/>
-              </a:rPr>
-              <a:t> </a:t>
-            </a:r>
-            <a:r>
-              <a:rPr lang="it-IT" sz="1600" dirty="0" err="1" smtClean="0">
-                <a:solidFill>
-                  <a:srgbClr val="FFFFFF"/>
-                </a:solidFill>
-                <a:latin typeface="Avenir Light"/>
-                <a:cs typeface="Avenir Light"/>
-              </a:rPr>
-              <a:t>indications</a:t>
-            </a:r>
-            <a:r>
-              <a:rPr lang="it-IT" sz="1600" dirty="0" smtClean="0">
-                <a:solidFill>
-                  <a:srgbClr val="FFFFFF"/>
-                </a:solidFill>
-                <a:latin typeface="Avenir Light"/>
-                <a:cs typeface="Avenir Light"/>
-              </a:rPr>
-              <a:t> </a:t>
-            </a:r>
-            <a:r>
-              <a:rPr lang="it-IT" sz="1600" dirty="0" err="1" smtClean="0">
-                <a:solidFill>
-                  <a:srgbClr val="FFFFFF"/>
-                </a:solidFill>
-                <a:latin typeface="Avenir Light"/>
-                <a:cs typeface="Avenir Light"/>
-              </a:rPr>
-              <a:t>provided</a:t>
-            </a:r>
-            <a:r>
-              <a:rPr lang="it-IT" sz="1600" dirty="0" smtClean="0">
-                <a:solidFill>
-                  <a:srgbClr val="FFFFFF"/>
-                </a:solidFill>
-                <a:latin typeface="Avenir Light"/>
-                <a:cs typeface="Avenir Light"/>
-              </a:rPr>
-              <a:t> by the model can be </a:t>
-            </a:r>
-            <a:r>
-              <a:rPr lang="it-IT" sz="1600" dirty="0" err="1" smtClean="0">
-                <a:solidFill>
-                  <a:srgbClr val="FFFFFF"/>
-                </a:solidFill>
-                <a:latin typeface="Avenir Light"/>
-                <a:cs typeface="Avenir Light"/>
-              </a:rPr>
-              <a:t>useful</a:t>
-            </a:r>
-            <a:r>
-              <a:rPr lang="it-IT" sz="1600" dirty="0" smtClean="0">
-                <a:solidFill>
-                  <a:srgbClr val="FFFFFF"/>
-                </a:solidFill>
-                <a:latin typeface="Avenir Light"/>
-                <a:cs typeface="Avenir Light"/>
-              </a:rPr>
-              <a:t> </a:t>
-            </a:r>
-            <a:r>
-              <a:rPr lang="it-IT" sz="1600" dirty="0" err="1" smtClean="0">
-                <a:solidFill>
-                  <a:srgbClr val="FFFFFF"/>
-                </a:solidFill>
-                <a:latin typeface="Avenir Light"/>
-                <a:cs typeface="Avenir Light"/>
-              </a:rPr>
-              <a:t>even</a:t>
-            </a:r>
-            <a:r>
-              <a:rPr lang="it-IT" sz="1600" dirty="0" smtClean="0">
-                <a:solidFill>
-                  <a:srgbClr val="FFFFFF"/>
-                </a:solidFill>
-                <a:latin typeface="Avenir Light"/>
-                <a:cs typeface="Avenir Light"/>
-              </a:rPr>
-              <a:t> in </a:t>
-            </a:r>
-            <a:r>
-              <a:rPr lang="it-IT" sz="1600" dirty="0" err="1" smtClean="0">
-                <a:solidFill>
-                  <a:srgbClr val="FFFFFF"/>
-                </a:solidFill>
-                <a:latin typeface="Avenir Light"/>
-                <a:cs typeface="Avenir Light"/>
-              </a:rPr>
-              <a:t>not</a:t>
-            </a:r>
-            <a:r>
-              <a:rPr lang="it-IT" sz="1600" dirty="0" smtClean="0">
-                <a:solidFill>
-                  <a:srgbClr val="FFFFFF"/>
-                </a:solidFill>
-                <a:latin typeface="Avenir Light"/>
-                <a:cs typeface="Avenir Light"/>
-              </a:rPr>
-              <a:t> </a:t>
-            </a:r>
-            <a:r>
-              <a:rPr lang="it-IT" sz="1600" dirty="0" err="1" smtClean="0">
-                <a:solidFill>
-                  <a:srgbClr val="FFFFFF"/>
-                </a:solidFill>
-                <a:latin typeface="Avenir Light"/>
-                <a:cs typeface="Avenir Light"/>
-              </a:rPr>
-              <a:t>perfect</a:t>
-            </a:r>
-            <a:r>
-              <a:rPr lang="it-IT" sz="1600" dirty="0" smtClean="0">
-                <a:solidFill>
-                  <a:srgbClr val="FFFFFF"/>
-                </a:solidFill>
-                <a:latin typeface="Avenir Light"/>
-                <a:cs typeface="Avenir Light"/>
-              </a:rPr>
-              <a:t> </a:t>
-            </a:r>
-            <a:r>
-              <a:rPr lang="it-IT" sz="1600" dirty="0" err="1" smtClean="0">
-                <a:solidFill>
-                  <a:srgbClr val="FFFFFF"/>
-                </a:solidFill>
-                <a:latin typeface="Avenir Light"/>
-                <a:cs typeface="Avenir Light"/>
-              </a:rPr>
-              <a:t>scenarios</a:t>
-            </a:r>
-            <a:endParaRPr lang="it-IT" sz="1600" dirty="0" smtClean="0">
-              <a:solidFill>
-                <a:srgbClr val="FFFFFF"/>
-              </a:solidFill>
-              <a:latin typeface="Avenir Light"/>
-              <a:cs typeface="Avenir Light"/>
-            </a:endParaRPr>
-          </a:p>
-          <a:p>
-            <a:endParaRPr lang="it-IT" sz="1000" dirty="0">
-              <a:solidFill>
-                <a:srgbClr val="FFFFFF"/>
-              </a:solidFill>
-              <a:latin typeface="Avenir Light"/>
-              <a:cs typeface="Avenir Light"/>
-            </a:endParaRPr>
-          </a:p>
-          <a:p>
-            <a:r>
-              <a:rPr lang="it-IT" sz="1600" dirty="0" smtClean="0">
-                <a:solidFill>
-                  <a:srgbClr val="FFFFFF"/>
-                </a:solidFill>
-                <a:latin typeface="Avenir Light"/>
-                <a:cs typeface="Avenir Light"/>
-              </a:rPr>
-              <a:t>The </a:t>
-            </a:r>
-            <a:r>
-              <a:rPr lang="it-IT" sz="1600" dirty="0" err="1" smtClean="0">
-                <a:solidFill>
-                  <a:srgbClr val="FFFFFF"/>
-                </a:solidFill>
-                <a:latin typeface="Avenir Light"/>
-                <a:cs typeface="Avenir Light"/>
-              </a:rPr>
-              <a:t>actual</a:t>
-            </a:r>
-            <a:r>
-              <a:rPr lang="it-IT" sz="1600" dirty="0" smtClean="0">
-                <a:solidFill>
-                  <a:srgbClr val="FFFFFF"/>
-                </a:solidFill>
-                <a:latin typeface="Avenir Light"/>
-                <a:cs typeface="Avenir Light"/>
-              </a:rPr>
-              <a:t> </a:t>
-            </a:r>
-            <a:r>
-              <a:rPr lang="it-IT" sz="1600" dirty="0" err="1" smtClean="0">
-                <a:solidFill>
-                  <a:srgbClr val="FFFFFF"/>
-                </a:solidFill>
-                <a:latin typeface="Avenir Light"/>
-                <a:cs typeface="Avenir Light"/>
-              </a:rPr>
-              <a:t>results</a:t>
-            </a:r>
-            <a:r>
-              <a:rPr lang="it-IT" sz="1600" dirty="0" smtClean="0">
-                <a:solidFill>
-                  <a:srgbClr val="FFFFFF"/>
-                </a:solidFill>
-                <a:latin typeface="Avenir Light"/>
-                <a:cs typeface="Avenir Light"/>
-              </a:rPr>
-              <a:t> from a subset of the model are a </a:t>
-            </a:r>
-            <a:r>
-              <a:rPr lang="it-IT" sz="1600" dirty="0" err="1" smtClean="0">
-                <a:solidFill>
-                  <a:srgbClr val="FFFFFF"/>
-                </a:solidFill>
-                <a:latin typeface="Avenir Light"/>
-                <a:cs typeface="Avenir Light"/>
-              </a:rPr>
-              <a:t>good</a:t>
-            </a:r>
-            <a:r>
-              <a:rPr lang="it-IT" sz="1600" dirty="0" smtClean="0">
-                <a:solidFill>
-                  <a:srgbClr val="FFFFFF"/>
-                </a:solidFill>
-                <a:latin typeface="Avenir Light"/>
-                <a:cs typeface="Avenir Light"/>
-              </a:rPr>
-              <a:t> </a:t>
-            </a:r>
-            <a:r>
-              <a:rPr lang="it-IT" sz="1600" dirty="0" err="1" smtClean="0">
-                <a:solidFill>
-                  <a:srgbClr val="FFFFFF"/>
-                </a:solidFill>
-                <a:latin typeface="Avenir Light"/>
-                <a:cs typeface="Avenir Light"/>
-              </a:rPr>
-              <a:t>proof</a:t>
-            </a:r>
-            <a:r>
-              <a:rPr lang="it-IT" sz="1600" dirty="0" smtClean="0">
-                <a:solidFill>
-                  <a:srgbClr val="FFFFFF"/>
-                </a:solidFill>
-                <a:latin typeface="Avenir Light"/>
-                <a:cs typeface="Avenir Light"/>
-              </a:rPr>
-              <a:t> of the model </a:t>
-            </a:r>
-            <a:r>
-              <a:rPr lang="it-IT" sz="1600" dirty="0" err="1" smtClean="0">
-                <a:solidFill>
-                  <a:srgbClr val="FFFFFF"/>
-                </a:solidFill>
-                <a:latin typeface="Avenir Light"/>
-                <a:cs typeface="Avenir Light"/>
-              </a:rPr>
-              <a:t>potential</a:t>
-            </a:r>
-            <a:r>
-              <a:rPr lang="it-IT" sz="1600" dirty="0" smtClean="0">
-                <a:solidFill>
-                  <a:srgbClr val="FFFFFF"/>
-                </a:solidFill>
-                <a:latin typeface="Avenir Light"/>
-                <a:cs typeface="Avenir Light"/>
-              </a:rPr>
-              <a:t>:</a:t>
-            </a:r>
-          </a:p>
-        </p:txBody>
-      </p:sp>
-      <p:pic>
-        <p:nvPicPr>
-          <p:cNvPr id="3" name="Immagine 2" descr="track.jpg"/>
-          <p:cNvPicPr>
-            <a:picLocks noChangeAspect="1"/>
-          </p:cNvPicPr>
-          <p:nvPr/>
-        </p:nvPicPr>
-        <p:blipFill>
-          <a:blip r:embed="rId4">
-            <a:extLst>
-              <a:ext uri="{28A0092B-C50C-407E-A947-70E740481C1C}">
-                <a14:useLocalDpi xmlns:a14="http://schemas.microsoft.com/office/drawing/2010/main" val="0"/>
-              </a:ext>
-            </a:extLst>
-          </a:blip>
-          <a:stretch>
-            <a:fillRect/>
-          </a:stretch>
-        </p:blipFill>
-        <p:spPr>
-          <a:xfrm>
-            <a:off x="2324111" y="2789488"/>
-            <a:ext cx="4632960" cy="3716020"/>
+            <a:off x="2160866" y="2713142"/>
+            <a:ext cx="4953000" cy="3924300"/>
           </a:xfrm>
           <a:prstGeom prst="rect">
             <a:avLst/>
@@ -13067,36 +12968,6 @@
       </p:sp>
       <p:pic>
         <p:nvPicPr>
-          <p:cNvPr id="5" name="Immagine 4" descr="metislogo.png"/>
-          <p:cNvPicPr>
-            <a:picLocks noChangeAspect="1"/>
-          </p:cNvPicPr>
-          <p:nvPr/>
-        </p:nvPicPr>
-        <p:blipFill>
-          <a:blip r:embed="rId3">
-            <a:extLst>
-              <a:ext uri="{28A0092B-C50C-407E-A947-70E740481C1C}">
-                <a14:useLocalDpi xmlns:a14="http://schemas.microsoft.com/office/drawing/2010/main" val="0"/>
-              </a:ext>
-            </a:extLst>
-          </a:blip>
-          <a:stretch>
-            <a:fillRect/>
-          </a:stretch>
-        </p:blipFill>
-        <p:spPr>
-          <a:xfrm>
-            <a:off x="8511836" y="71505"/>
-            <a:ext cx="561340" cy="904240"/>
-          </a:xfrm>
-          <a:prstGeom prst="rect">
-            <a:avLst/>
-          </a:prstGeom>
-        </p:spPr>
-      </p:pic>
-      <p:pic>
-        <p:nvPicPr>
           <p:cNvPr id="3" name="Immagine 2" descr="Marco Lunardi Photo 201505.jpg"/>
           <p:cNvPicPr>
             <a:picLocks noChangeAspect="1"/>
@@ -13104,7 +12975,7 @@
           <p:nvPr/>
         </p:nvPicPr>
         <p:blipFill rotWithShape="1">
-          <a:blip r:embed="rId4">
+          <a:blip r:embed="rId3">
             <a:extLst>
               <a:ext uri="{28A0092B-C50C-407E-A947-70E740481C1C}">
                 <a14:useLocalDpi xmlns:a14="http://schemas.microsoft.com/office/drawing/2010/main" val="0"/>

</xml_diff>